<commit_message>
Added Code and Notes for Linear Regression with R
</commit_message>
<xml_diff>
--- a/Machine-Learning/4.2 Linear-Regression/4.2.1-Linear-Regression.pptx
+++ b/Machine-Learning/4.2 Linear-Regression/4.2.1-Linear-Regression.pptx
@@ -311,7 +311,7 @@
           <a:p>
             <a:fld id="{DEE881C5-C40C-46AE-B142-F7F3F0A1C896}" type="datetimeFigureOut">
               <a:rPr lang="en-US" smtClean="0"/>
-              <a:t>4/25/2019</a:t>
+              <a:t>4/28/2019</a:t>
             </a:fld>
             <a:endParaRPr lang="en-US"/>
           </a:p>
@@ -719,7 +719,7 @@
           <a:p>
             <a:fld id="{051F961C-2C06-44AD-B09C-3FDB0903E3DD}" type="datetimeFigureOut">
               <a:rPr lang="en-US" smtClean="0"/>
-              <a:t>4/25/2019</a:t>
+              <a:t>4/28/2019</a:t>
             </a:fld>
             <a:endParaRPr lang="en-US"/>
           </a:p>
@@ -1077,7 +1077,7 @@
           <a:p>
             <a:fld id="{051F961C-2C06-44AD-B09C-3FDB0903E3DD}" type="datetimeFigureOut">
               <a:rPr lang="en-US" smtClean="0"/>
-              <a:t>4/25/2019</a:t>
+              <a:t>4/28/2019</a:t>
             </a:fld>
             <a:endParaRPr lang="en-US"/>
           </a:p>
@@ -1251,7 +1251,7 @@
           <a:p>
             <a:fld id="{051F961C-2C06-44AD-B09C-3FDB0903E3DD}" type="datetimeFigureOut">
               <a:rPr lang="en-US" smtClean="0"/>
-              <a:t>4/25/2019</a:t>
+              <a:t>4/28/2019</a:t>
             </a:fld>
             <a:endParaRPr lang="en-US"/>
           </a:p>
@@ -1485,7 +1485,7 @@
           <a:p>
             <a:fld id="{051F961C-2C06-44AD-B09C-3FDB0903E3DD}" type="datetimeFigureOut">
               <a:rPr lang="en-US" smtClean="0"/>
-              <a:t>4/25/2019</a:t>
+              <a:t>4/28/2019</a:t>
             </a:fld>
             <a:endParaRPr lang="en-US"/>
           </a:p>
@@ -1753,7 +1753,7 @@
           <a:p>
             <a:fld id="{051F961C-2C06-44AD-B09C-3FDB0903E3DD}" type="datetimeFigureOut">
               <a:rPr lang="en-US" smtClean="0"/>
-              <a:t>4/25/2019</a:t>
+              <a:t>4/28/2019</a:t>
             </a:fld>
             <a:endParaRPr lang="en-US"/>
           </a:p>
@@ -1972,7 +1972,7 @@
           <a:p>
             <a:fld id="{051F961C-2C06-44AD-B09C-3FDB0903E3DD}" type="datetimeFigureOut">
               <a:rPr lang="en-US" smtClean="0"/>
-              <a:t>4/25/2019</a:t>
+              <a:t>4/28/2019</a:t>
             </a:fld>
             <a:endParaRPr lang="en-US"/>
           </a:p>
@@ -2323,7 +2323,7 @@
           <a:p>
             <a:fld id="{051F961C-2C06-44AD-B09C-3FDB0903E3DD}" type="datetimeFigureOut">
               <a:rPr lang="en-US" smtClean="0"/>
-              <a:t>4/25/2019</a:t>
+              <a:t>4/28/2019</a:t>
             </a:fld>
             <a:endParaRPr lang="en-US"/>
           </a:p>
@@ -2554,7 +2554,7 @@
           <a:p>
             <a:fld id="{051F961C-2C06-44AD-B09C-3FDB0903E3DD}" type="datetimeFigureOut">
               <a:rPr lang="en-US" smtClean="0"/>
-              <a:t>4/25/2019</a:t>
+              <a:t>4/28/2019</a:t>
             </a:fld>
             <a:endParaRPr lang="en-US"/>
           </a:p>
@@ -2694,7 +2694,7 @@
           <a:p>
             <a:fld id="{051F961C-2C06-44AD-B09C-3FDB0903E3DD}" type="datetimeFigureOut">
               <a:rPr lang="en-US" smtClean="0"/>
-              <a:t>4/25/2019</a:t>
+              <a:t>4/28/2019</a:t>
             </a:fld>
             <a:endParaRPr lang="en-US"/>
           </a:p>
@@ -2970,7 +2970,7 @@
           <a:p>
             <a:fld id="{051F961C-2C06-44AD-B09C-3FDB0903E3DD}" type="datetimeFigureOut">
               <a:rPr lang="en-US" smtClean="0"/>
-              <a:t>4/25/2019</a:t>
+              <a:t>4/28/2019</a:t>
             </a:fld>
             <a:endParaRPr lang="en-US"/>
           </a:p>
@@ -3376,7 +3376,7 @@
           <a:p>
             <a:fld id="{051F961C-2C06-44AD-B09C-3FDB0903E3DD}" type="datetimeFigureOut">
               <a:rPr lang="en-US" smtClean="0"/>
-              <a:t>4/25/2019</a:t>
+              <a:t>4/28/2019</a:t>
             </a:fld>
             <a:endParaRPr lang="en-US"/>
           </a:p>
@@ -3712,7 +3712,7 @@
           <a:p>
             <a:fld id="{051F961C-2C06-44AD-B09C-3FDB0903E3DD}" type="datetimeFigureOut">
               <a:rPr lang="en-US" smtClean="0"/>
-              <a:t>4/25/2019</a:t>
+              <a:t>4/28/2019</a:t>
             </a:fld>
             <a:endParaRPr lang="en-US"/>
           </a:p>
@@ -4379,8 +4379,8 @@
           </a:p>
         </p:txBody>
       </p:sp>
-      <mc:AlternateContent xmlns:mc="http://schemas.openxmlformats.org/markup-compatibility/2006">
-        <mc:Choice xmlns:a14="http://schemas.microsoft.com/office/drawing/2010/main" Requires="a14">
+      <mc:AlternateContent xmlns:mc="http://schemas.openxmlformats.org/markup-compatibility/2006" xmlns:a14="http://schemas.microsoft.com/office/drawing/2010/main">
+        <mc:Choice Requires="a14">
           <p:sp>
             <p:nvSpPr>
               <p:cNvPr id="6" name="TextBox 5">
@@ -4867,7 +4867,7 @@
             </p:txBody>
           </p:sp>
         </mc:Choice>
-        <mc:Fallback>
+        <mc:Fallback xmlns="">
           <p:sp>
             <p:nvSpPr>
               <p:cNvPr id="6" name="TextBox 5">
@@ -5006,8 +5006,8 @@
           </a:p>
         </p:txBody>
       </p:sp>
-      <mc:AlternateContent xmlns:mc="http://schemas.openxmlformats.org/markup-compatibility/2006">
-        <mc:Choice xmlns:a14="http://schemas.microsoft.com/office/drawing/2010/main" Requires="a14">
+      <mc:AlternateContent xmlns:mc="http://schemas.openxmlformats.org/markup-compatibility/2006" xmlns:a14="http://schemas.microsoft.com/office/drawing/2010/main">
+        <mc:Choice Requires="a14">
           <p:sp>
             <p:nvSpPr>
               <p:cNvPr id="6" name="TextBox 5">
@@ -5268,7 +5268,7 @@
             </p:txBody>
           </p:sp>
         </mc:Choice>
-        <mc:Fallback>
+        <mc:Fallback xmlns="">
           <p:sp>
             <p:nvSpPr>
               <p:cNvPr id="6" name="TextBox 5">
@@ -5405,8 +5405,8 @@
           </a:p>
         </p:txBody>
       </p:sp>
-      <mc:AlternateContent xmlns:mc="http://schemas.openxmlformats.org/markup-compatibility/2006">
-        <mc:Choice xmlns:a14="http://schemas.microsoft.com/office/drawing/2010/main" Requires="a14">
+      <mc:AlternateContent xmlns:mc="http://schemas.openxmlformats.org/markup-compatibility/2006" xmlns:a14="http://schemas.microsoft.com/office/drawing/2010/main">
+        <mc:Choice Requires="a14">
           <p:sp>
             <p:nvSpPr>
               <p:cNvPr id="6" name="TextBox 5">
@@ -5682,7 +5682,7 @@
             </p:txBody>
           </p:sp>
         </mc:Choice>
-        <mc:Fallback>
+        <mc:Fallback xmlns="">
           <p:sp>
             <p:nvSpPr>
               <p:cNvPr id="6" name="TextBox 5">
@@ -5819,8 +5819,8 @@
           </a:p>
         </p:txBody>
       </p:sp>
-      <mc:AlternateContent xmlns:mc="http://schemas.openxmlformats.org/markup-compatibility/2006">
-        <mc:Choice xmlns:a14="http://schemas.microsoft.com/office/drawing/2010/main" Requires="a14">
+      <mc:AlternateContent xmlns:mc="http://schemas.openxmlformats.org/markup-compatibility/2006" xmlns:a14="http://schemas.microsoft.com/office/drawing/2010/main">
+        <mc:Choice Requires="a14">
           <p:sp>
             <p:nvSpPr>
               <p:cNvPr id="6" name="TextBox 5">
@@ -6086,7 +6086,7 @@
             </p:txBody>
           </p:sp>
         </mc:Choice>
-        <mc:Fallback>
+        <mc:Fallback xmlns="">
           <p:sp>
             <p:nvSpPr>
               <p:cNvPr id="6" name="TextBox 5">
@@ -11955,21 +11955,14 @@
                 <a:latin typeface="Calibri" pitchFamily="34" charset="0"/>
                 <a:cs typeface="Calibri" pitchFamily="34" charset="0"/>
               </a:rPr>
-              <a:t>‘Omitted Variable </a:t>
-            </a:r>
-            <a:r>
-              <a:rPr lang="en-US" sz="2000" b="1" dirty="0" err="1">
-                <a:latin typeface="Calibri" pitchFamily="34" charset="0"/>
-                <a:cs typeface="Calibri" pitchFamily="34" charset="0"/>
-              </a:rPr>
-              <a:t>bias’</a:t>
-            </a:r>
-            <a:r>
-              <a:rPr lang="en-US" sz="2000" b="1" dirty="0">
-                <a:latin typeface="Calibri" pitchFamily="34" charset="0"/>
-                <a:cs typeface="Calibri" pitchFamily="34" charset="0"/>
-              </a:rPr>
-              <a:t> </a:t>
+              <a:t>‘Omitted </a:t>
+            </a:r>
+            <a:r>
+              <a:rPr lang="en-US" sz="2000" b="1">
+                <a:latin typeface="Calibri" pitchFamily="34" charset="0"/>
+                <a:cs typeface="Calibri" pitchFamily="34" charset="0"/>
+              </a:rPr>
+              <a:t>Variable bias </a:t>
             </a:r>
             <a:endParaRPr lang="en-US" sz="2000" dirty="0">
               <a:latin typeface="Calibri" pitchFamily="34" charset="0"/>

</xml_diff>

<commit_message>
Linear Regression Notes: Added Approaches to Linear Regression
</commit_message>
<xml_diff>
--- a/Machine-Learning/4.2 Linear-Regression/4.2.1-Linear-Regression.pptx
+++ b/Machine-Learning/4.2 Linear-Regression/4.2.1-Linear-Regression.pptx
@@ -5,7 +5,7 @@
     <p:sldMasterId id="2147483744" r:id="rId1"/>
   </p:sldMasterIdLst>
   <p:notesMasterIdLst>
-    <p:notesMasterId r:id="rId50"/>
+    <p:notesMasterId r:id="rId57"/>
   </p:notesMasterIdLst>
   <p:sldIdLst>
     <p:sldId id="256" r:id="rId2"/>
@@ -55,7 +55,14 @@
     <p:sldId id="433" r:id="rId46"/>
     <p:sldId id="434" r:id="rId47"/>
     <p:sldId id="401" r:id="rId48"/>
-    <p:sldId id="390" r:id="rId49"/>
+    <p:sldId id="435" r:id="rId49"/>
+    <p:sldId id="436" r:id="rId50"/>
+    <p:sldId id="437" r:id="rId51"/>
+    <p:sldId id="438" r:id="rId52"/>
+    <p:sldId id="439" r:id="rId53"/>
+    <p:sldId id="440" r:id="rId54"/>
+    <p:sldId id="441" r:id="rId55"/>
+    <p:sldId id="390" r:id="rId56"/>
   </p:sldIdLst>
   <p:sldSz cx="9144000" cy="6858000" type="screen4x3"/>
   <p:notesSz cx="6858000" cy="9144000"/>
@@ -206,6 +213,13 @@
             <p14:sldId id="433"/>
             <p14:sldId id="434"/>
             <p14:sldId id="401"/>
+            <p14:sldId id="435"/>
+            <p14:sldId id="436"/>
+            <p14:sldId id="437"/>
+            <p14:sldId id="438"/>
+            <p14:sldId id="439"/>
+            <p14:sldId id="440"/>
+            <p14:sldId id="441"/>
             <p14:sldId id="390"/>
           </p14:sldIdLst>
         </p14:section>
@@ -311,7 +325,7 @@
           <a:p>
             <a:fld id="{DEE881C5-C40C-46AE-B142-F7F3F0A1C896}" type="datetimeFigureOut">
               <a:rPr lang="en-US" smtClean="0"/>
-              <a:t>4/28/2019</a:t>
+              <a:t>5/9/2019</a:t>
             </a:fld>
             <a:endParaRPr lang="en-US"/>
           </a:p>
@@ -719,7 +733,7 @@
           <a:p>
             <a:fld id="{051F961C-2C06-44AD-B09C-3FDB0903E3DD}" type="datetimeFigureOut">
               <a:rPr lang="en-US" smtClean="0"/>
-              <a:t>4/28/2019</a:t>
+              <a:t>5/9/2019</a:t>
             </a:fld>
             <a:endParaRPr lang="en-US"/>
           </a:p>
@@ -1077,7 +1091,7 @@
           <a:p>
             <a:fld id="{051F961C-2C06-44AD-B09C-3FDB0903E3DD}" type="datetimeFigureOut">
               <a:rPr lang="en-US" smtClean="0"/>
-              <a:t>4/28/2019</a:t>
+              <a:t>5/9/2019</a:t>
             </a:fld>
             <a:endParaRPr lang="en-US"/>
           </a:p>
@@ -1251,7 +1265,7 @@
           <a:p>
             <a:fld id="{051F961C-2C06-44AD-B09C-3FDB0903E3DD}" type="datetimeFigureOut">
               <a:rPr lang="en-US" smtClean="0"/>
-              <a:t>4/28/2019</a:t>
+              <a:t>5/9/2019</a:t>
             </a:fld>
             <a:endParaRPr lang="en-US"/>
           </a:p>
@@ -1485,7 +1499,7 @@
           <a:p>
             <a:fld id="{051F961C-2C06-44AD-B09C-3FDB0903E3DD}" type="datetimeFigureOut">
               <a:rPr lang="en-US" smtClean="0"/>
-              <a:t>4/28/2019</a:t>
+              <a:t>5/9/2019</a:t>
             </a:fld>
             <a:endParaRPr lang="en-US"/>
           </a:p>
@@ -1753,7 +1767,7 @@
           <a:p>
             <a:fld id="{051F961C-2C06-44AD-B09C-3FDB0903E3DD}" type="datetimeFigureOut">
               <a:rPr lang="en-US" smtClean="0"/>
-              <a:t>4/28/2019</a:t>
+              <a:t>5/9/2019</a:t>
             </a:fld>
             <a:endParaRPr lang="en-US"/>
           </a:p>
@@ -1972,7 +1986,7 @@
           <a:p>
             <a:fld id="{051F961C-2C06-44AD-B09C-3FDB0903E3DD}" type="datetimeFigureOut">
               <a:rPr lang="en-US" smtClean="0"/>
-              <a:t>4/28/2019</a:t>
+              <a:t>5/9/2019</a:t>
             </a:fld>
             <a:endParaRPr lang="en-US"/>
           </a:p>
@@ -2323,7 +2337,7 @@
           <a:p>
             <a:fld id="{051F961C-2C06-44AD-B09C-3FDB0903E3DD}" type="datetimeFigureOut">
               <a:rPr lang="en-US" smtClean="0"/>
-              <a:t>4/28/2019</a:t>
+              <a:t>5/9/2019</a:t>
             </a:fld>
             <a:endParaRPr lang="en-US"/>
           </a:p>
@@ -2554,7 +2568,7 @@
           <a:p>
             <a:fld id="{051F961C-2C06-44AD-B09C-3FDB0903E3DD}" type="datetimeFigureOut">
               <a:rPr lang="en-US" smtClean="0"/>
-              <a:t>4/28/2019</a:t>
+              <a:t>5/9/2019</a:t>
             </a:fld>
             <a:endParaRPr lang="en-US"/>
           </a:p>
@@ -2694,7 +2708,7 @@
           <a:p>
             <a:fld id="{051F961C-2C06-44AD-B09C-3FDB0903E3DD}" type="datetimeFigureOut">
               <a:rPr lang="en-US" smtClean="0"/>
-              <a:t>4/28/2019</a:t>
+              <a:t>5/9/2019</a:t>
             </a:fld>
             <a:endParaRPr lang="en-US"/>
           </a:p>
@@ -2970,7 +2984,7 @@
           <a:p>
             <a:fld id="{051F961C-2C06-44AD-B09C-3FDB0903E3DD}" type="datetimeFigureOut">
               <a:rPr lang="en-US" smtClean="0"/>
-              <a:t>4/28/2019</a:t>
+              <a:t>5/9/2019</a:t>
             </a:fld>
             <a:endParaRPr lang="en-US"/>
           </a:p>
@@ -3376,7 +3390,7 @@
           <a:p>
             <a:fld id="{051F961C-2C06-44AD-B09C-3FDB0903E3DD}" type="datetimeFigureOut">
               <a:rPr lang="en-US" smtClean="0"/>
-              <a:t>4/28/2019</a:t>
+              <a:t>5/9/2019</a:t>
             </a:fld>
             <a:endParaRPr lang="en-US"/>
           </a:p>
@@ -3712,7 +3726,7 @@
           <a:p>
             <a:fld id="{051F961C-2C06-44AD-B09C-3FDB0903E3DD}" type="datetimeFigureOut">
               <a:rPr lang="en-US" smtClean="0"/>
-              <a:t>4/28/2019</a:t>
+              <a:t>5/9/2019</a:t>
             </a:fld>
             <a:endParaRPr lang="en-US"/>
           </a:p>
@@ -14518,8 +14532,8 @@
         </p:nvSpPr>
         <p:spPr>
           <a:xfrm>
-            <a:off x="3124200" y="3124199"/>
-            <a:ext cx="2104230" cy="646331"/>
+            <a:off x="1432804" y="3105834"/>
+            <a:ext cx="6278449" cy="646331"/>
           </a:xfrm>
           <a:prstGeom prst="rect">
             <a:avLst/>
@@ -14532,12 +14546,13 @@
           </a:bodyPr>
           <a:lstStyle/>
           <a:p>
+            <a:pPr algn="ctr"/>
             <a:r>
               <a:rPr lang="en-US" sz="3600" dirty="0">
                 <a:latin typeface="Calibri" pitchFamily="34" charset="0"/>
                 <a:cs typeface="Calibri" pitchFamily="34" charset="0"/>
               </a:rPr>
-              <a:t>Thank You</a:t>
+              <a:t>Approaches of Linear Regression</a:t>
             </a:r>
           </a:p>
         </p:txBody>
@@ -14545,7 +14560,233 @@
     </p:spTree>
     <p:extLst>
       <p:ext uri="{BB962C8B-B14F-4D97-AF65-F5344CB8AC3E}">
-        <p14:creationId xmlns:p14="http://schemas.microsoft.com/office/powerpoint/2010/main" val="4085703393"/>
+        <p14:creationId xmlns:p14="http://schemas.microsoft.com/office/powerpoint/2010/main" val="1408859139"/>
+      </p:ext>
+    </p:extLst>
+  </p:cSld>
+  <p:clrMapOvr>
+    <a:masterClrMapping/>
+  </p:clrMapOvr>
+</p:sld>
+</file>
+
+<file path=ppt/slides/slide49.xml><?xml version="1.0" encoding="utf-8"?>
+<p:sld xmlns:a="http://schemas.openxmlformats.org/drawingml/2006/main" xmlns:r="http://schemas.openxmlformats.org/officeDocument/2006/relationships" xmlns:p="http://schemas.openxmlformats.org/presentationml/2006/main">
+  <p:cSld>
+    <p:spTree>
+      <p:nvGrpSpPr>
+        <p:cNvPr id="1" name=""/>
+        <p:cNvGrpSpPr/>
+        <p:nvPr/>
+      </p:nvGrpSpPr>
+      <p:grpSpPr>
+        <a:xfrm>
+          <a:off x="0" y="0"/>
+          <a:ext cx="0" cy="0"/>
+          <a:chOff x="0" y="0"/>
+          <a:chExt cx="0" cy="0"/>
+        </a:xfrm>
+      </p:grpSpPr>
+      <p:sp>
+        <p:nvSpPr>
+          <p:cNvPr id="2" name="TextBox 1"/>
+          <p:cNvSpPr txBox="1"/>
+          <p:nvPr/>
+        </p:nvSpPr>
+        <p:spPr>
+          <a:xfrm>
+            <a:off x="1159833" y="457201"/>
+            <a:ext cx="6278449" cy="646331"/>
+          </a:xfrm>
+          <a:prstGeom prst="rect">
+            <a:avLst/>
+          </a:prstGeom>
+          <a:noFill/>
+        </p:spPr>
+        <p:txBody>
+          <a:bodyPr wrap="none" rtlCol="0">
+            <a:spAutoFit/>
+          </a:bodyPr>
+          <a:lstStyle/>
+          <a:p>
+            <a:pPr algn="ctr"/>
+            <a:r>
+              <a:rPr lang="en-US" sz="3600" dirty="0">
+                <a:latin typeface="Calibri" pitchFamily="34" charset="0"/>
+                <a:cs typeface="Calibri" pitchFamily="34" charset="0"/>
+              </a:rPr>
+              <a:t>Approaches of Linear Regression</a:t>
+            </a:r>
+          </a:p>
+        </p:txBody>
+      </p:sp>
+      <p:sp>
+        <p:nvSpPr>
+          <p:cNvPr id="6" name="TextBox 5">
+            <a:extLst>
+              <a:ext uri="{FF2B5EF4-FFF2-40B4-BE49-F238E27FC236}">
+                <a16:creationId xmlns:a16="http://schemas.microsoft.com/office/drawing/2014/main" id="{A3585BB0-2513-4FD6-9854-13BEBA99DD39}"/>
+              </a:ext>
+            </a:extLst>
+          </p:cNvPr>
+          <p:cNvSpPr txBox="1"/>
+          <p:nvPr/>
+        </p:nvSpPr>
+        <p:spPr>
+          <a:xfrm>
+            <a:off x="752622" y="1371600"/>
+            <a:ext cx="7934178" cy="3170099"/>
+          </a:xfrm>
+          <a:prstGeom prst="rect">
+            <a:avLst/>
+          </a:prstGeom>
+          <a:noFill/>
+        </p:spPr>
+        <p:txBody>
+          <a:bodyPr wrap="square" rtlCol="0">
+            <a:spAutoFit/>
+          </a:bodyPr>
+          <a:lstStyle/>
+          <a:p>
+            <a:r>
+              <a:rPr lang="en-US" sz="2000" b="1" dirty="0">
+                <a:latin typeface="Calibri" pitchFamily="34" charset="0"/>
+                <a:cs typeface="Calibri" pitchFamily="34" charset="0"/>
+              </a:rPr>
+              <a:t>Popular methods of building models:</a:t>
+            </a:r>
+          </a:p>
+          <a:p>
+            <a:pPr marL="457200" indent="-457200">
+              <a:buFont typeface="+mj-lt"/>
+              <a:buAutoNum type="arabicPeriod"/>
+            </a:pPr>
+            <a:r>
+              <a:rPr lang="en-US" sz="2000" dirty="0">
+                <a:latin typeface="Calibri" pitchFamily="34" charset="0"/>
+                <a:cs typeface="Calibri" pitchFamily="34" charset="0"/>
+              </a:rPr>
+              <a:t>All in</a:t>
+            </a:r>
+          </a:p>
+          <a:p>
+            <a:pPr marL="457200" indent="-457200">
+              <a:buFont typeface="+mj-lt"/>
+              <a:buAutoNum type="arabicPeriod"/>
+            </a:pPr>
+            <a:r>
+              <a:rPr lang="en-US" sz="2000" dirty="0">
+                <a:latin typeface="Calibri" pitchFamily="34" charset="0"/>
+                <a:cs typeface="Calibri" pitchFamily="34" charset="0"/>
+              </a:rPr>
+              <a:t>Backward Elimination</a:t>
+            </a:r>
+          </a:p>
+          <a:p>
+            <a:pPr marL="457200" indent="-457200">
+              <a:buFont typeface="+mj-lt"/>
+              <a:buAutoNum type="arabicPeriod"/>
+            </a:pPr>
+            <a:r>
+              <a:rPr lang="en-US" sz="2000" dirty="0">
+                <a:latin typeface="Calibri" pitchFamily="34" charset="0"/>
+                <a:cs typeface="Calibri" pitchFamily="34" charset="0"/>
+              </a:rPr>
+              <a:t>Forward Selection</a:t>
+            </a:r>
+          </a:p>
+          <a:p>
+            <a:pPr marL="457200" indent="-457200">
+              <a:buFont typeface="+mj-lt"/>
+              <a:buAutoNum type="arabicPeriod"/>
+            </a:pPr>
+            <a:r>
+              <a:rPr lang="en-US" sz="2000" dirty="0">
+                <a:latin typeface="Calibri" pitchFamily="34" charset="0"/>
+                <a:cs typeface="Calibri" pitchFamily="34" charset="0"/>
+              </a:rPr>
+              <a:t>Bidirectional Elimination</a:t>
+            </a:r>
+          </a:p>
+          <a:p>
+            <a:pPr marL="457200" indent="-457200">
+              <a:buFont typeface="+mj-lt"/>
+              <a:buAutoNum type="arabicPeriod"/>
+            </a:pPr>
+            <a:r>
+              <a:rPr lang="en-US" sz="2000" dirty="0">
+                <a:latin typeface="Calibri" pitchFamily="34" charset="0"/>
+                <a:cs typeface="Calibri" pitchFamily="34" charset="0"/>
+              </a:rPr>
+              <a:t>Score Comparison</a:t>
+            </a:r>
+          </a:p>
+          <a:p>
+            <a:pPr marL="457200" indent="-457200">
+              <a:buFont typeface="+mj-lt"/>
+              <a:buAutoNum type="arabicPeriod"/>
+            </a:pPr>
+            <a:endParaRPr lang="en-US" sz="2000" dirty="0">
+              <a:latin typeface="Calibri" pitchFamily="34" charset="0"/>
+              <a:cs typeface="Calibri" pitchFamily="34" charset="0"/>
+            </a:endParaRPr>
+          </a:p>
+          <a:p>
+            <a:r>
+              <a:rPr lang="en-US" sz="2000" b="1" dirty="0">
+                <a:latin typeface="Calibri" pitchFamily="34" charset="0"/>
+                <a:cs typeface="Calibri" pitchFamily="34" charset="0"/>
+              </a:rPr>
+              <a:t>Note: Backward, Forward and Bi-direction are called as </a:t>
+            </a:r>
+            <a:r>
+              <a:rPr lang="en-US" sz="2000" b="1" dirty="0">
+                <a:solidFill>
+                  <a:srgbClr val="C00000"/>
+                </a:solidFill>
+                <a:latin typeface="Calibri" pitchFamily="34" charset="0"/>
+                <a:cs typeface="Calibri" pitchFamily="34" charset="0"/>
+              </a:rPr>
+              <a:t>Stepwise Regression. </a:t>
+            </a:r>
+            <a:r>
+              <a:rPr lang="en-US" sz="2000" b="1" dirty="0">
+                <a:latin typeface="Calibri" pitchFamily="34" charset="0"/>
+                <a:cs typeface="Calibri" pitchFamily="34" charset="0"/>
+              </a:rPr>
+              <a:t>However, sometimes, if we refer Stepwise Regression, generally </a:t>
+            </a:r>
+            <a:r>
+              <a:rPr lang="en-US" sz="2000" b="1" dirty="0">
+                <a:solidFill>
+                  <a:srgbClr val="C00000"/>
+                </a:solidFill>
+                <a:latin typeface="Calibri" pitchFamily="34" charset="0"/>
+                <a:cs typeface="Calibri" pitchFamily="34" charset="0"/>
+              </a:rPr>
+              <a:t>Bi-directional Elimination </a:t>
+            </a:r>
+            <a:r>
+              <a:rPr lang="en-US" sz="2000" b="1" dirty="0">
+                <a:latin typeface="Calibri" pitchFamily="34" charset="0"/>
+                <a:cs typeface="Calibri" pitchFamily="34" charset="0"/>
+              </a:rPr>
+              <a:t>is considered</a:t>
+            </a:r>
+            <a:endParaRPr lang="en-US" sz="2000" b="1" dirty="0">
+              <a:solidFill>
+                <a:srgbClr val="C00000"/>
+              </a:solidFill>
+              <a:latin typeface="Calibri" pitchFamily="34" charset="0"/>
+              <a:cs typeface="Calibri" pitchFamily="34" charset="0"/>
+            </a:endParaRPr>
+          </a:p>
+        </p:txBody>
+      </p:sp>
+    </p:spTree>
+    <p:extLst>
+      <p:ext uri="{BB962C8B-B14F-4D97-AF65-F5344CB8AC3E}">
+        <p14:creationId xmlns:p14="http://schemas.microsoft.com/office/powerpoint/2010/main" val="1536775577"/>
       </p:ext>
     </p:extLst>
   </p:cSld>
@@ -14638,6 +14879,1476 @@
     <p:extLst>
       <p:ext uri="{BB962C8B-B14F-4D97-AF65-F5344CB8AC3E}">
         <p14:creationId xmlns:p14="http://schemas.microsoft.com/office/powerpoint/2010/main" val="2807016176"/>
+      </p:ext>
+    </p:extLst>
+  </p:cSld>
+  <p:clrMapOvr>
+    <a:masterClrMapping/>
+  </p:clrMapOvr>
+</p:sld>
+</file>
+
+<file path=ppt/slides/slide50.xml><?xml version="1.0" encoding="utf-8"?>
+<p:sld xmlns:a="http://schemas.openxmlformats.org/drawingml/2006/main" xmlns:r="http://schemas.openxmlformats.org/officeDocument/2006/relationships" xmlns:p="http://schemas.openxmlformats.org/presentationml/2006/main">
+  <p:cSld>
+    <p:spTree>
+      <p:nvGrpSpPr>
+        <p:cNvPr id="1" name=""/>
+        <p:cNvGrpSpPr/>
+        <p:nvPr/>
+      </p:nvGrpSpPr>
+      <p:grpSpPr>
+        <a:xfrm>
+          <a:off x="0" y="0"/>
+          <a:ext cx="0" cy="0"/>
+          <a:chOff x="0" y="0"/>
+          <a:chExt cx="0" cy="0"/>
+        </a:xfrm>
+      </p:grpSpPr>
+      <p:sp>
+        <p:nvSpPr>
+          <p:cNvPr id="2" name="TextBox 1"/>
+          <p:cNvSpPr txBox="1"/>
+          <p:nvPr/>
+        </p:nvSpPr>
+        <p:spPr>
+          <a:xfrm>
+            <a:off x="1159833" y="457201"/>
+            <a:ext cx="6278449" cy="646331"/>
+          </a:xfrm>
+          <a:prstGeom prst="rect">
+            <a:avLst/>
+          </a:prstGeom>
+          <a:noFill/>
+        </p:spPr>
+        <p:txBody>
+          <a:bodyPr wrap="none" rtlCol="0">
+            <a:spAutoFit/>
+          </a:bodyPr>
+          <a:lstStyle/>
+          <a:p>
+            <a:pPr algn="ctr"/>
+            <a:r>
+              <a:rPr lang="en-US" sz="3600" dirty="0">
+                <a:latin typeface="Calibri" pitchFamily="34" charset="0"/>
+                <a:cs typeface="Calibri" pitchFamily="34" charset="0"/>
+              </a:rPr>
+              <a:t>Approaches of Linear Regression</a:t>
+            </a:r>
+          </a:p>
+        </p:txBody>
+      </p:sp>
+      <p:sp>
+        <p:nvSpPr>
+          <p:cNvPr id="6" name="TextBox 5">
+            <a:extLst>
+              <a:ext uri="{FF2B5EF4-FFF2-40B4-BE49-F238E27FC236}">
+                <a16:creationId xmlns:a16="http://schemas.microsoft.com/office/drawing/2014/main" id="{A3585BB0-2513-4FD6-9854-13BEBA99DD39}"/>
+              </a:ext>
+            </a:extLst>
+          </p:cNvPr>
+          <p:cNvSpPr txBox="1"/>
+          <p:nvPr/>
+        </p:nvSpPr>
+        <p:spPr>
+          <a:xfrm>
+            <a:off x="752622" y="1371600"/>
+            <a:ext cx="7934178" cy="1323439"/>
+          </a:xfrm>
+          <a:prstGeom prst="rect">
+            <a:avLst/>
+          </a:prstGeom>
+          <a:noFill/>
+        </p:spPr>
+        <p:txBody>
+          <a:bodyPr wrap="square" rtlCol="0">
+            <a:spAutoFit/>
+          </a:bodyPr>
+          <a:lstStyle/>
+          <a:p>
+            <a:r>
+              <a:rPr lang="en-US" sz="2000" b="1" dirty="0">
+                <a:latin typeface="Calibri" pitchFamily="34" charset="0"/>
+                <a:cs typeface="Calibri" pitchFamily="34" charset="0"/>
+              </a:rPr>
+              <a:t>“All – in” – cases:</a:t>
+            </a:r>
+          </a:p>
+          <a:p>
+            <a:pPr marL="342900" indent="-342900">
+              <a:buFont typeface="Arial" panose="020B0604020202020204" pitchFamily="34" charset="0"/>
+              <a:buChar char="•"/>
+            </a:pPr>
+            <a:r>
+              <a:rPr lang="en-US" sz="2000" dirty="0">
+                <a:latin typeface="Calibri" pitchFamily="34" charset="0"/>
+                <a:cs typeface="Calibri" pitchFamily="34" charset="0"/>
+              </a:rPr>
+              <a:t>Prior knowledge of features that all features are important</a:t>
+            </a:r>
+          </a:p>
+          <a:p>
+            <a:pPr marL="342900" indent="-342900">
+              <a:buFont typeface="Arial" panose="020B0604020202020204" pitchFamily="34" charset="0"/>
+              <a:buChar char="•"/>
+            </a:pPr>
+            <a:r>
+              <a:rPr lang="en-US" sz="2000" dirty="0">
+                <a:latin typeface="Calibri" pitchFamily="34" charset="0"/>
+                <a:cs typeface="Calibri" pitchFamily="34" charset="0"/>
+              </a:rPr>
+              <a:t>Or you have to put all features into modelling</a:t>
+            </a:r>
+          </a:p>
+          <a:p>
+            <a:pPr marL="342900" indent="-342900">
+              <a:buFont typeface="Arial" panose="020B0604020202020204" pitchFamily="34" charset="0"/>
+              <a:buChar char="•"/>
+            </a:pPr>
+            <a:r>
+              <a:rPr lang="en-US" sz="2000" dirty="0">
+                <a:latin typeface="Calibri" pitchFamily="34" charset="0"/>
+                <a:cs typeface="Calibri" pitchFamily="34" charset="0"/>
+              </a:rPr>
+              <a:t>Or you are preparing for Backward Elimination</a:t>
+            </a:r>
+          </a:p>
+        </p:txBody>
+      </p:sp>
+      <p:pic>
+        <p:nvPicPr>
+          <p:cNvPr id="3" name="Picture 2">
+            <a:extLst>
+              <a:ext uri="{FF2B5EF4-FFF2-40B4-BE49-F238E27FC236}">
+                <a16:creationId xmlns:a16="http://schemas.microsoft.com/office/drawing/2014/main" id="{A181B6AB-6B44-42A2-8400-E221C2A60A3F}"/>
+              </a:ext>
+            </a:extLst>
+          </p:cNvPr>
+          <p:cNvPicPr>
+            <a:picLocks noChangeAspect="1"/>
+          </p:cNvPicPr>
+          <p:nvPr/>
+        </p:nvPicPr>
+        <p:blipFill>
+          <a:blip r:embed="rId2"/>
+          <a:stretch>
+            <a:fillRect/>
+          </a:stretch>
+        </p:blipFill>
+        <p:spPr>
+          <a:xfrm>
+            <a:off x="2133600" y="3124200"/>
+            <a:ext cx="3924300" cy="2657475"/>
+          </a:xfrm>
+          <a:prstGeom prst="rect">
+            <a:avLst/>
+          </a:prstGeom>
+        </p:spPr>
+      </p:pic>
+    </p:spTree>
+    <p:extLst>
+      <p:ext uri="{BB962C8B-B14F-4D97-AF65-F5344CB8AC3E}">
+        <p14:creationId xmlns:p14="http://schemas.microsoft.com/office/powerpoint/2010/main" val="190189655"/>
+      </p:ext>
+    </p:extLst>
+  </p:cSld>
+  <p:clrMapOvr>
+    <a:masterClrMapping/>
+  </p:clrMapOvr>
+</p:sld>
+</file>
+
+<file path=ppt/slides/slide51.xml><?xml version="1.0" encoding="utf-8"?>
+<p:sld xmlns:a="http://schemas.openxmlformats.org/drawingml/2006/main" xmlns:r="http://schemas.openxmlformats.org/officeDocument/2006/relationships" xmlns:p="http://schemas.openxmlformats.org/presentationml/2006/main">
+  <p:cSld>
+    <p:spTree>
+      <p:nvGrpSpPr>
+        <p:cNvPr id="1" name=""/>
+        <p:cNvGrpSpPr/>
+        <p:nvPr/>
+      </p:nvGrpSpPr>
+      <p:grpSpPr>
+        <a:xfrm>
+          <a:off x="0" y="0"/>
+          <a:ext cx="0" cy="0"/>
+          <a:chOff x="0" y="0"/>
+          <a:chExt cx="0" cy="0"/>
+        </a:xfrm>
+      </p:grpSpPr>
+      <p:sp>
+        <p:nvSpPr>
+          <p:cNvPr id="2" name="TextBox 1"/>
+          <p:cNvSpPr txBox="1"/>
+          <p:nvPr/>
+        </p:nvSpPr>
+        <p:spPr>
+          <a:xfrm>
+            <a:off x="1159833" y="457201"/>
+            <a:ext cx="6278449" cy="646331"/>
+          </a:xfrm>
+          <a:prstGeom prst="rect">
+            <a:avLst/>
+          </a:prstGeom>
+          <a:noFill/>
+        </p:spPr>
+        <p:txBody>
+          <a:bodyPr wrap="none" rtlCol="0">
+            <a:spAutoFit/>
+          </a:bodyPr>
+          <a:lstStyle/>
+          <a:p>
+            <a:pPr algn="ctr"/>
+            <a:r>
+              <a:rPr lang="en-US" sz="3600" dirty="0">
+                <a:latin typeface="Calibri" pitchFamily="34" charset="0"/>
+                <a:cs typeface="Calibri" pitchFamily="34" charset="0"/>
+              </a:rPr>
+              <a:t>Approaches of Linear Regression</a:t>
+            </a:r>
+          </a:p>
+        </p:txBody>
+      </p:sp>
+      <p:grpSp>
+        <p:nvGrpSpPr>
+          <p:cNvPr id="7" name="Group 6">
+            <a:extLst>
+              <a:ext uri="{FF2B5EF4-FFF2-40B4-BE49-F238E27FC236}">
+                <a16:creationId xmlns:a16="http://schemas.microsoft.com/office/drawing/2014/main" id="{DF765C14-F63A-4BEC-91BB-29D31E67F62E}"/>
+              </a:ext>
+            </a:extLst>
+          </p:cNvPr>
+          <p:cNvGrpSpPr/>
+          <p:nvPr/>
+        </p:nvGrpSpPr>
+        <p:grpSpPr>
+          <a:xfrm>
+            <a:off x="455302" y="1371600"/>
+            <a:ext cx="8528822" cy="4401205"/>
+            <a:chOff x="455302" y="1371600"/>
+            <a:chExt cx="8528822" cy="4401205"/>
+          </a:xfrm>
+        </p:grpSpPr>
+        <p:sp>
+          <p:nvSpPr>
+            <p:cNvPr id="6" name="TextBox 5">
+              <a:extLst>
+                <a:ext uri="{FF2B5EF4-FFF2-40B4-BE49-F238E27FC236}">
+                  <a16:creationId xmlns:a16="http://schemas.microsoft.com/office/drawing/2014/main" id="{A3585BB0-2513-4FD6-9854-13BEBA99DD39}"/>
+                </a:ext>
+              </a:extLst>
+            </p:cNvPr>
+            <p:cNvSpPr txBox="1"/>
+            <p:nvPr/>
+          </p:nvSpPr>
+          <p:spPr>
+            <a:xfrm>
+              <a:off x="1049946" y="1371600"/>
+              <a:ext cx="7934178" cy="4401205"/>
+            </a:xfrm>
+            <a:prstGeom prst="rect">
+              <a:avLst/>
+            </a:prstGeom>
+            <a:noFill/>
+          </p:spPr>
+          <p:txBody>
+            <a:bodyPr wrap="square" rtlCol="0">
+              <a:spAutoFit/>
+            </a:bodyPr>
+            <a:lstStyle/>
+            <a:p>
+              <a:r>
+                <a:rPr lang="en-US" sz="2000" b="1" dirty="0">
+                  <a:latin typeface="Calibri" pitchFamily="34" charset="0"/>
+                  <a:cs typeface="Calibri" pitchFamily="34" charset="0"/>
+                </a:rPr>
+                <a:t>Backward Elimination:</a:t>
+              </a:r>
+            </a:p>
+            <a:p>
+              <a:r>
+                <a:rPr lang="en-US" sz="2000" b="1" dirty="0">
+                  <a:latin typeface="Calibri" pitchFamily="34" charset="0"/>
+                  <a:cs typeface="Calibri" pitchFamily="34" charset="0"/>
+                </a:rPr>
+                <a:t>Step 1: </a:t>
+              </a:r>
+              <a:r>
+                <a:rPr lang="en-US" sz="2000" dirty="0">
+                  <a:latin typeface="Calibri" pitchFamily="34" charset="0"/>
+                  <a:cs typeface="Calibri" pitchFamily="34" charset="0"/>
+                </a:rPr>
+                <a:t>Select a significance level to stay in the model (e.g. SL = 0.05)</a:t>
+              </a:r>
+            </a:p>
+            <a:p>
+              <a:endParaRPr lang="en-US" sz="2000" b="1" dirty="0">
+                <a:latin typeface="Calibri" pitchFamily="34" charset="0"/>
+                <a:cs typeface="Calibri" pitchFamily="34" charset="0"/>
+              </a:endParaRPr>
+            </a:p>
+            <a:p>
+              <a:r>
+                <a:rPr lang="en-US" sz="2000" b="1" dirty="0">
+                  <a:latin typeface="Calibri" pitchFamily="34" charset="0"/>
+                  <a:cs typeface="Calibri" pitchFamily="34" charset="0"/>
+                </a:rPr>
+                <a:t>Step 2: </a:t>
+              </a:r>
+              <a:r>
+                <a:rPr lang="en-US" sz="2000" dirty="0">
+                  <a:latin typeface="Calibri" pitchFamily="34" charset="0"/>
+                  <a:cs typeface="Calibri" pitchFamily="34" charset="0"/>
+                </a:rPr>
+                <a:t>Fit the full model with all possible predictors (All-in approach)</a:t>
+              </a:r>
+            </a:p>
+            <a:p>
+              <a:endParaRPr lang="en-US" sz="2000" b="1" dirty="0">
+                <a:latin typeface="Calibri" pitchFamily="34" charset="0"/>
+                <a:cs typeface="Calibri" pitchFamily="34" charset="0"/>
+              </a:endParaRPr>
+            </a:p>
+            <a:p>
+              <a:r>
+                <a:rPr lang="en-US" sz="2000" b="1" dirty="0">
+                  <a:latin typeface="Calibri" pitchFamily="34" charset="0"/>
+                  <a:cs typeface="Calibri" pitchFamily="34" charset="0"/>
+                </a:rPr>
+                <a:t>Step 3: </a:t>
+              </a:r>
+              <a:r>
+                <a:rPr lang="en-US" sz="2000" dirty="0">
+                  <a:latin typeface="Calibri" pitchFamily="34" charset="0"/>
+                  <a:cs typeface="Calibri" pitchFamily="34" charset="0"/>
+                </a:rPr>
+                <a:t>Consider the predictor with highest p-value (Basically check for non-significant features/predictors)</a:t>
+              </a:r>
+            </a:p>
+            <a:p>
+              <a:endParaRPr lang="en-US" sz="2000" b="1" dirty="0">
+                <a:latin typeface="Calibri" pitchFamily="34" charset="0"/>
+                <a:cs typeface="Calibri" pitchFamily="34" charset="0"/>
+              </a:endParaRPr>
+            </a:p>
+            <a:p>
+              <a:r>
+                <a:rPr lang="en-US" sz="2000" b="1" dirty="0">
+                  <a:latin typeface="Calibri" pitchFamily="34" charset="0"/>
+                  <a:cs typeface="Calibri" pitchFamily="34" charset="0"/>
+                </a:rPr>
+                <a:t>If p-value &gt; SL, proceed to Step 4, else FINISH</a:t>
+              </a:r>
+            </a:p>
+            <a:p>
+              <a:endParaRPr lang="en-US" sz="2000" b="1" dirty="0">
+                <a:latin typeface="Calibri" pitchFamily="34" charset="0"/>
+                <a:cs typeface="Calibri" pitchFamily="34" charset="0"/>
+              </a:endParaRPr>
+            </a:p>
+            <a:p>
+              <a:r>
+                <a:rPr lang="en-US" sz="2000" b="1" dirty="0">
+                  <a:latin typeface="Calibri" pitchFamily="34" charset="0"/>
+                  <a:cs typeface="Calibri" pitchFamily="34" charset="0"/>
+                </a:rPr>
+                <a:t>Step 4:</a:t>
+              </a:r>
+              <a:r>
+                <a:rPr lang="en-US" sz="2000" dirty="0">
+                  <a:latin typeface="Calibri" pitchFamily="34" charset="0"/>
+                  <a:cs typeface="Calibri" pitchFamily="34" charset="0"/>
+                </a:rPr>
+                <a:t> Remove the predictor/feature/variable with highest p-value</a:t>
+              </a:r>
+            </a:p>
+            <a:p>
+              <a:endParaRPr lang="en-US" sz="2000" b="1" dirty="0">
+                <a:latin typeface="Calibri" pitchFamily="34" charset="0"/>
+                <a:cs typeface="Calibri" pitchFamily="34" charset="0"/>
+              </a:endParaRPr>
+            </a:p>
+            <a:p>
+              <a:r>
+                <a:rPr lang="en-US" sz="2000" b="1" dirty="0">
+                  <a:latin typeface="Calibri" pitchFamily="34" charset="0"/>
+                  <a:cs typeface="Calibri" pitchFamily="34" charset="0"/>
+                </a:rPr>
+                <a:t>Step 5: </a:t>
+              </a:r>
+              <a:r>
+                <a:rPr lang="en-US" sz="2000" dirty="0">
+                  <a:latin typeface="Calibri" pitchFamily="34" charset="0"/>
+                  <a:cs typeface="Calibri" pitchFamily="34" charset="0"/>
+                </a:rPr>
+                <a:t>Fit model without this variable(s). </a:t>
+              </a:r>
+            </a:p>
+            <a:p>
+              <a:endParaRPr lang="en-US" sz="2000" b="1" dirty="0">
+                <a:latin typeface="Calibri" pitchFamily="34" charset="0"/>
+                <a:cs typeface="Calibri" pitchFamily="34" charset="0"/>
+              </a:endParaRPr>
+            </a:p>
+          </p:txBody>
+        </p:sp>
+        <p:sp>
+          <p:nvSpPr>
+            <p:cNvPr id="5" name="Arrow: Curved Up 4">
+              <a:extLst>
+                <a:ext uri="{FF2B5EF4-FFF2-40B4-BE49-F238E27FC236}">
+                  <a16:creationId xmlns:a16="http://schemas.microsoft.com/office/drawing/2014/main" id="{BA2D761E-50A3-4533-BF59-AF77C6734674}"/>
+                </a:ext>
+              </a:extLst>
+            </p:cNvPr>
+            <p:cNvSpPr/>
+            <p:nvPr/>
+          </p:nvSpPr>
+          <p:spPr>
+            <a:xfrm rot="16200000" flipV="1">
+              <a:off x="-390377" y="3817477"/>
+              <a:ext cx="2286001" cy="594643"/>
+            </a:xfrm>
+            <a:prstGeom prst="curvedUpArrow">
+              <a:avLst/>
+            </a:prstGeom>
+            <a:solidFill>
+              <a:srgbClr val="00B050"/>
+            </a:solidFill>
+            <a:ln>
+              <a:solidFill>
+                <a:srgbClr val="00B050"/>
+              </a:solidFill>
+            </a:ln>
+          </p:spPr>
+          <p:style>
+            <a:lnRef idx="2">
+              <a:schemeClr val="accent1">
+                <a:shade val="50000"/>
+              </a:schemeClr>
+            </a:lnRef>
+            <a:fillRef idx="1">
+              <a:schemeClr val="accent1"/>
+            </a:fillRef>
+            <a:effectRef idx="0">
+              <a:schemeClr val="accent1"/>
+            </a:effectRef>
+            <a:fontRef idx="minor">
+              <a:schemeClr val="lt1"/>
+            </a:fontRef>
+          </p:style>
+          <p:txBody>
+            <a:bodyPr rtlCol="0" anchor="ctr"/>
+            <a:lstStyle/>
+            <a:p>
+              <a:pPr algn="ctr"/>
+              <a:endParaRPr lang="en-US" dirty="0">
+                <a:ln>
+                  <a:solidFill>
+                    <a:schemeClr val="tx1"/>
+                  </a:solidFill>
+                </a:ln>
+                <a:solidFill>
+                  <a:schemeClr val="tx1"/>
+                </a:solidFill>
+              </a:endParaRPr>
+            </a:p>
+          </p:txBody>
+        </p:sp>
+      </p:grpSp>
+    </p:spTree>
+    <p:extLst>
+      <p:ext uri="{BB962C8B-B14F-4D97-AF65-F5344CB8AC3E}">
+        <p14:creationId xmlns:p14="http://schemas.microsoft.com/office/powerpoint/2010/main" val="2934582161"/>
+      </p:ext>
+    </p:extLst>
+  </p:cSld>
+  <p:clrMapOvr>
+    <a:masterClrMapping/>
+  </p:clrMapOvr>
+</p:sld>
+</file>
+
+<file path=ppt/slides/slide52.xml><?xml version="1.0" encoding="utf-8"?>
+<p:sld xmlns:a="http://schemas.openxmlformats.org/drawingml/2006/main" xmlns:r="http://schemas.openxmlformats.org/officeDocument/2006/relationships" xmlns:p="http://schemas.openxmlformats.org/presentationml/2006/main">
+  <p:cSld>
+    <p:spTree>
+      <p:nvGrpSpPr>
+        <p:cNvPr id="1" name=""/>
+        <p:cNvGrpSpPr/>
+        <p:nvPr/>
+      </p:nvGrpSpPr>
+      <p:grpSpPr>
+        <a:xfrm>
+          <a:off x="0" y="0"/>
+          <a:ext cx="0" cy="0"/>
+          <a:chOff x="0" y="0"/>
+          <a:chExt cx="0" cy="0"/>
+        </a:xfrm>
+      </p:grpSpPr>
+      <p:sp>
+        <p:nvSpPr>
+          <p:cNvPr id="2" name="TextBox 1"/>
+          <p:cNvSpPr txBox="1"/>
+          <p:nvPr/>
+        </p:nvSpPr>
+        <p:spPr>
+          <a:xfrm>
+            <a:off x="1159833" y="457201"/>
+            <a:ext cx="6278449" cy="646331"/>
+          </a:xfrm>
+          <a:prstGeom prst="rect">
+            <a:avLst/>
+          </a:prstGeom>
+          <a:noFill/>
+        </p:spPr>
+        <p:txBody>
+          <a:bodyPr wrap="none" rtlCol="0">
+            <a:spAutoFit/>
+          </a:bodyPr>
+          <a:lstStyle/>
+          <a:p>
+            <a:pPr algn="ctr"/>
+            <a:r>
+              <a:rPr lang="en-US" sz="3600" dirty="0">
+                <a:latin typeface="Calibri" pitchFamily="34" charset="0"/>
+                <a:cs typeface="Calibri" pitchFamily="34" charset="0"/>
+              </a:rPr>
+              <a:t>Approaches of Linear Regression</a:t>
+            </a:r>
+          </a:p>
+        </p:txBody>
+      </p:sp>
+      <p:grpSp>
+        <p:nvGrpSpPr>
+          <p:cNvPr id="7" name="Group 6">
+            <a:extLst>
+              <a:ext uri="{FF2B5EF4-FFF2-40B4-BE49-F238E27FC236}">
+                <a16:creationId xmlns:a16="http://schemas.microsoft.com/office/drawing/2014/main" id="{DF765C14-F63A-4BEC-91BB-29D31E67F62E}"/>
+              </a:ext>
+            </a:extLst>
+          </p:cNvPr>
+          <p:cNvGrpSpPr/>
+          <p:nvPr/>
+        </p:nvGrpSpPr>
+        <p:grpSpPr>
+          <a:xfrm>
+            <a:off x="455300" y="1371600"/>
+            <a:ext cx="8528824" cy="3785652"/>
+            <a:chOff x="455300" y="1371600"/>
+            <a:chExt cx="8528824" cy="3785652"/>
+          </a:xfrm>
+        </p:grpSpPr>
+        <p:sp>
+          <p:nvSpPr>
+            <p:cNvPr id="6" name="TextBox 5">
+              <a:extLst>
+                <a:ext uri="{FF2B5EF4-FFF2-40B4-BE49-F238E27FC236}">
+                  <a16:creationId xmlns:a16="http://schemas.microsoft.com/office/drawing/2014/main" id="{A3585BB0-2513-4FD6-9854-13BEBA99DD39}"/>
+                </a:ext>
+              </a:extLst>
+            </p:cNvPr>
+            <p:cNvSpPr txBox="1"/>
+            <p:nvPr/>
+          </p:nvSpPr>
+          <p:spPr>
+            <a:xfrm>
+              <a:off x="1049946" y="1371600"/>
+              <a:ext cx="7934178" cy="3785652"/>
+            </a:xfrm>
+            <a:prstGeom prst="rect">
+              <a:avLst/>
+            </a:prstGeom>
+            <a:noFill/>
+          </p:spPr>
+          <p:txBody>
+            <a:bodyPr wrap="square" rtlCol="0">
+              <a:spAutoFit/>
+            </a:bodyPr>
+            <a:lstStyle/>
+            <a:p>
+              <a:r>
+                <a:rPr lang="en-US" sz="2000" b="1" dirty="0">
+                  <a:latin typeface="Calibri" pitchFamily="34" charset="0"/>
+                  <a:cs typeface="Calibri" pitchFamily="34" charset="0"/>
+                </a:rPr>
+                <a:t>Forward Selection: </a:t>
+              </a:r>
+            </a:p>
+            <a:p>
+              <a:r>
+                <a:rPr lang="en-US" sz="2000" b="1" dirty="0">
+                  <a:latin typeface="Calibri" pitchFamily="34" charset="0"/>
+                  <a:cs typeface="Calibri" pitchFamily="34" charset="0"/>
+                </a:rPr>
+                <a:t>Step 1: </a:t>
+              </a:r>
+              <a:r>
+                <a:rPr lang="en-US" sz="2000" dirty="0">
+                  <a:latin typeface="Calibri" pitchFamily="34" charset="0"/>
+                  <a:cs typeface="Calibri" pitchFamily="34" charset="0"/>
+                </a:rPr>
+                <a:t>Select a significance level to stay in the model (e.g. SL = 0.05)</a:t>
+              </a:r>
+            </a:p>
+            <a:p>
+              <a:endParaRPr lang="en-US" sz="2000" b="1" dirty="0">
+                <a:latin typeface="Calibri" pitchFamily="34" charset="0"/>
+                <a:cs typeface="Calibri" pitchFamily="34" charset="0"/>
+              </a:endParaRPr>
+            </a:p>
+            <a:p>
+              <a:r>
+                <a:rPr lang="en-US" sz="2000" b="1" dirty="0">
+                  <a:latin typeface="Calibri" pitchFamily="34" charset="0"/>
+                  <a:cs typeface="Calibri" pitchFamily="34" charset="0"/>
+                </a:rPr>
+                <a:t>Step 2: </a:t>
+              </a:r>
+              <a:r>
+                <a:rPr lang="en-US" sz="2000" dirty="0">
+                  <a:latin typeface="Calibri" pitchFamily="34" charset="0"/>
+                  <a:cs typeface="Calibri" pitchFamily="34" charset="0"/>
+                </a:rPr>
+                <a:t>Fit all simple regression models (y ~ </a:t>
+              </a:r>
+              <a:r>
+                <a:rPr lang="en-US" sz="2000" dirty="0" err="1">
+                  <a:latin typeface="Calibri" pitchFamily="34" charset="0"/>
+                  <a:cs typeface="Calibri" pitchFamily="34" charset="0"/>
+                </a:rPr>
+                <a:t>x</a:t>
+              </a:r>
+              <a:r>
+                <a:rPr lang="en-US" sz="2000" baseline="-25000" dirty="0" err="1">
+                  <a:latin typeface="Calibri" pitchFamily="34" charset="0"/>
+                  <a:cs typeface="Calibri" pitchFamily="34" charset="0"/>
+                </a:rPr>
+                <a:t>n</a:t>
+              </a:r>
+              <a:r>
+                <a:rPr lang="en-US" sz="2000" dirty="0">
+                  <a:latin typeface="Calibri" pitchFamily="34" charset="0"/>
+                  <a:cs typeface="Calibri" pitchFamily="34" charset="0"/>
+                </a:rPr>
+                <a:t> ). </a:t>
+              </a:r>
+            </a:p>
+            <a:p>
+              <a:r>
+                <a:rPr lang="en-US" sz="2000" dirty="0">
+                  <a:latin typeface="Calibri" pitchFamily="34" charset="0"/>
+                  <a:cs typeface="Calibri" pitchFamily="34" charset="0"/>
+                </a:rPr>
+                <a:t>Select the one with the lowest p-value</a:t>
+              </a:r>
+            </a:p>
+            <a:p>
+              <a:endParaRPr lang="en-US" sz="2000" dirty="0">
+                <a:latin typeface="Calibri" pitchFamily="34" charset="0"/>
+                <a:cs typeface="Calibri" pitchFamily="34" charset="0"/>
+              </a:endParaRPr>
+            </a:p>
+            <a:p>
+              <a:r>
+                <a:rPr lang="en-US" sz="2000" b="1" dirty="0">
+                  <a:latin typeface="Calibri" pitchFamily="34" charset="0"/>
+                  <a:cs typeface="Calibri" pitchFamily="34" charset="0"/>
+                </a:rPr>
+                <a:t>Step 3: </a:t>
+              </a:r>
+              <a:r>
+                <a:rPr lang="en-US" sz="2000" dirty="0">
+                  <a:latin typeface="Calibri" pitchFamily="34" charset="0"/>
+                  <a:cs typeface="Calibri" pitchFamily="34" charset="0"/>
+                </a:rPr>
+                <a:t>Keep this variable and fit all possible models with one extra predictor added to the one(s) you already have.</a:t>
+              </a:r>
+            </a:p>
+            <a:p>
+              <a:endParaRPr lang="en-US" sz="2000" b="1" dirty="0">
+                <a:latin typeface="Calibri" pitchFamily="34" charset="0"/>
+                <a:cs typeface="Calibri" pitchFamily="34" charset="0"/>
+              </a:endParaRPr>
+            </a:p>
+            <a:p>
+              <a:r>
+                <a:rPr lang="en-US" sz="2000" b="1" dirty="0">
+                  <a:latin typeface="Calibri" pitchFamily="34" charset="0"/>
+                  <a:cs typeface="Calibri" pitchFamily="34" charset="0"/>
+                </a:rPr>
+                <a:t>Step 4:</a:t>
+              </a:r>
+              <a:r>
+                <a:rPr lang="en-US" sz="2000" dirty="0">
+                  <a:latin typeface="Calibri" pitchFamily="34" charset="0"/>
+                  <a:cs typeface="Calibri" pitchFamily="34" charset="0"/>
+                </a:rPr>
+                <a:t> Consider the predictor with the lowest p-value. </a:t>
+              </a:r>
+            </a:p>
+            <a:p>
+              <a:r>
+                <a:rPr lang="en-US" sz="2000" b="1" dirty="0">
+                  <a:latin typeface="Calibri" pitchFamily="34" charset="0"/>
+                  <a:cs typeface="Calibri" pitchFamily="34" charset="0"/>
+                </a:rPr>
+                <a:t>If p &lt; SL, go to Step 3, otherwise FINISH.</a:t>
+              </a:r>
+            </a:p>
+            <a:p>
+              <a:endParaRPr lang="en-US" sz="2000" b="1" dirty="0">
+                <a:latin typeface="Calibri" pitchFamily="34" charset="0"/>
+                <a:cs typeface="Calibri" pitchFamily="34" charset="0"/>
+              </a:endParaRPr>
+            </a:p>
+          </p:txBody>
+        </p:sp>
+        <p:sp>
+          <p:nvSpPr>
+            <p:cNvPr id="5" name="Arrow: Curved Up 4">
+              <a:extLst>
+                <a:ext uri="{FF2B5EF4-FFF2-40B4-BE49-F238E27FC236}">
+                  <a16:creationId xmlns:a16="http://schemas.microsoft.com/office/drawing/2014/main" id="{BA2D761E-50A3-4533-BF59-AF77C6734674}"/>
+                </a:ext>
+              </a:extLst>
+            </p:cNvPr>
+            <p:cNvSpPr/>
+            <p:nvPr/>
+          </p:nvSpPr>
+          <p:spPr>
+            <a:xfrm rot="16200000" flipV="1">
+              <a:off x="143022" y="3588878"/>
+              <a:ext cx="1219200" cy="594643"/>
+            </a:xfrm>
+            <a:prstGeom prst="curvedUpArrow">
+              <a:avLst/>
+            </a:prstGeom>
+            <a:solidFill>
+              <a:srgbClr val="00B050"/>
+            </a:solidFill>
+            <a:ln>
+              <a:solidFill>
+                <a:srgbClr val="00B050"/>
+              </a:solidFill>
+            </a:ln>
+          </p:spPr>
+          <p:style>
+            <a:lnRef idx="2">
+              <a:schemeClr val="accent1">
+                <a:shade val="50000"/>
+              </a:schemeClr>
+            </a:lnRef>
+            <a:fillRef idx="1">
+              <a:schemeClr val="accent1"/>
+            </a:fillRef>
+            <a:effectRef idx="0">
+              <a:schemeClr val="accent1"/>
+            </a:effectRef>
+            <a:fontRef idx="minor">
+              <a:schemeClr val="lt1"/>
+            </a:fontRef>
+          </p:style>
+          <p:txBody>
+            <a:bodyPr rtlCol="0" anchor="ctr"/>
+            <a:lstStyle/>
+            <a:p>
+              <a:pPr algn="ctr"/>
+              <a:endParaRPr lang="en-US" dirty="0">
+                <a:ln>
+                  <a:solidFill>
+                    <a:schemeClr val="tx1"/>
+                  </a:solidFill>
+                </a:ln>
+                <a:solidFill>
+                  <a:schemeClr val="tx1"/>
+                </a:solidFill>
+              </a:endParaRPr>
+            </a:p>
+          </p:txBody>
+        </p:sp>
+      </p:grpSp>
+    </p:spTree>
+    <p:extLst>
+      <p:ext uri="{BB962C8B-B14F-4D97-AF65-F5344CB8AC3E}">
+        <p14:creationId xmlns:p14="http://schemas.microsoft.com/office/powerpoint/2010/main" val="3220744303"/>
+      </p:ext>
+    </p:extLst>
+  </p:cSld>
+  <p:clrMapOvr>
+    <a:masterClrMapping/>
+  </p:clrMapOvr>
+</p:sld>
+</file>
+
+<file path=ppt/slides/slide53.xml><?xml version="1.0" encoding="utf-8"?>
+<p:sld xmlns:a="http://schemas.openxmlformats.org/drawingml/2006/main" xmlns:r="http://schemas.openxmlformats.org/officeDocument/2006/relationships" xmlns:p="http://schemas.openxmlformats.org/presentationml/2006/main">
+  <p:cSld>
+    <p:spTree>
+      <p:nvGrpSpPr>
+        <p:cNvPr id="1" name=""/>
+        <p:cNvGrpSpPr/>
+        <p:nvPr/>
+      </p:nvGrpSpPr>
+      <p:grpSpPr>
+        <a:xfrm>
+          <a:off x="0" y="0"/>
+          <a:ext cx="0" cy="0"/>
+          <a:chOff x="0" y="0"/>
+          <a:chExt cx="0" cy="0"/>
+        </a:xfrm>
+      </p:grpSpPr>
+      <p:sp>
+        <p:nvSpPr>
+          <p:cNvPr id="2" name="TextBox 1"/>
+          <p:cNvSpPr txBox="1"/>
+          <p:nvPr/>
+        </p:nvSpPr>
+        <p:spPr>
+          <a:xfrm>
+            <a:off x="1159833" y="457201"/>
+            <a:ext cx="6278449" cy="646331"/>
+          </a:xfrm>
+          <a:prstGeom prst="rect">
+            <a:avLst/>
+          </a:prstGeom>
+          <a:noFill/>
+        </p:spPr>
+        <p:txBody>
+          <a:bodyPr wrap="none" rtlCol="0">
+            <a:spAutoFit/>
+          </a:bodyPr>
+          <a:lstStyle/>
+          <a:p>
+            <a:pPr algn="ctr"/>
+            <a:r>
+              <a:rPr lang="en-US" sz="3600" dirty="0">
+                <a:latin typeface="Calibri" pitchFamily="34" charset="0"/>
+                <a:cs typeface="Calibri" pitchFamily="34" charset="0"/>
+              </a:rPr>
+              <a:t>Approaches of Linear Regression</a:t>
+            </a:r>
+          </a:p>
+        </p:txBody>
+      </p:sp>
+      <p:grpSp>
+        <p:nvGrpSpPr>
+          <p:cNvPr id="7" name="Group 6">
+            <a:extLst>
+              <a:ext uri="{FF2B5EF4-FFF2-40B4-BE49-F238E27FC236}">
+                <a16:creationId xmlns:a16="http://schemas.microsoft.com/office/drawing/2014/main" id="{DF765C14-F63A-4BEC-91BB-29D31E67F62E}"/>
+              </a:ext>
+            </a:extLst>
+          </p:cNvPr>
+          <p:cNvGrpSpPr/>
+          <p:nvPr/>
+        </p:nvGrpSpPr>
+        <p:grpSpPr>
+          <a:xfrm>
+            <a:off x="455302" y="1371600"/>
+            <a:ext cx="8528822" cy="4093428"/>
+            <a:chOff x="455302" y="1371600"/>
+            <a:chExt cx="8528822" cy="4093428"/>
+          </a:xfrm>
+        </p:grpSpPr>
+        <p:sp>
+          <p:nvSpPr>
+            <p:cNvPr id="6" name="TextBox 5">
+              <a:extLst>
+                <a:ext uri="{FF2B5EF4-FFF2-40B4-BE49-F238E27FC236}">
+                  <a16:creationId xmlns:a16="http://schemas.microsoft.com/office/drawing/2014/main" id="{A3585BB0-2513-4FD6-9854-13BEBA99DD39}"/>
+                </a:ext>
+              </a:extLst>
+            </p:cNvPr>
+            <p:cNvSpPr txBox="1"/>
+            <p:nvPr/>
+          </p:nvSpPr>
+          <p:spPr>
+            <a:xfrm>
+              <a:off x="1049946" y="1371600"/>
+              <a:ext cx="7934178" cy="4093428"/>
+            </a:xfrm>
+            <a:prstGeom prst="rect">
+              <a:avLst/>
+            </a:prstGeom>
+            <a:noFill/>
+          </p:spPr>
+          <p:txBody>
+            <a:bodyPr wrap="square" rtlCol="0">
+              <a:spAutoFit/>
+            </a:bodyPr>
+            <a:lstStyle/>
+            <a:p>
+              <a:r>
+                <a:rPr lang="en-US" sz="2000" b="1" dirty="0">
+                  <a:latin typeface="Calibri" pitchFamily="34" charset="0"/>
+                  <a:cs typeface="Calibri" pitchFamily="34" charset="0"/>
+                </a:rPr>
+                <a:t>Bi-direction Elimination: (combines Forward and Backward)</a:t>
+              </a:r>
+            </a:p>
+            <a:p>
+              <a:r>
+                <a:rPr lang="en-US" sz="2000" b="1" dirty="0">
+                  <a:latin typeface="Calibri" pitchFamily="34" charset="0"/>
+                  <a:cs typeface="Calibri" pitchFamily="34" charset="0"/>
+                </a:rPr>
+                <a:t>Step 1: </a:t>
+              </a:r>
+              <a:r>
+                <a:rPr lang="en-US" sz="2000" dirty="0">
+                  <a:latin typeface="Calibri" pitchFamily="34" charset="0"/>
+                  <a:cs typeface="Calibri" pitchFamily="34" charset="0"/>
+                </a:rPr>
+                <a:t>Select a significance level to enter and  to stay in the model </a:t>
+              </a:r>
+            </a:p>
+            <a:p>
+              <a:r>
+                <a:rPr lang="en-US" sz="2000" dirty="0">
+                  <a:latin typeface="Calibri" pitchFamily="34" charset="0"/>
+                  <a:cs typeface="Calibri" pitchFamily="34" charset="0"/>
+                </a:rPr>
+                <a:t>(e.g. SL-Enter = 0.05, SL-Stay = 0.05)</a:t>
+              </a:r>
+            </a:p>
+            <a:p>
+              <a:endParaRPr lang="en-US" sz="2000" b="1" dirty="0">
+                <a:latin typeface="Calibri" pitchFamily="34" charset="0"/>
+                <a:cs typeface="Calibri" pitchFamily="34" charset="0"/>
+              </a:endParaRPr>
+            </a:p>
+            <a:p>
+              <a:r>
+                <a:rPr lang="en-US" sz="2000" b="1" dirty="0">
+                  <a:latin typeface="Calibri" pitchFamily="34" charset="0"/>
+                  <a:cs typeface="Calibri" pitchFamily="34" charset="0"/>
+                </a:rPr>
+                <a:t>Step 2: </a:t>
+              </a:r>
+              <a:r>
+                <a:rPr lang="en-US" sz="2000" dirty="0">
+                  <a:latin typeface="Calibri" pitchFamily="34" charset="0"/>
+                  <a:cs typeface="Calibri" pitchFamily="34" charset="0"/>
+                </a:rPr>
+                <a:t>Perform the next step of forward selection (new variables must have p-value &lt; SL-Enter to enter). Basically add a new variable based on forward selection method.</a:t>
+              </a:r>
+            </a:p>
+            <a:p>
+              <a:endParaRPr lang="en-US" sz="2000" dirty="0">
+                <a:latin typeface="Calibri" pitchFamily="34" charset="0"/>
+                <a:cs typeface="Calibri" pitchFamily="34" charset="0"/>
+              </a:endParaRPr>
+            </a:p>
+            <a:p>
+              <a:r>
+                <a:rPr lang="en-US" sz="2000" b="1" dirty="0">
+                  <a:latin typeface="Calibri" pitchFamily="34" charset="0"/>
+                  <a:cs typeface="Calibri" pitchFamily="34" charset="0"/>
+                </a:rPr>
+                <a:t>Step 3: </a:t>
+              </a:r>
+              <a:r>
+                <a:rPr lang="en-US" sz="2000" dirty="0">
+                  <a:latin typeface="Calibri" pitchFamily="34" charset="0"/>
+                  <a:cs typeface="Calibri" pitchFamily="34" charset="0"/>
+                </a:rPr>
+                <a:t>Perform all steps of backward elimination (old variables must have p-values &lt; SL-Stay to stay)</a:t>
+              </a:r>
+            </a:p>
+            <a:p>
+              <a:endParaRPr lang="en-US" sz="2000" b="1" dirty="0">
+                <a:latin typeface="Calibri" pitchFamily="34" charset="0"/>
+                <a:cs typeface="Calibri" pitchFamily="34" charset="0"/>
+              </a:endParaRPr>
+            </a:p>
+            <a:p>
+              <a:r>
+                <a:rPr lang="en-US" sz="2000" b="1" dirty="0">
+                  <a:latin typeface="Calibri" pitchFamily="34" charset="0"/>
+                  <a:cs typeface="Calibri" pitchFamily="34" charset="0"/>
+                </a:rPr>
+                <a:t>Step 4:</a:t>
+              </a:r>
+              <a:r>
+                <a:rPr lang="en-US" sz="2000" dirty="0">
+                  <a:latin typeface="Calibri" pitchFamily="34" charset="0"/>
+                  <a:cs typeface="Calibri" pitchFamily="34" charset="0"/>
+                </a:rPr>
+                <a:t> No new variables can enter and variables can exit, then </a:t>
+              </a:r>
+              <a:r>
+                <a:rPr lang="en-US" sz="2000" b="1" dirty="0">
+                  <a:latin typeface="Calibri" pitchFamily="34" charset="0"/>
+                  <a:cs typeface="Calibri" pitchFamily="34" charset="0"/>
+                </a:rPr>
+                <a:t>FINISH</a:t>
+              </a:r>
+            </a:p>
+            <a:p>
+              <a:endParaRPr lang="en-US" sz="2000" b="1" dirty="0">
+                <a:latin typeface="Calibri" pitchFamily="34" charset="0"/>
+                <a:cs typeface="Calibri" pitchFamily="34" charset="0"/>
+              </a:endParaRPr>
+            </a:p>
+          </p:txBody>
+        </p:sp>
+        <p:sp>
+          <p:nvSpPr>
+            <p:cNvPr id="5" name="Arrow: Curved Up 4">
+              <a:extLst>
+                <a:ext uri="{FF2B5EF4-FFF2-40B4-BE49-F238E27FC236}">
+                  <a16:creationId xmlns:a16="http://schemas.microsoft.com/office/drawing/2014/main" id="{BA2D761E-50A3-4533-BF59-AF77C6734674}"/>
+                </a:ext>
+              </a:extLst>
+            </p:cNvPr>
+            <p:cNvSpPr/>
+            <p:nvPr/>
+          </p:nvSpPr>
+          <p:spPr>
+            <a:xfrm rot="16200000" flipV="1">
+              <a:off x="143024" y="3131678"/>
+              <a:ext cx="1219200" cy="594643"/>
+            </a:xfrm>
+            <a:prstGeom prst="curvedUpArrow">
+              <a:avLst/>
+            </a:prstGeom>
+            <a:solidFill>
+              <a:srgbClr val="00B050"/>
+            </a:solidFill>
+            <a:ln>
+              <a:solidFill>
+                <a:srgbClr val="00B050"/>
+              </a:solidFill>
+            </a:ln>
+          </p:spPr>
+          <p:style>
+            <a:lnRef idx="2">
+              <a:schemeClr val="accent1">
+                <a:shade val="50000"/>
+              </a:schemeClr>
+            </a:lnRef>
+            <a:fillRef idx="1">
+              <a:schemeClr val="accent1"/>
+            </a:fillRef>
+            <a:effectRef idx="0">
+              <a:schemeClr val="accent1"/>
+            </a:effectRef>
+            <a:fontRef idx="minor">
+              <a:schemeClr val="lt1"/>
+            </a:fontRef>
+          </p:style>
+          <p:txBody>
+            <a:bodyPr rtlCol="0" anchor="ctr"/>
+            <a:lstStyle/>
+            <a:p>
+              <a:pPr algn="ctr"/>
+              <a:endParaRPr lang="en-US" dirty="0">
+                <a:ln>
+                  <a:solidFill>
+                    <a:schemeClr val="tx1"/>
+                  </a:solidFill>
+                </a:ln>
+                <a:solidFill>
+                  <a:schemeClr val="tx1"/>
+                </a:solidFill>
+              </a:endParaRPr>
+            </a:p>
+          </p:txBody>
+        </p:sp>
+      </p:grpSp>
+    </p:spTree>
+    <p:extLst>
+      <p:ext uri="{BB962C8B-B14F-4D97-AF65-F5344CB8AC3E}">
+        <p14:creationId xmlns:p14="http://schemas.microsoft.com/office/powerpoint/2010/main" val="2954621419"/>
+      </p:ext>
+    </p:extLst>
+  </p:cSld>
+  <p:clrMapOvr>
+    <a:masterClrMapping/>
+  </p:clrMapOvr>
+</p:sld>
+</file>
+
+<file path=ppt/slides/slide54.xml><?xml version="1.0" encoding="utf-8"?>
+<p:sld xmlns:a="http://schemas.openxmlformats.org/drawingml/2006/main" xmlns:r="http://schemas.openxmlformats.org/officeDocument/2006/relationships" xmlns:p="http://schemas.openxmlformats.org/presentationml/2006/main">
+  <p:cSld>
+    <p:spTree>
+      <p:nvGrpSpPr>
+        <p:cNvPr id="1" name=""/>
+        <p:cNvGrpSpPr/>
+        <p:nvPr/>
+      </p:nvGrpSpPr>
+      <p:grpSpPr>
+        <a:xfrm>
+          <a:off x="0" y="0"/>
+          <a:ext cx="0" cy="0"/>
+          <a:chOff x="0" y="0"/>
+          <a:chExt cx="0" cy="0"/>
+        </a:xfrm>
+      </p:grpSpPr>
+      <p:sp>
+        <p:nvSpPr>
+          <p:cNvPr id="2" name="TextBox 1"/>
+          <p:cNvSpPr txBox="1"/>
+          <p:nvPr/>
+        </p:nvSpPr>
+        <p:spPr>
+          <a:xfrm>
+            <a:off x="1159833" y="457201"/>
+            <a:ext cx="6278449" cy="646331"/>
+          </a:xfrm>
+          <a:prstGeom prst="rect">
+            <a:avLst/>
+          </a:prstGeom>
+          <a:noFill/>
+        </p:spPr>
+        <p:txBody>
+          <a:bodyPr wrap="none" rtlCol="0">
+            <a:spAutoFit/>
+          </a:bodyPr>
+          <a:lstStyle/>
+          <a:p>
+            <a:pPr algn="ctr"/>
+            <a:r>
+              <a:rPr lang="en-US" sz="3600" dirty="0">
+                <a:latin typeface="Calibri" pitchFamily="34" charset="0"/>
+                <a:cs typeface="Calibri" pitchFamily="34" charset="0"/>
+              </a:rPr>
+              <a:t>Approaches of Linear Regression</a:t>
+            </a:r>
+          </a:p>
+        </p:txBody>
+      </p:sp>
+      <p:grpSp>
+        <p:nvGrpSpPr>
+          <p:cNvPr id="7" name="Group 6">
+            <a:extLst>
+              <a:ext uri="{FF2B5EF4-FFF2-40B4-BE49-F238E27FC236}">
+                <a16:creationId xmlns:a16="http://schemas.microsoft.com/office/drawing/2014/main" id="{DF765C14-F63A-4BEC-91BB-29D31E67F62E}"/>
+              </a:ext>
+            </a:extLst>
+          </p:cNvPr>
+          <p:cNvGrpSpPr/>
+          <p:nvPr/>
+        </p:nvGrpSpPr>
+        <p:grpSpPr>
+          <a:xfrm>
+            <a:off x="455302" y="1676400"/>
+            <a:ext cx="8528822" cy="4401205"/>
+            <a:chOff x="455302" y="1371600"/>
+            <a:chExt cx="8528822" cy="4401205"/>
+          </a:xfrm>
+        </p:grpSpPr>
+        <p:sp>
+          <p:nvSpPr>
+            <p:cNvPr id="6" name="TextBox 5">
+              <a:extLst>
+                <a:ext uri="{FF2B5EF4-FFF2-40B4-BE49-F238E27FC236}">
+                  <a16:creationId xmlns:a16="http://schemas.microsoft.com/office/drawing/2014/main" id="{A3585BB0-2513-4FD6-9854-13BEBA99DD39}"/>
+                </a:ext>
+              </a:extLst>
+            </p:cNvPr>
+            <p:cNvSpPr txBox="1"/>
+            <p:nvPr/>
+          </p:nvSpPr>
+          <p:spPr>
+            <a:xfrm>
+              <a:off x="1049946" y="1371600"/>
+              <a:ext cx="7934178" cy="4401205"/>
+            </a:xfrm>
+            <a:prstGeom prst="rect">
+              <a:avLst/>
+            </a:prstGeom>
+            <a:noFill/>
+          </p:spPr>
+          <p:txBody>
+            <a:bodyPr wrap="square" rtlCol="0">
+              <a:spAutoFit/>
+            </a:bodyPr>
+            <a:lstStyle/>
+            <a:p>
+              <a:r>
+                <a:rPr lang="en-US" sz="2000" b="1" dirty="0">
+                  <a:latin typeface="Calibri" pitchFamily="34" charset="0"/>
+                  <a:cs typeface="Calibri" pitchFamily="34" charset="0"/>
+                </a:rPr>
+                <a:t>Score Comparison:</a:t>
+              </a:r>
+            </a:p>
+            <a:p>
+              <a:r>
+                <a:rPr lang="en-US" sz="2000" b="1" dirty="0">
+                  <a:latin typeface="Calibri" pitchFamily="34" charset="0"/>
+                  <a:cs typeface="Calibri" pitchFamily="34" charset="0"/>
+                </a:rPr>
+                <a:t>Step 1: </a:t>
+              </a:r>
+              <a:r>
+                <a:rPr lang="en-US" sz="2000" dirty="0">
+                  <a:latin typeface="Calibri" pitchFamily="34" charset="0"/>
+                  <a:cs typeface="Calibri" pitchFamily="34" charset="0"/>
+                </a:rPr>
+                <a:t>Select a criterion (score) of goodness of fit (e.g. R2 or adjusted R2)</a:t>
+              </a:r>
+            </a:p>
+            <a:p>
+              <a:endParaRPr lang="en-US" sz="2000" b="1" dirty="0">
+                <a:latin typeface="Calibri" pitchFamily="34" charset="0"/>
+                <a:cs typeface="Calibri" pitchFamily="34" charset="0"/>
+              </a:endParaRPr>
+            </a:p>
+            <a:p>
+              <a:r>
+                <a:rPr lang="en-US" sz="2000" b="1" dirty="0">
+                  <a:latin typeface="Calibri" pitchFamily="34" charset="0"/>
+                  <a:cs typeface="Calibri" pitchFamily="34" charset="0"/>
+                </a:rPr>
+                <a:t>Step 2: </a:t>
+              </a:r>
+              <a:r>
+                <a:rPr lang="en-US" sz="2000" dirty="0">
+                  <a:latin typeface="Calibri" pitchFamily="34" charset="0"/>
+                  <a:cs typeface="Calibri" pitchFamily="34" charset="0"/>
+                </a:rPr>
+                <a:t>Construct All Possible Regression Models 2</a:t>
+              </a:r>
+              <a:r>
+                <a:rPr lang="en-US" sz="2000" baseline="30000" dirty="0">
+                  <a:latin typeface="Calibri" pitchFamily="34" charset="0"/>
+                  <a:cs typeface="Calibri" pitchFamily="34" charset="0"/>
+                </a:rPr>
+                <a:t>N</a:t>
+              </a:r>
+              <a:r>
+                <a:rPr lang="en-US" sz="2000" dirty="0">
+                  <a:latin typeface="Calibri" pitchFamily="34" charset="0"/>
+                  <a:cs typeface="Calibri" pitchFamily="34" charset="0"/>
+                </a:rPr>
+                <a:t>-1 total combinations (if you have n features, you create 2</a:t>
+              </a:r>
+              <a:r>
+                <a:rPr lang="en-US" sz="2000" baseline="30000" dirty="0">
+                  <a:latin typeface="Calibri" pitchFamily="34" charset="0"/>
+                  <a:cs typeface="Calibri" pitchFamily="34" charset="0"/>
+                </a:rPr>
+                <a:t>N</a:t>
+              </a:r>
+              <a:r>
+                <a:rPr lang="en-US" sz="2000" dirty="0">
+                  <a:latin typeface="Calibri" pitchFamily="34" charset="0"/>
+                  <a:cs typeface="Calibri" pitchFamily="34" charset="0"/>
+                </a:rPr>
+                <a:t>-1 models)</a:t>
+              </a:r>
+              <a:endParaRPr lang="en-US" sz="2000" baseline="30000" dirty="0">
+                <a:latin typeface="Calibri" pitchFamily="34" charset="0"/>
+                <a:cs typeface="Calibri" pitchFamily="34" charset="0"/>
+              </a:endParaRPr>
+            </a:p>
+            <a:p>
+              <a:endParaRPr lang="en-US" sz="2000" dirty="0">
+                <a:latin typeface="Calibri" pitchFamily="34" charset="0"/>
+                <a:cs typeface="Calibri" pitchFamily="34" charset="0"/>
+              </a:endParaRPr>
+            </a:p>
+            <a:p>
+              <a:r>
+                <a:rPr lang="en-US" sz="2000" b="1" dirty="0">
+                  <a:latin typeface="Calibri" pitchFamily="34" charset="0"/>
+                  <a:cs typeface="Calibri" pitchFamily="34" charset="0"/>
+                </a:rPr>
+                <a:t>Step 3: </a:t>
+              </a:r>
+              <a:r>
+                <a:rPr lang="en-US" sz="2000" dirty="0">
+                  <a:latin typeface="Calibri" pitchFamily="34" charset="0"/>
+                  <a:cs typeface="Calibri" pitchFamily="34" charset="0"/>
+                </a:rPr>
+                <a:t>Select the one with the best criterion/score</a:t>
+              </a:r>
+            </a:p>
+            <a:p>
+              <a:endParaRPr lang="en-US" sz="2000" b="1" dirty="0">
+                <a:latin typeface="Calibri" pitchFamily="34" charset="0"/>
+                <a:cs typeface="Calibri" pitchFamily="34" charset="0"/>
+              </a:endParaRPr>
+            </a:p>
+            <a:p>
+              <a:r>
+                <a:rPr lang="en-US" sz="2000" b="1" dirty="0">
+                  <a:latin typeface="Calibri" pitchFamily="34" charset="0"/>
+                  <a:cs typeface="Calibri" pitchFamily="34" charset="0"/>
+                </a:rPr>
+                <a:t>Step 4:</a:t>
+              </a:r>
+              <a:r>
+                <a:rPr lang="en-US" sz="2000" dirty="0">
+                  <a:latin typeface="Calibri" pitchFamily="34" charset="0"/>
+                  <a:cs typeface="Calibri" pitchFamily="34" charset="0"/>
+                </a:rPr>
+                <a:t> </a:t>
+              </a:r>
+              <a:r>
+                <a:rPr lang="en-US" sz="2000" b="1" dirty="0">
+                  <a:latin typeface="Calibri" pitchFamily="34" charset="0"/>
+                  <a:cs typeface="Calibri" pitchFamily="34" charset="0"/>
+                </a:rPr>
+                <a:t>FINISH</a:t>
+              </a:r>
+            </a:p>
+            <a:p>
+              <a:endParaRPr lang="en-US" sz="2000" b="1" dirty="0">
+                <a:latin typeface="Calibri" pitchFamily="34" charset="0"/>
+                <a:cs typeface="Calibri" pitchFamily="34" charset="0"/>
+              </a:endParaRPr>
+            </a:p>
+            <a:p>
+              <a:r>
+                <a:rPr lang="en-US" sz="2000" dirty="0">
+                  <a:latin typeface="Calibri" pitchFamily="34" charset="0"/>
+                  <a:cs typeface="Calibri" pitchFamily="34" charset="0"/>
+                </a:rPr>
+                <a:t>This sounds easy but even if you have 10 columns in your dataset, you create 1023 models. That is very resource intensive. This is usually not preferred.</a:t>
+              </a:r>
+            </a:p>
+            <a:p>
+              <a:endParaRPr lang="en-US" sz="2000" b="1" dirty="0">
+                <a:latin typeface="Calibri" pitchFamily="34" charset="0"/>
+                <a:cs typeface="Calibri" pitchFamily="34" charset="0"/>
+              </a:endParaRPr>
+            </a:p>
+          </p:txBody>
+        </p:sp>
+        <p:sp>
+          <p:nvSpPr>
+            <p:cNvPr id="5" name="Arrow: Curved Up 4">
+              <a:extLst>
+                <a:ext uri="{FF2B5EF4-FFF2-40B4-BE49-F238E27FC236}">
+                  <a16:creationId xmlns:a16="http://schemas.microsoft.com/office/drawing/2014/main" id="{BA2D761E-50A3-4533-BF59-AF77C6734674}"/>
+                </a:ext>
+              </a:extLst>
+            </p:cNvPr>
+            <p:cNvSpPr/>
+            <p:nvPr/>
+          </p:nvSpPr>
+          <p:spPr>
+            <a:xfrm rot="16200000" flipV="1">
+              <a:off x="143024" y="3131678"/>
+              <a:ext cx="1219200" cy="594643"/>
+            </a:xfrm>
+            <a:prstGeom prst="curvedUpArrow">
+              <a:avLst/>
+            </a:prstGeom>
+            <a:solidFill>
+              <a:srgbClr val="00B050"/>
+            </a:solidFill>
+            <a:ln>
+              <a:solidFill>
+                <a:srgbClr val="00B050"/>
+              </a:solidFill>
+            </a:ln>
+          </p:spPr>
+          <p:style>
+            <a:lnRef idx="2">
+              <a:schemeClr val="accent1">
+                <a:shade val="50000"/>
+              </a:schemeClr>
+            </a:lnRef>
+            <a:fillRef idx="1">
+              <a:schemeClr val="accent1"/>
+            </a:fillRef>
+            <a:effectRef idx="0">
+              <a:schemeClr val="accent1"/>
+            </a:effectRef>
+            <a:fontRef idx="minor">
+              <a:schemeClr val="lt1"/>
+            </a:fontRef>
+          </p:style>
+          <p:txBody>
+            <a:bodyPr rtlCol="0" anchor="ctr"/>
+            <a:lstStyle/>
+            <a:p>
+              <a:pPr algn="ctr"/>
+              <a:endParaRPr lang="en-US" dirty="0">
+                <a:ln>
+                  <a:solidFill>
+                    <a:schemeClr val="tx1"/>
+                  </a:solidFill>
+                </a:ln>
+                <a:solidFill>
+                  <a:schemeClr val="tx1"/>
+                </a:solidFill>
+              </a:endParaRPr>
+            </a:p>
+          </p:txBody>
+        </p:sp>
+      </p:grpSp>
+    </p:spTree>
+    <p:extLst>
+      <p:ext uri="{BB962C8B-B14F-4D97-AF65-F5344CB8AC3E}">
+        <p14:creationId xmlns:p14="http://schemas.microsoft.com/office/powerpoint/2010/main" val="278832461"/>
+      </p:ext>
+    </p:extLst>
+  </p:cSld>
+  <p:clrMapOvr>
+    <a:masterClrMapping/>
+  </p:clrMapOvr>
+</p:sld>
+</file>
+
+<file path=ppt/slides/slide55.xml><?xml version="1.0" encoding="utf-8"?>
+<p:sld xmlns:a="http://schemas.openxmlformats.org/drawingml/2006/main" xmlns:r="http://schemas.openxmlformats.org/officeDocument/2006/relationships" xmlns:p="http://schemas.openxmlformats.org/presentationml/2006/main">
+  <p:cSld>
+    <p:spTree>
+      <p:nvGrpSpPr>
+        <p:cNvPr id="1" name=""/>
+        <p:cNvGrpSpPr/>
+        <p:nvPr/>
+      </p:nvGrpSpPr>
+      <p:grpSpPr>
+        <a:xfrm>
+          <a:off x="0" y="0"/>
+          <a:ext cx="0" cy="0"/>
+          <a:chOff x="0" y="0"/>
+          <a:chExt cx="0" cy="0"/>
+        </a:xfrm>
+      </p:grpSpPr>
+      <p:sp>
+        <p:nvSpPr>
+          <p:cNvPr id="4" name="TextBox 3"/>
+          <p:cNvSpPr txBox="1"/>
+          <p:nvPr/>
+        </p:nvSpPr>
+        <p:spPr>
+          <a:xfrm>
+            <a:off x="3124200" y="3124199"/>
+            <a:ext cx="2104230" cy="646331"/>
+          </a:xfrm>
+          <a:prstGeom prst="rect">
+            <a:avLst/>
+          </a:prstGeom>
+          <a:noFill/>
+        </p:spPr>
+        <p:txBody>
+          <a:bodyPr wrap="none" rtlCol="0">
+            <a:spAutoFit/>
+          </a:bodyPr>
+          <a:lstStyle/>
+          <a:p>
+            <a:r>
+              <a:rPr lang="en-US" sz="3600" dirty="0">
+                <a:latin typeface="Calibri" pitchFamily="34" charset="0"/>
+                <a:cs typeface="Calibri" pitchFamily="34" charset="0"/>
+              </a:rPr>
+              <a:t>Thank You</a:t>
+            </a:r>
+          </a:p>
+        </p:txBody>
+      </p:sp>
+    </p:spTree>
+    <p:extLst>
+      <p:ext uri="{BB962C8B-B14F-4D97-AF65-F5344CB8AC3E}">
+        <p14:creationId xmlns:p14="http://schemas.microsoft.com/office/powerpoint/2010/main" val="4085703393"/>
       </p:ext>
     </p:extLst>
   </p:cSld>

</xml_diff>

<commit_message>
Added the table for all expected values of Stats for Linear Regression in stats model summary table
</commit_message>
<xml_diff>
--- a/Machine-Learning/4.2 Linear-Regression/4.2.1-Linear-Regression.pptx
+++ b/Machine-Learning/4.2 Linear-Regression/4.2.1-Linear-Regression.pptx
@@ -5,7 +5,7 @@
     <p:sldMasterId id="2147483744" r:id="rId1"/>
   </p:sldMasterIdLst>
   <p:notesMasterIdLst>
-    <p:notesMasterId r:id="rId57"/>
+    <p:notesMasterId r:id="rId58"/>
   </p:notesMasterIdLst>
   <p:sldIdLst>
     <p:sldId id="256" r:id="rId2"/>
@@ -41,28 +41,29 @@
     <p:sldId id="413" r:id="rId32"/>
     <p:sldId id="414" r:id="rId33"/>
     <p:sldId id="421" r:id="rId34"/>
-    <p:sldId id="420" r:id="rId35"/>
-    <p:sldId id="422" r:id="rId36"/>
-    <p:sldId id="423" r:id="rId37"/>
-    <p:sldId id="425" r:id="rId38"/>
-    <p:sldId id="426" r:id="rId39"/>
-    <p:sldId id="427" r:id="rId40"/>
-    <p:sldId id="428" r:id="rId41"/>
-    <p:sldId id="429" r:id="rId42"/>
-    <p:sldId id="430" r:id="rId43"/>
-    <p:sldId id="431" r:id="rId44"/>
-    <p:sldId id="432" r:id="rId45"/>
-    <p:sldId id="433" r:id="rId46"/>
-    <p:sldId id="434" r:id="rId47"/>
-    <p:sldId id="401" r:id="rId48"/>
-    <p:sldId id="435" r:id="rId49"/>
-    <p:sldId id="436" r:id="rId50"/>
-    <p:sldId id="437" r:id="rId51"/>
-    <p:sldId id="438" r:id="rId52"/>
-    <p:sldId id="439" r:id="rId53"/>
-    <p:sldId id="440" r:id="rId54"/>
-    <p:sldId id="441" r:id="rId55"/>
-    <p:sldId id="390" r:id="rId56"/>
+    <p:sldId id="442" r:id="rId35"/>
+    <p:sldId id="420" r:id="rId36"/>
+    <p:sldId id="422" r:id="rId37"/>
+    <p:sldId id="423" r:id="rId38"/>
+    <p:sldId id="425" r:id="rId39"/>
+    <p:sldId id="426" r:id="rId40"/>
+    <p:sldId id="427" r:id="rId41"/>
+    <p:sldId id="428" r:id="rId42"/>
+    <p:sldId id="429" r:id="rId43"/>
+    <p:sldId id="430" r:id="rId44"/>
+    <p:sldId id="431" r:id="rId45"/>
+    <p:sldId id="432" r:id="rId46"/>
+    <p:sldId id="433" r:id="rId47"/>
+    <p:sldId id="434" r:id="rId48"/>
+    <p:sldId id="401" r:id="rId49"/>
+    <p:sldId id="435" r:id="rId50"/>
+    <p:sldId id="436" r:id="rId51"/>
+    <p:sldId id="437" r:id="rId52"/>
+    <p:sldId id="438" r:id="rId53"/>
+    <p:sldId id="439" r:id="rId54"/>
+    <p:sldId id="440" r:id="rId55"/>
+    <p:sldId id="441" r:id="rId56"/>
+    <p:sldId id="390" r:id="rId57"/>
   </p:sldIdLst>
   <p:sldSz cx="9144000" cy="6858000" type="screen4x3"/>
   <p:notesSz cx="6858000" cy="9144000"/>
@@ -199,6 +200,7 @@
             <p14:sldId id="413"/>
             <p14:sldId id="414"/>
             <p14:sldId id="421"/>
+            <p14:sldId id="442"/>
             <p14:sldId id="420"/>
             <p14:sldId id="422"/>
             <p14:sldId id="423"/>
@@ -325,7 +327,7 @@
           <a:p>
             <a:fld id="{DEE881C5-C40C-46AE-B142-F7F3F0A1C896}" type="datetimeFigureOut">
               <a:rPr lang="en-US" smtClean="0"/>
-              <a:t>5/9/2019</a:t>
+              <a:t>5/25/2019</a:t>
             </a:fld>
             <a:endParaRPr lang="en-US"/>
           </a:p>
@@ -733,7 +735,7 @@
           <a:p>
             <a:fld id="{051F961C-2C06-44AD-B09C-3FDB0903E3DD}" type="datetimeFigureOut">
               <a:rPr lang="en-US" smtClean="0"/>
-              <a:t>5/9/2019</a:t>
+              <a:t>5/25/2019</a:t>
             </a:fld>
             <a:endParaRPr lang="en-US"/>
           </a:p>
@@ -1091,7 +1093,7 @@
           <a:p>
             <a:fld id="{051F961C-2C06-44AD-B09C-3FDB0903E3DD}" type="datetimeFigureOut">
               <a:rPr lang="en-US" smtClean="0"/>
-              <a:t>5/9/2019</a:t>
+              <a:t>5/25/2019</a:t>
             </a:fld>
             <a:endParaRPr lang="en-US"/>
           </a:p>
@@ -1265,7 +1267,7 @@
           <a:p>
             <a:fld id="{051F961C-2C06-44AD-B09C-3FDB0903E3DD}" type="datetimeFigureOut">
               <a:rPr lang="en-US" smtClean="0"/>
-              <a:t>5/9/2019</a:t>
+              <a:t>5/25/2019</a:t>
             </a:fld>
             <a:endParaRPr lang="en-US"/>
           </a:p>
@@ -1499,7 +1501,7 @@
           <a:p>
             <a:fld id="{051F961C-2C06-44AD-B09C-3FDB0903E3DD}" type="datetimeFigureOut">
               <a:rPr lang="en-US" smtClean="0"/>
-              <a:t>5/9/2019</a:t>
+              <a:t>5/25/2019</a:t>
             </a:fld>
             <a:endParaRPr lang="en-US"/>
           </a:p>
@@ -1767,7 +1769,7 @@
           <a:p>
             <a:fld id="{051F961C-2C06-44AD-B09C-3FDB0903E3DD}" type="datetimeFigureOut">
               <a:rPr lang="en-US" smtClean="0"/>
-              <a:t>5/9/2019</a:t>
+              <a:t>5/25/2019</a:t>
             </a:fld>
             <a:endParaRPr lang="en-US"/>
           </a:p>
@@ -1986,7 +1988,7 @@
           <a:p>
             <a:fld id="{051F961C-2C06-44AD-B09C-3FDB0903E3DD}" type="datetimeFigureOut">
               <a:rPr lang="en-US" smtClean="0"/>
-              <a:t>5/9/2019</a:t>
+              <a:t>5/25/2019</a:t>
             </a:fld>
             <a:endParaRPr lang="en-US"/>
           </a:p>
@@ -2337,7 +2339,7 @@
           <a:p>
             <a:fld id="{051F961C-2C06-44AD-B09C-3FDB0903E3DD}" type="datetimeFigureOut">
               <a:rPr lang="en-US" smtClean="0"/>
-              <a:t>5/9/2019</a:t>
+              <a:t>5/25/2019</a:t>
             </a:fld>
             <a:endParaRPr lang="en-US"/>
           </a:p>
@@ -2568,7 +2570,7 @@
           <a:p>
             <a:fld id="{051F961C-2C06-44AD-B09C-3FDB0903E3DD}" type="datetimeFigureOut">
               <a:rPr lang="en-US" smtClean="0"/>
-              <a:t>5/9/2019</a:t>
+              <a:t>5/25/2019</a:t>
             </a:fld>
             <a:endParaRPr lang="en-US"/>
           </a:p>
@@ -2708,7 +2710,7 @@
           <a:p>
             <a:fld id="{051F961C-2C06-44AD-B09C-3FDB0903E3DD}" type="datetimeFigureOut">
               <a:rPr lang="en-US" smtClean="0"/>
-              <a:t>5/9/2019</a:t>
+              <a:t>5/25/2019</a:t>
             </a:fld>
             <a:endParaRPr lang="en-US"/>
           </a:p>
@@ -2984,7 +2986,7 @@
           <a:p>
             <a:fld id="{051F961C-2C06-44AD-B09C-3FDB0903E3DD}" type="datetimeFigureOut">
               <a:rPr lang="en-US" smtClean="0"/>
-              <a:t>5/9/2019</a:t>
+              <a:t>5/25/2019</a:t>
             </a:fld>
             <a:endParaRPr lang="en-US"/>
           </a:p>
@@ -3390,7 +3392,7 @@
           <a:p>
             <a:fld id="{051F961C-2C06-44AD-B09C-3FDB0903E3DD}" type="datetimeFigureOut">
               <a:rPr lang="en-US" smtClean="0"/>
-              <a:t>5/9/2019</a:t>
+              <a:t>5/25/2019</a:t>
             </a:fld>
             <a:endParaRPr lang="en-US"/>
           </a:p>
@@ -3726,7 +3728,7 @@
           <a:p>
             <a:fld id="{051F961C-2C06-44AD-B09C-3FDB0903E3DD}" type="datetimeFigureOut">
               <a:rPr lang="en-US" smtClean="0"/>
-              <a:t>5/9/2019</a:t>
+              <a:t>5/25/2019</a:t>
             </a:fld>
             <a:endParaRPr lang="en-US"/>
           </a:p>
@@ -6371,7 +6373,7 @@
         <p:spPr>
           <a:xfrm>
             <a:off x="762000" y="1475125"/>
-            <a:ext cx="7924800" cy="4093428"/>
+            <a:ext cx="7924800" cy="4401205"/>
           </a:xfrm>
           <a:prstGeom prst="rect">
             <a:avLst/>
@@ -6390,6 +6392,15 @@
                 <a:cs typeface="Calibri" pitchFamily="34" charset="0"/>
               </a:rPr>
               <a:t>Correlation is the measure of linear relationship between two variables.</a:t>
+            </a:r>
+          </a:p>
+          <a:p>
+            <a:r>
+              <a:rPr lang="en-US" sz="2000" dirty="0">
+                <a:latin typeface="Calibri" pitchFamily="34" charset="0"/>
+                <a:cs typeface="Calibri" pitchFamily="34" charset="0"/>
+              </a:rPr>
+              <a:t>Correlation does not imply causation.</a:t>
             </a:r>
           </a:p>
           <a:p>
@@ -9990,7 +10001,7 @@
         </p:blipFill>
         <p:spPr>
           <a:xfrm>
-            <a:off x="2743200" y="3174325"/>
+            <a:off x="2743200" y="3495159"/>
             <a:ext cx="2590800" cy="905666"/>
           </a:xfrm>
           <a:prstGeom prst="rect">
@@ -10012,7 +10023,7 @@
         </p:nvSpPr>
         <p:spPr>
           <a:xfrm>
-            <a:off x="685799" y="4075687"/>
+            <a:off x="685799" y="4495800"/>
             <a:ext cx="8184813" cy="646331"/>
           </a:xfrm>
           <a:prstGeom prst="rect">
@@ -11023,14 +11034,20 @@
       </p:grpSpPr>
       <p:sp>
         <p:nvSpPr>
-          <p:cNvPr id="4" name="TextBox 3"/>
+          <p:cNvPr id="3" name="TextBox 2">
+            <a:extLst>
+              <a:ext uri="{FF2B5EF4-FFF2-40B4-BE49-F238E27FC236}">
+                <a16:creationId xmlns:a16="http://schemas.microsoft.com/office/drawing/2014/main" id="{DEC112CC-8D0B-4167-A9A1-D76160BCAE98}"/>
+              </a:ext>
+            </a:extLst>
+          </p:cNvPr>
           <p:cNvSpPr txBox="1"/>
           <p:nvPr/>
         </p:nvSpPr>
         <p:spPr>
           <a:xfrm>
-            <a:off x="3757276" y="3105834"/>
-            <a:ext cx="1629485" cy="646331"/>
+            <a:off x="1331988" y="457201"/>
+            <a:ext cx="6604693" cy="646331"/>
           </a:xfrm>
           <a:prstGeom prst="rect">
             <a:avLst/>
@@ -11049,15 +11066,815 @@
                 <a:latin typeface="Calibri" pitchFamily="34" charset="0"/>
                 <a:cs typeface="Calibri" pitchFamily="34" charset="0"/>
               </a:rPr>
-              <a:t>So Far…</a:t>
-            </a:r>
-            <a:endParaRPr lang="en-US" sz="2400" dirty="0">
-              <a:latin typeface="Calibri" pitchFamily="34" charset="0"/>
-              <a:cs typeface="Calibri" pitchFamily="34" charset="0"/>
-            </a:endParaRPr>
-          </a:p>
-        </p:txBody>
-      </p:sp>
+              <a:t>Linear Regression Expected Values</a:t>
+            </a:r>
+          </a:p>
+        </p:txBody>
+      </p:sp>
+      <p:graphicFrame>
+        <p:nvGraphicFramePr>
+          <p:cNvPr id="2" name="Table 1">
+            <a:extLst>
+              <a:ext uri="{FF2B5EF4-FFF2-40B4-BE49-F238E27FC236}">
+                <a16:creationId xmlns:a16="http://schemas.microsoft.com/office/drawing/2014/main" id="{B0FFB57D-5A3C-480E-8913-F954669C7089}"/>
+              </a:ext>
+            </a:extLst>
+          </p:cNvPr>
+          <p:cNvGraphicFramePr>
+            <a:graphicFrameLocks noGrp="1"/>
+          </p:cNvGraphicFramePr>
+          <p:nvPr>
+            <p:extLst>
+              <p:ext uri="{D42A27DB-BD31-4B8C-83A1-F6EECF244321}">
+                <p14:modId xmlns:p14="http://schemas.microsoft.com/office/powerpoint/2010/main" val="3812448136"/>
+              </p:ext>
+            </p:extLst>
+          </p:nvPr>
+        </p:nvGraphicFramePr>
+        <p:xfrm>
+          <a:off x="1295400" y="1261537"/>
+          <a:ext cx="7239002" cy="4986863"/>
+        </p:xfrm>
+        <a:graphic>
+          <a:graphicData uri="http://schemas.openxmlformats.org/drawingml/2006/table">
+            <a:tbl>
+              <a:tblPr firstRow="1" bandRow="1">
+                <a:tableStyleId>{5C22544A-7EE6-4342-B048-85BDC9FD1C3A}</a:tableStyleId>
+              </a:tblPr>
+              <a:tblGrid>
+                <a:gridCol w="1085850">
+                  <a:extLst>
+                    <a:ext uri="{9D8B030D-6E8A-4147-A177-3AD203B41FA5}">
+                      <a16:colId xmlns:a16="http://schemas.microsoft.com/office/drawing/2014/main" val="3923859183"/>
+                    </a:ext>
+                  </a:extLst>
+                </a:gridCol>
+                <a:gridCol w="3076576">
+                  <a:extLst>
+                    <a:ext uri="{9D8B030D-6E8A-4147-A177-3AD203B41FA5}">
+                      <a16:colId xmlns:a16="http://schemas.microsoft.com/office/drawing/2014/main" val="1608782792"/>
+                    </a:ext>
+                  </a:extLst>
+                </a:gridCol>
+                <a:gridCol w="3076576">
+                  <a:extLst>
+                    <a:ext uri="{9D8B030D-6E8A-4147-A177-3AD203B41FA5}">
+                      <a16:colId xmlns:a16="http://schemas.microsoft.com/office/drawing/2014/main" val="2507617513"/>
+                    </a:ext>
+                  </a:extLst>
+                </a:gridCol>
+              </a:tblGrid>
+              <a:tr h="321733">
+                <a:tc>
+                  <a:txBody>
+                    <a:bodyPr/>
+                    <a:lstStyle/>
+                    <a:p>
+                      <a:r>
+                        <a:rPr lang="en-US" sz="1100" dirty="0"/>
+                        <a:t>Sr. No</a:t>
+                      </a:r>
+                    </a:p>
+                  </a:txBody>
+                  <a:tcPr/>
+                </a:tc>
+                <a:tc>
+                  <a:txBody>
+                    <a:bodyPr/>
+                    <a:lstStyle/>
+                    <a:p>
+                      <a:r>
+                        <a:rPr lang="en-US" sz="1100" dirty="0"/>
+                        <a:t>Statistics</a:t>
+                      </a:r>
+                    </a:p>
+                  </a:txBody>
+                  <a:tcPr/>
+                </a:tc>
+                <a:tc>
+                  <a:txBody>
+                    <a:bodyPr/>
+                    <a:lstStyle/>
+                    <a:p>
+                      <a:r>
+                        <a:rPr lang="en-US" sz="1100" dirty="0"/>
+                        <a:t>Expected Value</a:t>
+                      </a:r>
+                    </a:p>
+                  </a:txBody>
+                  <a:tcPr/>
+                </a:tc>
+                <a:extLst>
+                  <a:ext uri="{0D108BD9-81ED-4DB2-BD59-A6C34878D82A}">
+                    <a16:rowId xmlns:a16="http://schemas.microsoft.com/office/drawing/2014/main" val="501031691"/>
+                  </a:ext>
+                </a:extLst>
+              </a:tr>
+              <a:tr h="321733">
+                <a:tc>
+                  <a:txBody>
+                    <a:bodyPr/>
+                    <a:lstStyle/>
+                    <a:p>
+                      <a:r>
+                        <a:rPr lang="en-US" sz="1100" dirty="0"/>
+                        <a:t>1</a:t>
+                      </a:r>
+                    </a:p>
+                  </a:txBody>
+                  <a:tcPr/>
+                </a:tc>
+                <a:tc>
+                  <a:txBody>
+                    <a:bodyPr/>
+                    <a:lstStyle/>
+                    <a:p>
+                      <a:r>
+                        <a:rPr lang="en-US" sz="1100" dirty="0"/>
+                        <a:t>P &gt; |t| (p-value)</a:t>
+                      </a:r>
+                    </a:p>
+                  </a:txBody>
+                  <a:tcPr/>
+                </a:tc>
+                <a:tc>
+                  <a:txBody>
+                    <a:bodyPr/>
+                    <a:lstStyle/>
+                    <a:p>
+                      <a:r>
+                        <a:rPr lang="en-US" sz="1100" dirty="0"/>
+                        <a:t>&lt; 0.05 (then variable is significant)</a:t>
+                      </a:r>
+                    </a:p>
+                  </a:txBody>
+                  <a:tcPr/>
+                </a:tc>
+                <a:extLst>
+                  <a:ext uri="{0D108BD9-81ED-4DB2-BD59-A6C34878D82A}">
+                    <a16:rowId xmlns:a16="http://schemas.microsoft.com/office/drawing/2014/main" val="3125681787"/>
+                  </a:ext>
+                </a:extLst>
+              </a:tr>
+              <a:tr h="321733">
+                <a:tc>
+                  <a:txBody>
+                    <a:bodyPr/>
+                    <a:lstStyle/>
+                    <a:p>
+                      <a:r>
+                        <a:rPr lang="en-US" sz="1100" dirty="0"/>
+                        <a:t>2</a:t>
+                      </a:r>
+                    </a:p>
+                  </a:txBody>
+                  <a:tcPr/>
+                </a:tc>
+                <a:tc>
+                  <a:txBody>
+                    <a:bodyPr/>
+                    <a:lstStyle/>
+                    <a:p>
+                      <a:r>
+                        <a:rPr lang="en-US" sz="1100" dirty="0"/>
+                        <a:t>Std err</a:t>
+                      </a:r>
+                    </a:p>
+                  </a:txBody>
+                  <a:tcPr/>
+                </a:tc>
+                <a:tc>
+                  <a:txBody>
+                    <a:bodyPr/>
+                    <a:lstStyle/>
+                    <a:p>
+                      <a:r>
+                        <a:rPr lang="en-US" sz="1100" dirty="0"/>
+                        <a:t>The lower the better</a:t>
+                      </a:r>
+                    </a:p>
+                  </a:txBody>
+                  <a:tcPr/>
+                </a:tc>
+                <a:extLst>
+                  <a:ext uri="{0D108BD9-81ED-4DB2-BD59-A6C34878D82A}">
+                    <a16:rowId xmlns:a16="http://schemas.microsoft.com/office/drawing/2014/main" val="2794434526"/>
+                  </a:ext>
+                </a:extLst>
+              </a:tr>
+              <a:tr h="321733">
+                <a:tc>
+                  <a:txBody>
+                    <a:bodyPr/>
+                    <a:lstStyle/>
+                    <a:p>
+                      <a:r>
+                        <a:rPr lang="en-US" sz="1100" dirty="0"/>
+                        <a:t>3</a:t>
+                      </a:r>
+                    </a:p>
+                  </a:txBody>
+                  <a:tcPr/>
+                </a:tc>
+                <a:tc>
+                  <a:txBody>
+                    <a:bodyPr/>
+                    <a:lstStyle/>
+                    <a:p>
+                      <a:r>
+                        <a:rPr lang="en-US" sz="1100" dirty="0"/>
+                        <a:t>R-squared</a:t>
+                      </a:r>
+                    </a:p>
+                  </a:txBody>
+                  <a:tcPr/>
+                </a:tc>
+                <a:tc>
+                  <a:txBody>
+                    <a:bodyPr/>
+                    <a:lstStyle/>
+                    <a:p>
+                      <a:r>
+                        <a:rPr lang="en-US" sz="1100" dirty="0">
+                          <a:latin typeface="Arial" panose="020B0604020202020204" pitchFamily="34" charset="0"/>
+                          <a:cs typeface="Arial" panose="020B0604020202020204" pitchFamily="34" charset="0"/>
+                        </a:rPr>
+                        <a:t>1 </a:t>
+                      </a:r>
+                      <a:r>
+                        <a:rPr lang="en-US" sz="1100" dirty="0">
+                          <a:latin typeface="Gill Sans MT (Body)"/>
+                          <a:cs typeface="Arial" panose="020B0604020202020204" pitchFamily="34" charset="0"/>
+                        </a:rPr>
+                        <a:t>is the best (Usually ranges between 0.2 -0.9)</a:t>
+                      </a:r>
+                    </a:p>
+                    <a:p>
+                      <a:r>
+                        <a:rPr lang="en-US" sz="1100" dirty="0">
+                          <a:latin typeface="Gill Sans MT (Body)"/>
+                          <a:cs typeface="Arial" panose="020B0604020202020204" pitchFamily="34" charset="0"/>
+                        </a:rPr>
+                        <a:t>0 -&gt; model explains no variability</a:t>
+                      </a:r>
+                    </a:p>
+                    <a:p>
+                      <a:r>
+                        <a:rPr lang="en-US" sz="1100" dirty="0">
+                          <a:latin typeface="Arial" panose="020B0604020202020204" pitchFamily="34" charset="0"/>
+                          <a:cs typeface="Arial" panose="020B0604020202020204" pitchFamily="34" charset="0"/>
+                        </a:rPr>
+                        <a:t>1</a:t>
+                      </a:r>
+                      <a:r>
+                        <a:rPr lang="en-US" sz="1100" dirty="0">
+                          <a:latin typeface="Gill Sans MT (Body)"/>
+                          <a:cs typeface="Arial" panose="020B0604020202020204" pitchFamily="34" charset="0"/>
+                        </a:rPr>
+                        <a:t> -&gt; model explains entire variability</a:t>
+                      </a:r>
+                      <a:endParaRPr lang="en-US" sz="1100" dirty="0">
+                        <a:latin typeface="Arial" panose="020B0604020202020204" pitchFamily="34" charset="0"/>
+                        <a:cs typeface="Arial" panose="020B0604020202020204" pitchFamily="34" charset="0"/>
+                      </a:endParaRPr>
+                    </a:p>
+                  </a:txBody>
+                  <a:tcPr/>
+                </a:tc>
+                <a:extLst>
+                  <a:ext uri="{0D108BD9-81ED-4DB2-BD59-A6C34878D82A}">
+                    <a16:rowId xmlns:a16="http://schemas.microsoft.com/office/drawing/2014/main" val="296783645"/>
+                  </a:ext>
+                </a:extLst>
+              </a:tr>
+              <a:tr h="321733">
+                <a:tc>
+                  <a:txBody>
+                    <a:bodyPr/>
+                    <a:lstStyle/>
+                    <a:p>
+                      <a:r>
+                        <a:rPr lang="en-US" sz="1100" dirty="0"/>
+                        <a:t>4</a:t>
+                      </a:r>
+                    </a:p>
+                  </a:txBody>
+                  <a:tcPr/>
+                </a:tc>
+                <a:tc>
+                  <a:txBody>
+                    <a:bodyPr/>
+                    <a:lstStyle/>
+                    <a:p>
+                      <a:r>
+                        <a:rPr lang="en-US" sz="1100" dirty="0"/>
+                        <a:t>Adjusted R-squared</a:t>
+                      </a:r>
+                    </a:p>
+                  </a:txBody>
+                  <a:tcPr/>
+                </a:tc>
+                <a:tc>
+                  <a:txBody>
+                    <a:bodyPr/>
+                    <a:lstStyle/>
+                    <a:p>
+                      <a:r>
+                        <a:rPr lang="en-US" sz="1100" dirty="0"/>
+                        <a:t>More towards </a:t>
+                      </a:r>
+                      <a:r>
+                        <a:rPr lang="en-US" sz="1100" dirty="0">
+                          <a:latin typeface="Arial" panose="020B0604020202020204" pitchFamily="34" charset="0"/>
+                          <a:cs typeface="Arial" panose="020B0604020202020204" pitchFamily="34" charset="0"/>
+                        </a:rPr>
+                        <a:t>1</a:t>
+                      </a:r>
+                      <a:r>
+                        <a:rPr lang="en-US" sz="1100" dirty="0"/>
+                        <a:t>, the better it is</a:t>
+                      </a:r>
+                    </a:p>
+                  </a:txBody>
+                  <a:tcPr/>
+                </a:tc>
+                <a:extLst>
+                  <a:ext uri="{0D108BD9-81ED-4DB2-BD59-A6C34878D82A}">
+                    <a16:rowId xmlns:a16="http://schemas.microsoft.com/office/drawing/2014/main" val="2538267873"/>
+                  </a:ext>
+                </a:extLst>
+              </a:tr>
+              <a:tr h="321733">
+                <a:tc>
+                  <a:txBody>
+                    <a:bodyPr/>
+                    <a:lstStyle/>
+                    <a:p>
+                      <a:r>
+                        <a:rPr lang="en-US" sz="1100" dirty="0"/>
+                        <a:t>5</a:t>
+                      </a:r>
+                    </a:p>
+                  </a:txBody>
+                  <a:tcPr/>
+                </a:tc>
+                <a:tc>
+                  <a:txBody>
+                    <a:bodyPr/>
+                    <a:lstStyle/>
+                    <a:p>
+                      <a:r>
+                        <a:rPr lang="en-US" sz="1100" dirty="0"/>
+                        <a:t>F-statistics</a:t>
+                      </a:r>
+                    </a:p>
+                  </a:txBody>
+                  <a:tcPr/>
+                </a:tc>
+                <a:tc>
+                  <a:txBody>
+                    <a:bodyPr/>
+                    <a:lstStyle/>
+                    <a:p>
+                      <a:r>
+                        <a:rPr lang="en-US" sz="1100" dirty="0"/>
+                        <a:t>Higher the better</a:t>
+                      </a:r>
+                    </a:p>
+                  </a:txBody>
+                  <a:tcPr/>
+                </a:tc>
+                <a:extLst>
+                  <a:ext uri="{0D108BD9-81ED-4DB2-BD59-A6C34878D82A}">
+                    <a16:rowId xmlns:a16="http://schemas.microsoft.com/office/drawing/2014/main" val="3270576336"/>
+                  </a:ext>
+                </a:extLst>
+              </a:tr>
+              <a:tr h="321733">
+                <a:tc>
+                  <a:txBody>
+                    <a:bodyPr/>
+                    <a:lstStyle/>
+                    <a:p>
+                      <a:r>
+                        <a:rPr lang="en-US" sz="1100" dirty="0"/>
+                        <a:t>6</a:t>
+                      </a:r>
+                    </a:p>
+                  </a:txBody>
+                  <a:tcPr/>
+                </a:tc>
+                <a:tc>
+                  <a:txBody>
+                    <a:bodyPr/>
+                    <a:lstStyle/>
+                    <a:p>
+                      <a:r>
+                        <a:rPr lang="en-US" sz="1100" dirty="0"/>
+                        <a:t>Prob (F-statistic)</a:t>
+                      </a:r>
+                    </a:p>
+                  </a:txBody>
+                  <a:tcPr/>
+                </a:tc>
+                <a:tc>
+                  <a:txBody>
+                    <a:bodyPr/>
+                    <a:lstStyle/>
+                    <a:p>
+                      <a:r>
+                        <a:rPr lang="en-US" sz="1100" dirty="0"/>
+                        <a:t>&lt; 0.05, model is significant</a:t>
+                      </a:r>
+                    </a:p>
+                  </a:txBody>
+                  <a:tcPr/>
+                </a:tc>
+                <a:extLst>
+                  <a:ext uri="{0D108BD9-81ED-4DB2-BD59-A6C34878D82A}">
+                    <a16:rowId xmlns:a16="http://schemas.microsoft.com/office/drawing/2014/main" val="3771564984"/>
+                  </a:ext>
+                </a:extLst>
+              </a:tr>
+              <a:tr h="321733">
+                <a:tc>
+                  <a:txBody>
+                    <a:bodyPr/>
+                    <a:lstStyle/>
+                    <a:p>
+                      <a:r>
+                        <a:rPr lang="en-US" sz="1100" dirty="0"/>
+                        <a:t>7</a:t>
+                      </a:r>
+                    </a:p>
+                  </a:txBody>
+                  <a:tcPr/>
+                </a:tc>
+                <a:tc>
+                  <a:txBody>
+                    <a:bodyPr/>
+                    <a:lstStyle/>
+                    <a:p>
+                      <a:r>
+                        <a:rPr lang="en-US" sz="1100" dirty="0"/>
+                        <a:t>Omnibus</a:t>
+                      </a:r>
+                    </a:p>
+                  </a:txBody>
+                  <a:tcPr/>
+                </a:tc>
+                <a:tc>
+                  <a:txBody>
+                    <a:bodyPr/>
+                    <a:lstStyle/>
+                    <a:p>
+                      <a:r>
+                        <a:rPr lang="en-US" sz="1100" dirty="0"/>
+                        <a:t>Value close to </a:t>
+                      </a:r>
+                      <a:r>
+                        <a:rPr lang="en-US" sz="1100" dirty="0">
+                          <a:latin typeface="Arial" panose="020B0604020202020204" pitchFamily="34" charset="0"/>
+                          <a:cs typeface="Arial" panose="020B0604020202020204" pitchFamily="34" charset="0"/>
+                        </a:rPr>
+                        <a:t>0</a:t>
+                      </a:r>
+                      <a:r>
+                        <a:rPr lang="en-US" sz="1100" dirty="0"/>
+                        <a:t> (indicates Normalcy)</a:t>
+                      </a:r>
+                    </a:p>
+                  </a:txBody>
+                  <a:tcPr/>
+                </a:tc>
+                <a:extLst>
+                  <a:ext uri="{0D108BD9-81ED-4DB2-BD59-A6C34878D82A}">
+                    <a16:rowId xmlns:a16="http://schemas.microsoft.com/office/drawing/2014/main" val="3754087557"/>
+                  </a:ext>
+                </a:extLst>
+              </a:tr>
+              <a:tr h="321733">
+                <a:tc>
+                  <a:txBody>
+                    <a:bodyPr/>
+                    <a:lstStyle/>
+                    <a:p>
+                      <a:r>
+                        <a:rPr lang="en-US" sz="1100" dirty="0"/>
+                        <a:t>8</a:t>
+                      </a:r>
+                    </a:p>
+                  </a:txBody>
+                  <a:tcPr/>
+                </a:tc>
+                <a:tc>
+                  <a:txBody>
+                    <a:bodyPr/>
+                    <a:lstStyle/>
+                    <a:p>
+                      <a:r>
+                        <a:rPr lang="en-US" sz="1100" dirty="0"/>
+                        <a:t>Prob(Omnibus)</a:t>
+                      </a:r>
+                    </a:p>
+                  </a:txBody>
+                  <a:tcPr/>
+                </a:tc>
+                <a:tc>
+                  <a:txBody>
+                    <a:bodyPr/>
+                    <a:lstStyle/>
+                    <a:p>
+                      <a:r>
+                        <a:rPr lang="en-US" sz="1100" dirty="0"/>
+                        <a:t>Value close to </a:t>
+                      </a:r>
+                      <a:r>
+                        <a:rPr lang="en-US" sz="1100" dirty="0">
+                          <a:latin typeface="Arial" panose="020B0604020202020204" pitchFamily="34" charset="0"/>
+                          <a:cs typeface="Arial" panose="020B0604020202020204" pitchFamily="34" charset="0"/>
+                        </a:rPr>
+                        <a:t>1</a:t>
+                      </a:r>
+                      <a:endParaRPr lang="en-US" sz="1100" dirty="0"/>
+                    </a:p>
+                  </a:txBody>
+                  <a:tcPr/>
+                </a:tc>
+                <a:extLst>
+                  <a:ext uri="{0D108BD9-81ED-4DB2-BD59-A6C34878D82A}">
+                    <a16:rowId xmlns:a16="http://schemas.microsoft.com/office/drawing/2014/main" val="1818267983"/>
+                  </a:ext>
+                </a:extLst>
+              </a:tr>
+              <a:tr h="321733">
+                <a:tc>
+                  <a:txBody>
+                    <a:bodyPr/>
+                    <a:lstStyle/>
+                    <a:p>
+                      <a:r>
+                        <a:rPr lang="en-US" sz="1100" dirty="0"/>
+                        <a:t>9</a:t>
+                      </a:r>
+                    </a:p>
+                  </a:txBody>
+                  <a:tcPr/>
+                </a:tc>
+                <a:tc>
+                  <a:txBody>
+                    <a:bodyPr/>
+                    <a:lstStyle/>
+                    <a:p>
+                      <a:r>
+                        <a:rPr lang="en-US" sz="1100" dirty="0"/>
+                        <a:t>Skew</a:t>
+                      </a:r>
+                    </a:p>
+                  </a:txBody>
+                  <a:tcPr/>
+                </a:tc>
+                <a:tc>
+                  <a:txBody>
+                    <a:bodyPr/>
+                    <a:lstStyle/>
+                    <a:p>
+                      <a:r>
+                        <a:rPr lang="en-US" sz="1100" dirty="0"/>
+                        <a:t>Value close to 0 (indicates Normalcy)</a:t>
+                      </a:r>
+                    </a:p>
+                  </a:txBody>
+                  <a:tcPr/>
+                </a:tc>
+                <a:extLst>
+                  <a:ext uri="{0D108BD9-81ED-4DB2-BD59-A6C34878D82A}">
+                    <a16:rowId xmlns:a16="http://schemas.microsoft.com/office/drawing/2014/main" val="1942282061"/>
+                  </a:ext>
+                </a:extLst>
+              </a:tr>
+              <a:tr h="321733">
+                <a:tc>
+                  <a:txBody>
+                    <a:bodyPr/>
+                    <a:lstStyle/>
+                    <a:p>
+                      <a:r>
+                        <a:rPr lang="en-US" sz="1100" dirty="0"/>
+                        <a:t>10</a:t>
+                      </a:r>
+                    </a:p>
+                  </a:txBody>
+                  <a:tcPr/>
+                </a:tc>
+                <a:tc>
+                  <a:txBody>
+                    <a:bodyPr/>
+                    <a:lstStyle/>
+                    <a:p>
+                      <a:r>
+                        <a:rPr lang="en-US" sz="1100" dirty="0"/>
+                        <a:t>Kurtosis</a:t>
+                      </a:r>
+                    </a:p>
+                  </a:txBody>
+                  <a:tcPr/>
+                </a:tc>
+                <a:tc>
+                  <a:txBody>
+                    <a:bodyPr/>
+                    <a:lstStyle/>
+                    <a:p>
+                      <a:r>
+                        <a:rPr lang="en-US" sz="1100" dirty="0"/>
+                        <a:t>Value = 3, ideally indicates Normalcy</a:t>
+                      </a:r>
+                    </a:p>
+                    <a:p>
+                      <a:r>
+                        <a:rPr lang="en-US" sz="1100" dirty="0"/>
+                        <a:t>Ranges from </a:t>
+                      </a:r>
+                      <a:r>
+                        <a:rPr lang="en-US" sz="1100" dirty="0">
+                          <a:latin typeface="Arial" panose="020B0604020202020204" pitchFamily="34" charset="0"/>
+                          <a:cs typeface="Arial" panose="020B0604020202020204" pitchFamily="34" charset="0"/>
+                        </a:rPr>
+                        <a:t>1</a:t>
+                      </a:r>
+                      <a:r>
+                        <a:rPr lang="en-US" sz="1100" dirty="0"/>
+                        <a:t> to infinity</a:t>
+                      </a:r>
+                    </a:p>
+                  </a:txBody>
+                  <a:tcPr/>
+                </a:tc>
+                <a:extLst>
+                  <a:ext uri="{0D108BD9-81ED-4DB2-BD59-A6C34878D82A}">
+                    <a16:rowId xmlns:a16="http://schemas.microsoft.com/office/drawing/2014/main" val="859782203"/>
+                  </a:ext>
+                </a:extLst>
+              </a:tr>
+              <a:tr h="321733">
+                <a:tc>
+                  <a:txBody>
+                    <a:bodyPr/>
+                    <a:lstStyle/>
+                    <a:p>
+                      <a:r>
+                        <a:rPr lang="en-US" sz="1100" dirty="0"/>
+                        <a:t>11</a:t>
+                      </a:r>
+                    </a:p>
+                  </a:txBody>
+                  <a:tcPr/>
+                </a:tc>
+                <a:tc>
+                  <a:txBody>
+                    <a:bodyPr/>
+                    <a:lstStyle/>
+                    <a:p>
+                      <a:r>
+                        <a:rPr lang="en-US" sz="1100" dirty="0"/>
+                        <a:t>Durbin – Watson</a:t>
+                      </a:r>
+                    </a:p>
+                  </a:txBody>
+                  <a:tcPr/>
+                </a:tc>
+                <a:tc>
+                  <a:txBody>
+                    <a:bodyPr/>
+                    <a:lstStyle/>
+                    <a:p>
+                      <a:r>
+                        <a:rPr lang="en-US" sz="1100" dirty="0"/>
+                        <a:t>Value between </a:t>
+                      </a:r>
+                      <a:r>
+                        <a:rPr lang="en-US" sz="1100" dirty="0">
+                          <a:latin typeface="Arial" panose="020B0604020202020204" pitchFamily="34" charset="0"/>
+                          <a:cs typeface="Arial" panose="020B0604020202020204" pitchFamily="34" charset="0"/>
+                        </a:rPr>
+                        <a:t>1</a:t>
+                      </a:r>
+                      <a:r>
+                        <a:rPr lang="en-US" sz="1100" dirty="0"/>
+                        <a:t> to 2</a:t>
+                      </a:r>
+                    </a:p>
+                  </a:txBody>
+                  <a:tcPr/>
+                </a:tc>
+                <a:extLst>
+                  <a:ext uri="{0D108BD9-81ED-4DB2-BD59-A6C34878D82A}">
+                    <a16:rowId xmlns:a16="http://schemas.microsoft.com/office/drawing/2014/main" val="3891293155"/>
+                  </a:ext>
+                </a:extLst>
+              </a:tr>
+              <a:tr h="321733">
+                <a:tc>
+                  <a:txBody>
+                    <a:bodyPr/>
+                    <a:lstStyle/>
+                    <a:p>
+                      <a:r>
+                        <a:rPr lang="en-US" sz="1100" dirty="0"/>
+                        <a:t>12</a:t>
+                      </a:r>
+                    </a:p>
+                  </a:txBody>
+                  <a:tcPr/>
+                </a:tc>
+                <a:tc>
+                  <a:txBody>
+                    <a:bodyPr/>
+                    <a:lstStyle/>
+                    <a:p>
+                      <a:r>
+                        <a:rPr lang="en-US" sz="1100" dirty="0"/>
+                        <a:t>Prob (JB)</a:t>
+                      </a:r>
+                    </a:p>
+                  </a:txBody>
+                  <a:tcPr/>
+                </a:tc>
+                <a:tc>
+                  <a:txBody>
+                    <a:bodyPr/>
+                    <a:lstStyle/>
+                    <a:p>
+                      <a:r>
+                        <a:rPr lang="en-US" sz="1100" dirty="0"/>
+                        <a:t>&lt; 0.05 , Reject Null, Data not normally distributed</a:t>
+                      </a:r>
+                    </a:p>
+                    <a:p>
+                      <a:r>
+                        <a:rPr lang="en-US" sz="1100" dirty="0"/>
+                        <a:t>&gt; 0.05, Fail to Reject Null, Data Normalcy</a:t>
+                      </a:r>
+                    </a:p>
+                  </a:txBody>
+                  <a:tcPr/>
+                </a:tc>
+                <a:extLst>
+                  <a:ext uri="{0D108BD9-81ED-4DB2-BD59-A6C34878D82A}">
+                    <a16:rowId xmlns:a16="http://schemas.microsoft.com/office/drawing/2014/main" val="1842636786"/>
+                  </a:ext>
+                </a:extLst>
+              </a:tr>
+              <a:tr h="321733">
+                <a:tc>
+                  <a:txBody>
+                    <a:bodyPr/>
+                    <a:lstStyle/>
+                    <a:p>
+                      <a:r>
+                        <a:rPr lang="en-US" sz="1100" dirty="0"/>
+                        <a:t>13</a:t>
+                      </a:r>
+                    </a:p>
+                  </a:txBody>
+                  <a:tcPr/>
+                </a:tc>
+                <a:tc>
+                  <a:txBody>
+                    <a:bodyPr/>
+                    <a:lstStyle/>
+                    <a:p>
+                      <a:r>
+                        <a:rPr lang="en-US" sz="1100" dirty="0"/>
+                        <a:t>Condition Number</a:t>
+                      </a:r>
+                    </a:p>
+                  </a:txBody>
+                  <a:tcPr/>
+                </a:tc>
+                <a:tc>
+                  <a:txBody>
+                    <a:bodyPr/>
+                    <a:lstStyle/>
+                    <a:p>
+                      <a:r>
+                        <a:rPr lang="en-US" sz="1100" dirty="0"/>
+                        <a:t>Value less than 30</a:t>
+                      </a:r>
+                    </a:p>
+                  </a:txBody>
+                  <a:tcPr/>
+                </a:tc>
+                <a:extLst>
+                  <a:ext uri="{0D108BD9-81ED-4DB2-BD59-A6C34878D82A}">
+                    <a16:rowId xmlns:a16="http://schemas.microsoft.com/office/drawing/2014/main" val="1054530335"/>
+                  </a:ext>
+                </a:extLst>
+              </a:tr>
+            </a:tbl>
+          </a:graphicData>
+        </a:graphic>
+      </p:graphicFrame>
     </p:spTree>
     <p:extLst>
       <p:ext uri="{BB962C8B-B14F-4D97-AF65-F5344CB8AC3E}">
@@ -11090,14 +11907,20 @@
       </p:grpSpPr>
       <p:sp>
         <p:nvSpPr>
-          <p:cNvPr id="2" name="TextBox 1"/>
+          <p:cNvPr id="3" name="TextBox 2">
+            <a:extLst>
+              <a:ext uri="{FF2B5EF4-FFF2-40B4-BE49-F238E27FC236}">
+                <a16:creationId xmlns:a16="http://schemas.microsoft.com/office/drawing/2014/main" id="{E251E6EC-D86D-458F-BBD8-900544B2D0A7}"/>
+              </a:ext>
+            </a:extLst>
+          </p:cNvPr>
           <p:cNvSpPr txBox="1"/>
           <p:nvPr/>
         </p:nvSpPr>
         <p:spPr>
           <a:xfrm>
-            <a:off x="2924725" y="457201"/>
-            <a:ext cx="3419206" cy="646331"/>
+            <a:off x="3757276" y="3105834"/>
+            <a:ext cx="1629485" cy="646331"/>
           </a:xfrm>
           <a:prstGeom prst="rect">
             <a:avLst/>
@@ -11116,45 +11939,19 @@
                 <a:latin typeface="Calibri" pitchFamily="34" charset="0"/>
                 <a:cs typeface="Calibri" pitchFamily="34" charset="0"/>
               </a:rPr>
-              <a:t>Summary so far…</a:t>
-            </a:r>
-          </a:p>
-        </p:txBody>
-      </p:sp>
-      <p:pic>
-        <p:nvPicPr>
-          <p:cNvPr id="7" name="Picture 6">
-            <a:extLst>
-              <a:ext uri="{FF2B5EF4-FFF2-40B4-BE49-F238E27FC236}">
-                <a16:creationId xmlns:a16="http://schemas.microsoft.com/office/drawing/2014/main" id="{DB7FF83D-279D-40A5-A5B0-0E5A906CEE93}"/>
-              </a:ext>
-            </a:extLst>
-          </p:cNvPr>
-          <p:cNvPicPr>
-            <a:picLocks noChangeAspect="1"/>
-          </p:cNvPicPr>
-          <p:nvPr/>
-        </p:nvPicPr>
-        <p:blipFill>
-          <a:blip r:embed="rId2"/>
-          <a:stretch>
-            <a:fillRect/>
-          </a:stretch>
-        </p:blipFill>
-        <p:spPr>
-          <a:xfrm>
-            <a:off x="347662" y="1981200"/>
-            <a:ext cx="8448675" cy="2895600"/>
-          </a:xfrm>
-          <a:prstGeom prst="rect">
-            <a:avLst/>
-          </a:prstGeom>
-        </p:spPr>
-      </p:pic>
+              <a:t>So Far…</a:t>
+            </a:r>
+            <a:endParaRPr lang="en-US" sz="2400" dirty="0">
+              <a:latin typeface="Calibri" pitchFamily="34" charset="0"/>
+              <a:cs typeface="Calibri" pitchFamily="34" charset="0"/>
+            </a:endParaRPr>
+          </a:p>
+        </p:txBody>
+      </p:sp>
     </p:spTree>
     <p:extLst>
       <p:ext uri="{BB962C8B-B14F-4D97-AF65-F5344CB8AC3E}">
-        <p14:creationId xmlns:p14="http://schemas.microsoft.com/office/powerpoint/2010/main" val="3424201464"/>
+        <p14:creationId xmlns:p14="http://schemas.microsoft.com/office/powerpoint/2010/main" val="2672237849"/>
       </p:ext>
     </p:extLst>
   </p:cSld>
@@ -11183,14 +11980,14 @@
       </p:grpSpPr>
       <p:sp>
         <p:nvSpPr>
-          <p:cNvPr id="4" name="TextBox 3"/>
+          <p:cNvPr id="2" name="TextBox 1"/>
           <p:cNvSpPr txBox="1"/>
           <p:nvPr/>
         </p:nvSpPr>
         <p:spPr>
           <a:xfrm>
-            <a:off x="1034972" y="3105834"/>
-            <a:ext cx="7074116" cy="646331"/>
+            <a:off x="2924725" y="457201"/>
+            <a:ext cx="3419206" cy="646331"/>
           </a:xfrm>
           <a:prstGeom prst="rect">
             <a:avLst/>
@@ -11209,19 +12006,45 @@
                 <a:latin typeface="Calibri" pitchFamily="34" charset="0"/>
                 <a:cs typeface="Calibri" pitchFamily="34" charset="0"/>
               </a:rPr>
-              <a:t>Linear Regression (OLS) Assumptions</a:t>
-            </a:r>
-            <a:endParaRPr lang="en-US" sz="2400" dirty="0">
-              <a:latin typeface="Calibri" pitchFamily="34" charset="0"/>
-              <a:cs typeface="Calibri" pitchFamily="34" charset="0"/>
-            </a:endParaRPr>
-          </a:p>
-        </p:txBody>
-      </p:sp>
+              <a:t>Summary so far…</a:t>
+            </a:r>
+          </a:p>
+        </p:txBody>
+      </p:sp>
+      <p:pic>
+        <p:nvPicPr>
+          <p:cNvPr id="7" name="Picture 6">
+            <a:extLst>
+              <a:ext uri="{FF2B5EF4-FFF2-40B4-BE49-F238E27FC236}">
+                <a16:creationId xmlns:a16="http://schemas.microsoft.com/office/drawing/2014/main" id="{DB7FF83D-279D-40A5-A5B0-0E5A906CEE93}"/>
+              </a:ext>
+            </a:extLst>
+          </p:cNvPr>
+          <p:cNvPicPr>
+            <a:picLocks noChangeAspect="1"/>
+          </p:cNvPicPr>
+          <p:nvPr/>
+        </p:nvPicPr>
+        <p:blipFill>
+          <a:blip r:embed="rId2"/>
+          <a:stretch>
+            <a:fillRect/>
+          </a:stretch>
+        </p:blipFill>
+        <p:spPr>
+          <a:xfrm>
+            <a:off x="347662" y="1981200"/>
+            <a:ext cx="8448675" cy="2895600"/>
+          </a:xfrm>
+          <a:prstGeom prst="rect">
+            <a:avLst/>
+          </a:prstGeom>
+        </p:spPr>
+      </p:pic>
     </p:spTree>
     <p:extLst>
       <p:ext uri="{BB962C8B-B14F-4D97-AF65-F5344CB8AC3E}">
-        <p14:creationId xmlns:p14="http://schemas.microsoft.com/office/powerpoint/2010/main" val="720540853"/>
+        <p14:creationId xmlns:p14="http://schemas.microsoft.com/office/powerpoint/2010/main" val="3424201464"/>
       </p:ext>
     </p:extLst>
   </p:cSld>
@@ -11250,6 +12073,73 @@
       </p:grpSpPr>
       <p:sp>
         <p:nvSpPr>
+          <p:cNvPr id="4" name="TextBox 3"/>
+          <p:cNvSpPr txBox="1"/>
+          <p:nvPr/>
+        </p:nvSpPr>
+        <p:spPr>
+          <a:xfrm>
+            <a:off x="1034972" y="3105834"/>
+            <a:ext cx="7074116" cy="646331"/>
+          </a:xfrm>
+          <a:prstGeom prst="rect">
+            <a:avLst/>
+          </a:prstGeom>
+          <a:noFill/>
+        </p:spPr>
+        <p:txBody>
+          <a:bodyPr wrap="none" rtlCol="0">
+            <a:spAutoFit/>
+          </a:bodyPr>
+          <a:lstStyle/>
+          <a:p>
+            <a:pPr algn="ctr"/>
+            <a:r>
+              <a:rPr lang="en-US" sz="3600" dirty="0">
+                <a:latin typeface="Calibri" pitchFamily="34" charset="0"/>
+                <a:cs typeface="Calibri" pitchFamily="34" charset="0"/>
+              </a:rPr>
+              <a:t>Linear Regression (OLS) Assumptions</a:t>
+            </a:r>
+            <a:endParaRPr lang="en-US" sz="2400" dirty="0">
+              <a:latin typeface="Calibri" pitchFamily="34" charset="0"/>
+              <a:cs typeface="Calibri" pitchFamily="34" charset="0"/>
+            </a:endParaRPr>
+          </a:p>
+        </p:txBody>
+      </p:sp>
+    </p:spTree>
+    <p:extLst>
+      <p:ext uri="{BB962C8B-B14F-4D97-AF65-F5344CB8AC3E}">
+        <p14:creationId xmlns:p14="http://schemas.microsoft.com/office/powerpoint/2010/main" val="720540853"/>
+      </p:ext>
+    </p:extLst>
+  </p:cSld>
+  <p:clrMapOvr>
+    <a:masterClrMapping/>
+  </p:clrMapOvr>
+</p:sld>
+</file>
+
+<file path=ppt/slides/slide37.xml><?xml version="1.0" encoding="utf-8"?>
+<p:sld xmlns:a="http://schemas.openxmlformats.org/drawingml/2006/main" xmlns:r="http://schemas.openxmlformats.org/officeDocument/2006/relationships" xmlns:p="http://schemas.openxmlformats.org/presentationml/2006/main">
+  <p:cSld>
+    <p:spTree>
+      <p:nvGrpSpPr>
+        <p:cNvPr id="1" name=""/>
+        <p:cNvGrpSpPr/>
+        <p:nvPr/>
+      </p:nvGrpSpPr>
+      <p:grpSpPr>
+        <a:xfrm>
+          <a:off x="0" y="0"/>
+          <a:ext cx="0" cy="0"/>
+          <a:chOff x="0" y="0"/>
+          <a:chExt cx="0" cy="0"/>
+        </a:xfrm>
+      </p:grpSpPr>
+      <p:sp>
+        <p:nvSpPr>
           <p:cNvPr id="2" name="TextBox 1"/>
           <p:cNvSpPr txBox="1"/>
           <p:nvPr/>
@@ -11446,7 +12336,7 @@
 </p:sld>
 </file>
 
-<file path=ppt/slides/slide37.xml><?xml version="1.0" encoding="utf-8"?>
+<file path=ppt/slides/slide38.xml><?xml version="1.0" encoding="utf-8"?>
 <p:sld xmlns:a="http://schemas.openxmlformats.org/drawingml/2006/main" xmlns:r="http://schemas.openxmlformats.org/officeDocument/2006/relationships" xmlns:p="http://schemas.openxmlformats.org/presentationml/2006/main">
   <p:cSld>
     <p:spTree>
@@ -11868,190 +12758,6 @@
 </p:sld>
 </file>
 
-<file path=ppt/slides/slide38.xml><?xml version="1.0" encoding="utf-8"?>
-<p:sld xmlns:a="http://schemas.openxmlformats.org/drawingml/2006/main" xmlns:r="http://schemas.openxmlformats.org/officeDocument/2006/relationships" xmlns:p="http://schemas.openxmlformats.org/presentationml/2006/main">
-  <p:cSld>
-    <p:spTree>
-      <p:nvGrpSpPr>
-        <p:cNvPr id="1" name=""/>
-        <p:cNvGrpSpPr/>
-        <p:nvPr/>
-      </p:nvGrpSpPr>
-      <p:grpSpPr>
-        <a:xfrm>
-          <a:off x="0" y="0"/>
-          <a:ext cx="0" cy="0"/>
-          <a:chOff x="0" y="0"/>
-          <a:chExt cx="0" cy="0"/>
-        </a:xfrm>
-      </p:grpSpPr>
-      <p:sp>
-        <p:nvSpPr>
-          <p:cNvPr id="2" name="TextBox 1"/>
-          <p:cNvSpPr txBox="1"/>
-          <p:nvPr/>
-        </p:nvSpPr>
-        <p:spPr>
-          <a:xfrm>
-            <a:off x="762000" y="457201"/>
-            <a:ext cx="7074116" cy="646331"/>
-          </a:xfrm>
-          <a:prstGeom prst="rect">
-            <a:avLst/>
-          </a:prstGeom>
-          <a:noFill/>
-        </p:spPr>
-        <p:txBody>
-          <a:bodyPr wrap="none" rtlCol="0">
-            <a:spAutoFit/>
-          </a:bodyPr>
-          <a:lstStyle/>
-          <a:p>
-            <a:r>
-              <a:rPr lang="en-US" sz="3600" dirty="0">
-                <a:latin typeface="Calibri" pitchFamily="34" charset="0"/>
-                <a:cs typeface="Calibri" pitchFamily="34" charset="0"/>
-              </a:rPr>
-              <a:t>Linear Regression (OLS) Assumptions</a:t>
-            </a:r>
-          </a:p>
-        </p:txBody>
-      </p:sp>
-      <p:sp>
-        <p:nvSpPr>
-          <p:cNvPr id="6" name="TextBox 5">
-            <a:extLst>
-              <a:ext uri="{FF2B5EF4-FFF2-40B4-BE49-F238E27FC236}">
-                <a16:creationId xmlns:a16="http://schemas.microsoft.com/office/drawing/2014/main" id="{A3585BB0-2513-4FD6-9854-13BEBA99DD39}"/>
-              </a:ext>
-            </a:extLst>
-          </p:cNvPr>
-          <p:cNvSpPr txBox="1"/>
-          <p:nvPr/>
-        </p:nvSpPr>
-        <p:spPr>
-          <a:xfrm>
-            <a:off x="752622" y="1371600"/>
-            <a:ext cx="7934178" cy="4247317"/>
-          </a:xfrm>
-          <a:prstGeom prst="rect">
-            <a:avLst/>
-          </a:prstGeom>
-          <a:noFill/>
-        </p:spPr>
-        <p:txBody>
-          <a:bodyPr wrap="square" rtlCol="0">
-            <a:spAutoFit/>
-          </a:bodyPr>
-          <a:lstStyle/>
-          <a:p>
-            <a:pPr>
-              <a:lnSpc>
-                <a:spcPct val="150000"/>
-              </a:lnSpc>
-            </a:pPr>
-            <a:r>
-              <a:rPr lang="en-US" sz="2000" b="1" dirty="0">
-                <a:latin typeface="Calibri" pitchFamily="34" charset="0"/>
-                <a:cs typeface="Calibri" pitchFamily="34" charset="0"/>
-              </a:rPr>
-              <a:t>No endogeneity: </a:t>
-            </a:r>
-            <a:r>
-              <a:rPr lang="en-US" sz="2000" dirty="0">
-                <a:latin typeface="Calibri" pitchFamily="34" charset="0"/>
-                <a:cs typeface="Calibri" pitchFamily="34" charset="0"/>
-              </a:rPr>
-              <a:t>It is related to the problem of </a:t>
-            </a:r>
-            <a:r>
-              <a:rPr lang="en-US" sz="2000" b="1" dirty="0">
-                <a:latin typeface="Calibri" pitchFamily="34" charset="0"/>
-                <a:cs typeface="Calibri" pitchFamily="34" charset="0"/>
-              </a:rPr>
-              <a:t>‘Omitted </a:t>
-            </a:r>
-            <a:r>
-              <a:rPr lang="en-US" sz="2000" b="1">
-                <a:latin typeface="Calibri" pitchFamily="34" charset="0"/>
-                <a:cs typeface="Calibri" pitchFamily="34" charset="0"/>
-              </a:rPr>
-              <a:t>Variable bias </a:t>
-            </a:r>
-            <a:endParaRPr lang="en-US" sz="2000" dirty="0">
-              <a:latin typeface="Calibri" pitchFamily="34" charset="0"/>
-              <a:cs typeface="Calibri" pitchFamily="34" charset="0"/>
-            </a:endParaRPr>
-          </a:p>
-          <a:p>
-            <a:r>
-              <a:rPr lang="en-US" sz="2000" dirty="0">
-                <a:latin typeface="Calibri" pitchFamily="34" charset="0"/>
-                <a:cs typeface="Calibri" pitchFamily="34" charset="0"/>
-              </a:rPr>
-              <a:t>Basically, it is very well possible that all your included variables do not explain the variability of the regression model. You might have missed to include the relevant variable in the model, which leads to incorrect and bias results.</a:t>
-            </a:r>
-          </a:p>
-          <a:p>
-            <a:endParaRPr lang="en-US" sz="2000" dirty="0">
-              <a:latin typeface="Calibri" pitchFamily="34" charset="0"/>
-              <a:cs typeface="Calibri" pitchFamily="34" charset="0"/>
-            </a:endParaRPr>
-          </a:p>
-          <a:p>
-            <a:r>
-              <a:rPr lang="en-US" sz="2000" dirty="0">
-                <a:latin typeface="Calibri" pitchFamily="34" charset="0"/>
-                <a:cs typeface="Calibri" pitchFamily="34" charset="0"/>
-              </a:rPr>
-              <a:t>Possibly, your dependent variable y, may be correlated with the missed variable and hence causing the pains with your model.</a:t>
-            </a:r>
-          </a:p>
-          <a:p>
-            <a:endParaRPr lang="en-US" sz="2000" dirty="0">
-              <a:latin typeface="Calibri" pitchFamily="34" charset="0"/>
-              <a:cs typeface="Calibri" pitchFamily="34" charset="0"/>
-            </a:endParaRPr>
-          </a:p>
-          <a:p>
-            <a:r>
-              <a:rPr lang="en-US" sz="2000" dirty="0">
-                <a:latin typeface="Calibri" pitchFamily="34" charset="0"/>
-                <a:cs typeface="Calibri" pitchFamily="34" charset="0"/>
-              </a:rPr>
-              <a:t>However, caution is advised to tackle Omitted variable bias as incorrect inclusion of variables leads to inefficient estimated/models.</a:t>
-            </a:r>
-          </a:p>
-          <a:p>
-            <a:endParaRPr lang="en-US" sz="2000" dirty="0">
-              <a:latin typeface="Calibri" pitchFamily="34" charset="0"/>
-              <a:cs typeface="Calibri" pitchFamily="34" charset="0"/>
-            </a:endParaRPr>
-          </a:p>
-          <a:p>
-            <a:r>
-              <a:rPr lang="en-US" sz="2000" dirty="0">
-                <a:latin typeface="Calibri" pitchFamily="34" charset="0"/>
-                <a:cs typeface="Calibri" pitchFamily="34" charset="0"/>
-              </a:rPr>
-              <a:t>So when in doubt, just include the variables and try your luck.</a:t>
-            </a:r>
-          </a:p>
-        </p:txBody>
-      </p:sp>
-    </p:spTree>
-    <p:extLst>
-      <p:ext uri="{BB962C8B-B14F-4D97-AF65-F5344CB8AC3E}">
-        <p14:creationId xmlns:p14="http://schemas.microsoft.com/office/powerpoint/2010/main" val="3373970099"/>
-      </p:ext>
-    </p:extLst>
-  </p:cSld>
-  <p:clrMapOvr>
-    <a:masterClrMapping/>
-  </p:clrMapOvr>
-</p:sld>
-</file>
-
 <file path=ppt/slides/slide39.xml><?xml version="1.0" encoding="utf-8"?>
 <p:sld xmlns:a="http://schemas.openxmlformats.org/drawingml/2006/main" xmlns:r="http://schemas.openxmlformats.org/officeDocument/2006/relationships" xmlns:p="http://schemas.openxmlformats.org/presentationml/2006/main">
   <p:cSld>
@@ -12116,7 +12822,7 @@
         <p:spPr>
           <a:xfrm>
             <a:off x="752622" y="1371600"/>
-            <a:ext cx="7934178" cy="4708981"/>
+            <a:ext cx="7934178" cy="4247317"/>
           </a:xfrm>
           <a:prstGeom prst="rect">
             <a:avLst/>
@@ -12129,79 +12835,39 @@
           </a:bodyPr>
           <a:lstStyle/>
           <a:p>
+            <a:pPr>
+              <a:lnSpc>
+                <a:spcPct val="150000"/>
+              </a:lnSpc>
+            </a:pPr>
             <a:r>
               <a:rPr lang="en-US" sz="2000" b="1" dirty="0">
                 <a:latin typeface="Calibri" pitchFamily="34" charset="0"/>
                 <a:cs typeface="Calibri" pitchFamily="34" charset="0"/>
               </a:rPr>
-              <a:t>Normality &amp; Homoscedasticity: </a:t>
-            </a:r>
-          </a:p>
-          <a:p>
+              <a:t>No endogeneity: </a:t>
+            </a:r>
             <a:r>
               <a:rPr lang="en-US" sz="2000" dirty="0">
                 <a:latin typeface="Calibri" pitchFamily="34" charset="0"/>
                 <a:cs typeface="Calibri" pitchFamily="34" charset="0"/>
               </a:rPr>
-              <a:t>It comprises of three parts (all for error term): </a:t>
-            </a:r>
-          </a:p>
-          <a:p>
-            <a:pPr marL="342900" indent="-342900">
-              <a:buFont typeface="Arial" panose="020B0604020202020204" pitchFamily="34" charset="0"/>
-              <a:buChar char="•"/>
-            </a:pPr>
-            <a:r>
-              <a:rPr lang="en-US" sz="2000" dirty="0">
-                <a:latin typeface="Calibri" pitchFamily="34" charset="0"/>
-                <a:cs typeface="Calibri" pitchFamily="34" charset="0"/>
-              </a:rPr>
-              <a:t>Normality</a:t>
-            </a:r>
-          </a:p>
-          <a:p>
-            <a:pPr marL="342900" indent="-342900">
-              <a:buFont typeface="Arial" panose="020B0604020202020204" pitchFamily="34" charset="0"/>
-              <a:buChar char="•"/>
-            </a:pPr>
-            <a:r>
-              <a:rPr lang="en-US" sz="2000" dirty="0">
-                <a:latin typeface="Calibri" pitchFamily="34" charset="0"/>
-                <a:cs typeface="Calibri" pitchFamily="34" charset="0"/>
-              </a:rPr>
-              <a:t>Zero Mean</a:t>
-            </a:r>
-          </a:p>
-          <a:p>
-            <a:pPr marL="342900" indent="-342900">
-              <a:buFont typeface="Arial" panose="020B0604020202020204" pitchFamily="34" charset="0"/>
-              <a:buChar char="•"/>
-            </a:pPr>
-            <a:r>
-              <a:rPr lang="en-US" sz="2000" dirty="0">
-                <a:latin typeface="Calibri" pitchFamily="34" charset="0"/>
-                <a:cs typeface="Calibri" pitchFamily="34" charset="0"/>
-              </a:rPr>
-              <a:t>Homoscedasticity</a:t>
-            </a:r>
-          </a:p>
-          <a:p>
+              <a:t>It is related to the problem of </a:t>
+            </a:r>
             <a:r>
               <a:rPr lang="en-US" sz="2000" b="1" dirty="0">
                 <a:latin typeface="Calibri" pitchFamily="34" charset="0"/>
                 <a:cs typeface="Calibri" pitchFamily="34" charset="0"/>
               </a:rPr>
-              <a:t>Normality: </a:t>
-            </a:r>
-            <a:r>
-              <a:rPr lang="en-US" sz="2000" dirty="0">
-                <a:latin typeface="Calibri" pitchFamily="34" charset="0"/>
-                <a:cs typeface="Calibri" pitchFamily="34" charset="0"/>
-              </a:rPr>
-              <a:t>Error term is normally distributed. Note that normal distribution is not required for creating the regression but for making inferences.</a:t>
-            </a:r>
-          </a:p>
-          <a:p>
+              <a:t>‘Omitted </a:t>
+            </a:r>
+            <a:r>
+              <a:rPr lang="en-US" sz="2000" b="1">
+                <a:latin typeface="Calibri" pitchFamily="34" charset="0"/>
+                <a:cs typeface="Calibri" pitchFamily="34" charset="0"/>
+              </a:rPr>
+              <a:t>Variable bias </a:t>
+            </a:r>
             <a:endParaRPr lang="en-US" sz="2000" dirty="0">
               <a:latin typeface="Calibri" pitchFamily="34" charset="0"/>
               <a:cs typeface="Calibri" pitchFamily="34" charset="0"/>
@@ -12213,7 +12879,7 @@
                 <a:latin typeface="Calibri" pitchFamily="34" charset="0"/>
                 <a:cs typeface="Calibri" pitchFamily="34" charset="0"/>
               </a:rPr>
-              <a:t>Remember the regression table with t-statistics and F-statistics, well all those works because we assume normality of the error term. </a:t>
+              <a:t>Basically, it is very well possible that all your included variables do not explain the variability of the regression model. You might have missed to include the relevant variable in the model, which leads to incorrect and bias results.</a:t>
             </a:r>
           </a:p>
           <a:p>
@@ -12228,35 +12894,45 @@
                 <a:latin typeface="Calibri" pitchFamily="34" charset="0"/>
                 <a:cs typeface="Calibri" pitchFamily="34" charset="0"/>
               </a:rPr>
-              <a:t>What should we do if error term is not normally distributed ? </a:t>
-            </a:r>
-          </a:p>
-          <a:p>
-            <a:r>
-              <a:rPr lang="en-US" sz="2000" b="1" dirty="0">
-                <a:latin typeface="Calibri" pitchFamily="34" charset="0"/>
-                <a:cs typeface="Calibri" pitchFamily="34" charset="0"/>
-              </a:rPr>
-              <a:t>The Central Limit Theorem</a:t>
-            </a:r>
-            <a:r>
-              <a:rPr lang="en-US" sz="2000" dirty="0">
-                <a:latin typeface="Calibri" pitchFamily="34" charset="0"/>
-                <a:cs typeface="Calibri" pitchFamily="34" charset="0"/>
-              </a:rPr>
-              <a:t>. For large samples the CLT applies for error term too. Hence we can consider normality as a given for us.</a:t>
-            </a:r>
-            <a:endParaRPr lang="en-US" sz="2000" b="1" dirty="0">
+              <a:t>Possibly, your dependent variable y, may be correlated with the missed variable and hence causing the pains with your model.</a:t>
+            </a:r>
+          </a:p>
+          <a:p>
+            <a:endParaRPr lang="en-US" sz="2000" dirty="0">
               <a:latin typeface="Calibri" pitchFamily="34" charset="0"/>
               <a:cs typeface="Calibri" pitchFamily="34" charset="0"/>
             </a:endParaRPr>
           </a:p>
+          <a:p>
+            <a:r>
+              <a:rPr lang="en-US" sz="2000" dirty="0">
+                <a:latin typeface="Calibri" pitchFamily="34" charset="0"/>
+                <a:cs typeface="Calibri" pitchFamily="34" charset="0"/>
+              </a:rPr>
+              <a:t>However, caution is advised to tackle Omitted variable bias as incorrect inclusion of variables leads to inefficient estimated/models.</a:t>
+            </a:r>
+          </a:p>
+          <a:p>
+            <a:endParaRPr lang="en-US" sz="2000" dirty="0">
+              <a:latin typeface="Calibri" pitchFamily="34" charset="0"/>
+              <a:cs typeface="Calibri" pitchFamily="34" charset="0"/>
+            </a:endParaRPr>
+          </a:p>
+          <a:p>
+            <a:r>
+              <a:rPr lang="en-US" sz="2000" dirty="0">
+                <a:latin typeface="Calibri" pitchFamily="34" charset="0"/>
+                <a:cs typeface="Calibri" pitchFamily="34" charset="0"/>
+              </a:rPr>
+              <a:t>So when in doubt, just include the variables and try your luck.</a:t>
+            </a:r>
+          </a:p>
         </p:txBody>
       </p:sp>
     </p:spTree>
     <p:extLst>
       <p:ext uri="{BB962C8B-B14F-4D97-AF65-F5344CB8AC3E}">
-        <p14:creationId xmlns:p14="http://schemas.microsoft.com/office/powerpoint/2010/main" val="870222783"/>
+        <p14:creationId xmlns:p14="http://schemas.microsoft.com/office/powerpoint/2010/main" val="3373970099"/>
       </p:ext>
     </p:extLst>
   </p:cSld>
@@ -12468,6 +13144,220 @@
         </p:nvSpPr>
         <p:spPr>
           <a:xfrm>
+            <a:off x="752622" y="1371600"/>
+            <a:ext cx="7934178" cy="4708981"/>
+          </a:xfrm>
+          <a:prstGeom prst="rect">
+            <a:avLst/>
+          </a:prstGeom>
+          <a:noFill/>
+        </p:spPr>
+        <p:txBody>
+          <a:bodyPr wrap="square" rtlCol="0">
+            <a:spAutoFit/>
+          </a:bodyPr>
+          <a:lstStyle/>
+          <a:p>
+            <a:r>
+              <a:rPr lang="en-US" sz="2000" b="1" dirty="0">
+                <a:latin typeface="Calibri" pitchFamily="34" charset="0"/>
+                <a:cs typeface="Calibri" pitchFamily="34" charset="0"/>
+              </a:rPr>
+              <a:t>Normality &amp; Homoscedasticity: </a:t>
+            </a:r>
+          </a:p>
+          <a:p>
+            <a:r>
+              <a:rPr lang="en-US" sz="2000" dirty="0">
+                <a:latin typeface="Calibri" pitchFamily="34" charset="0"/>
+                <a:cs typeface="Calibri" pitchFamily="34" charset="0"/>
+              </a:rPr>
+              <a:t>It comprises of three parts (all for error term): </a:t>
+            </a:r>
+          </a:p>
+          <a:p>
+            <a:pPr marL="342900" indent="-342900">
+              <a:buFont typeface="Arial" panose="020B0604020202020204" pitchFamily="34" charset="0"/>
+              <a:buChar char="•"/>
+            </a:pPr>
+            <a:r>
+              <a:rPr lang="en-US" sz="2000" dirty="0">
+                <a:latin typeface="Calibri" pitchFamily="34" charset="0"/>
+                <a:cs typeface="Calibri" pitchFamily="34" charset="0"/>
+              </a:rPr>
+              <a:t>Normality</a:t>
+            </a:r>
+          </a:p>
+          <a:p>
+            <a:pPr marL="342900" indent="-342900">
+              <a:buFont typeface="Arial" panose="020B0604020202020204" pitchFamily="34" charset="0"/>
+              <a:buChar char="•"/>
+            </a:pPr>
+            <a:r>
+              <a:rPr lang="en-US" sz="2000" dirty="0">
+                <a:latin typeface="Calibri" pitchFamily="34" charset="0"/>
+                <a:cs typeface="Calibri" pitchFamily="34" charset="0"/>
+              </a:rPr>
+              <a:t>Zero Mean</a:t>
+            </a:r>
+          </a:p>
+          <a:p>
+            <a:pPr marL="342900" indent="-342900">
+              <a:buFont typeface="Arial" panose="020B0604020202020204" pitchFamily="34" charset="0"/>
+              <a:buChar char="•"/>
+            </a:pPr>
+            <a:r>
+              <a:rPr lang="en-US" sz="2000" dirty="0">
+                <a:latin typeface="Calibri" pitchFamily="34" charset="0"/>
+                <a:cs typeface="Calibri" pitchFamily="34" charset="0"/>
+              </a:rPr>
+              <a:t>Homoscedasticity</a:t>
+            </a:r>
+          </a:p>
+          <a:p>
+            <a:r>
+              <a:rPr lang="en-US" sz="2000" b="1" dirty="0">
+                <a:latin typeface="Calibri" pitchFamily="34" charset="0"/>
+                <a:cs typeface="Calibri" pitchFamily="34" charset="0"/>
+              </a:rPr>
+              <a:t>Normality: </a:t>
+            </a:r>
+            <a:r>
+              <a:rPr lang="en-US" sz="2000" dirty="0">
+                <a:latin typeface="Calibri" pitchFamily="34" charset="0"/>
+                <a:cs typeface="Calibri" pitchFamily="34" charset="0"/>
+              </a:rPr>
+              <a:t>Error term is normally distributed. Note that normal distribution is not required for creating the regression but for making inferences.</a:t>
+            </a:r>
+          </a:p>
+          <a:p>
+            <a:endParaRPr lang="en-US" sz="2000" dirty="0">
+              <a:latin typeface="Calibri" pitchFamily="34" charset="0"/>
+              <a:cs typeface="Calibri" pitchFamily="34" charset="0"/>
+            </a:endParaRPr>
+          </a:p>
+          <a:p>
+            <a:r>
+              <a:rPr lang="en-US" sz="2000" dirty="0">
+                <a:latin typeface="Calibri" pitchFamily="34" charset="0"/>
+                <a:cs typeface="Calibri" pitchFamily="34" charset="0"/>
+              </a:rPr>
+              <a:t>Remember the regression table with t-statistics and F-statistics, well all those works because we assume normality of the error term. </a:t>
+            </a:r>
+          </a:p>
+          <a:p>
+            <a:endParaRPr lang="en-US" sz="2000" dirty="0">
+              <a:latin typeface="Calibri" pitchFamily="34" charset="0"/>
+              <a:cs typeface="Calibri" pitchFamily="34" charset="0"/>
+            </a:endParaRPr>
+          </a:p>
+          <a:p>
+            <a:r>
+              <a:rPr lang="en-US" sz="2000" dirty="0">
+                <a:latin typeface="Calibri" pitchFamily="34" charset="0"/>
+                <a:cs typeface="Calibri" pitchFamily="34" charset="0"/>
+              </a:rPr>
+              <a:t>What should we do if error term is not normally distributed ? </a:t>
+            </a:r>
+          </a:p>
+          <a:p>
+            <a:r>
+              <a:rPr lang="en-US" sz="2000" b="1" dirty="0">
+                <a:latin typeface="Calibri" pitchFamily="34" charset="0"/>
+                <a:cs typeface="Calibri" pitchFamily="34" charset="0"/>
+              </a:rPr>
+              <a:t>The Central Limit Theorem</a:t>
+            </a:r>
+            <a:r>
+              <a:rPr lang="en-US" sz="2000" dirty="0">
+                <a:latin typeface="Calibri" pitchFamily="34" charset="0"/>
+                <a:cs typeface="Calibri" pitchFamily="34" charset="0"/>
+              </a:rPr>
+              <a:t>. For large samples the CLT applies for error term too. Hence we can consider normality as a given for us.</a:t>
+            </a:r>
+            <a:endParaRPr lang="en-US" sz="2000" b="1" dirty="0">
+              <a:latin typeface="Calibri" pitchFamily="34" charset="0"/>
+              <a:cs typeface="Calibri" pitchFamily="34" charset="0"/>
+            </a:endParaRPr>
+          </a:p>
+        </p:txBody>
+      </p:sp>
+    </p:spTree>
+    <p:extLst>
+      <p:ext uri="{BB962C8B-B14F-4D97-AF65-F5344CB8AC3E}">
+        <p14:creationId xmlns:p14="http://schemas.microsoft.com/office/powerpoint/2010/main" val="870222783"/>
+      </p:ext>
+    </p:extLst>
+  </p:cSld>
+  <p:clrMapOvr>
+    <a:masterClrMapping/>
+  </p:clrMapOvr>
+</p:sld>
+</file>
+
+<file path=ppt/slides/slide41.xml><?xml version="1.0" encoding="utf-8"?>
+<p:sld xmlns:a="http://schemas.openxmlformats.org/drawingml/2006/main" xmlns:r="http://schemas.openxmlformats.org/officeDocument/2006/relationships" xmlns:p="http://schemas.openxmlformats.org/presentationml/2006/main">
+  <p:cSld>
+    <p:spTree>
+      <p:nvGrpSpPr>
+        <p:cNvPr id="1" name=""/>
+        <p:cNvGrpSpPr/>
+        <p:nvPr/>
+      </p:nvGrpSpPr>
+      <p:grpSpPr>
+        <a:xfrm>
+          <a:off x="0" y="0"/>
+          <a:ext cx="0" cy="0"/>
+          <a:chOff x="0" y="0"/>
+          <a:chExt cx="0" cy="0"/>
+        </a:xfrm>
+      </p:grpSpPr>
+      <p:sp>
+        <p:nvSpPr>
+          <p:cNvPr id="2" name="TextBox 1"/>
+          <p:cNvSpPr txBox="1"/>
+          <p:nvPr/>
+        </p:nvSpPr>
+        <p:spPr>
+          <a:xfrm>
+            <a:off x="762000" y="457201"/>
+            <a:ext cx="7074116" cy="646331"/>
+          </a:xfrm>
+          <a:prstGeom prst="rect">
+            <a:avLst/>
+          </a:prstGeom>
+          <a:noFill/>
+        </p:spPr>
+        <p:txBody>
+          <a:bodyPr wrap="none" rtlCol="0">
+            <a:spAutoFit/>
+          </a:bodyPr>
+          <a:lstStyle/>
+          <a:p>
+            <a:r>
+              <a:rPr lang="en-US" sz="3600" dirty="0">
+                <a:latin typeface="Calibri" pitchFamily="34" charset="0"/>
+                <a:cs typeface="Calibri" pitchFamily="34" charset="0"/>
+              </a:rPr>
+              <a:t>Linear Regression (OLS) Assumptions</a:t>
+            </a:r>
+          </a:p>
+        </p:txBody>
+      </p:sp>
+      <p:sp>
+        <p:nvSpPr>
+          <p:cNvPr id="6" name="TextBox 5">
+            <a:extLst>
+              <a:ext uri="{FF2B5EF4-FFF2-40B4-BE49-F238E27FC236}">
+                <a16:creationId xmlns:a16="http://schemas.microsoft.com/office/drawing/2014/main" id="{A3585BB0-2513-4FD6-9854-13BEBA99DD39}"/>
+              </a:ext>
+            </a:extLst>
+          </p:cNvPr>
+          <p:cNvSpPr txBox="1"/>
+          <p:nvPr/>
+        </p:nvSpPr>
+        <p:spPr>
+          <a:xfrm>
             <a:off x="758371" y="1219200"/>
             <a:ext cx="7934178" cy="4708981"/>
           </a:xfrm>
@@ -12652,7 +13542,7 @@
 </p:sld>
 </file>
 
-<file path=ppt/slides/slide41.xml><?xml version="1.0" encoding="utf-8"?>
+<file path=ppt/slides/slide42.xml><?xml version="1.0" encoding="utf-8"?>
 <p:sld xmlns:a="http://schemas.openxmlformats.org/drawingml/2006/main" xmlns:r="http://schemas.openxmlformats.org/officeDocument/2006/relationships" xmlns:p="http://schemas.openxmlformats.org/presentationml/2006/main">
   <p:cSld>
     <p:spTree>
@@ -13090,7 +13980,7 @@
 </p:sld>
 </file>
 
-<file path=ppt/slides/slide42.xml><?xml version="1.0" encoding="utf-8"?>
+<file path=ppt/slides/slide43.xml><?xml version="1.0" encoding="utf-8"?>
 <p:sld xmlns:a="http://schemas.openxmlformats.org/drawingml/2006/main" xmlns:r="http://schemas.openxmlformats.org/officeDocument/2006/relationships" xmlns:p="http://schemas.openxmlformats.org/presentationml/2006/main">
   <p:cSld>
     <p:spTree>
@@ -13324,176 +14214,6 @@
 </p:sld>
 </file>
 
-<file path=ppt/slides/slide43.xml><?xml version="1.0" encoding="utf-8"?>
-<p:sld xmlns:a="http://schemas.openxmlformats.org/drawingml/2006/main" xmlns:r="http://schemas.openxmlformats.org/officeDocument/2006/relationships" xmlns:p="http://schemas.openxmlformats.org/presentationml/2006/main">
-  <p:cSld>
-    <p:spTree>
-      <p:nvGrpSpPr>
-        <p:cNvPr id="1" name=""/>
-        <p:cNvGrpSpPr/>
-        <p:nvPr/>
-      </p:nvGrpSpPr>
-      <p:grpSpPr>
-        <a:xfrm>
-          <a:off x="0" y="0"/>
-          <a:ext cx="0" cy="0"/>
-          <a:chOff x="0" y="0"/>
-          <a:chExt cx="0" cy="0"/>
-        </a:xfrm>
-      </p:grpSpPr>
-      <p:sp>
-        <p:nvSpPr>
-          <p:cNvPr id="2" name="TextBox 1"/>
-          <p:cNvSpPr txBox="1"/>
-          <p:nvPr/>
-        </p:nvSpPr>
-        <p:spPr>
-          <a:xfrm>
-            <a:off x="762000" y="457201"/>
-            <a:ext cx="7074116" cy="646331"/>
-          </a:xfrm>
-          <a:prstGeom prst="rect">
-            <a:avLst/>
-          </a:prstGeom>
-          <a:noFill/>
-        </p:spPr>
-        <p:txBody>
-          <a:bodyPr wrap="none" rtlCol="0">
-            <a:spAutoFit/>
-          </a:bodyPr>
-          <a:lstStyle/>
-          <a:p>
-            <a:r>
-              <a:rPr lang="en-US" sz="3600" dirty="0">
-                <a:latin typeface="Calibri" pitchFamily="34" charset="0"/>
-                <a:cs typeface="Calibri" pitchFamily="34" charset="0"/>
-              </a:rPr>
-              <a:t>Linear Regression (OLS) Assumptions</a:t>
-            </a:r>
-          </a:p>
-        </p:txBody>
-      </p:sp>
-      <p:sp>
-        <p:nvSpPr>
-          <p:cNvPr id="6" name="TextBox 5">
-            <a:extLst>
-              <a:ext uri="{FF2B5EF4-FFF2-40B4-BE49-F238E27FC236}">
-                <a16:creationId xmlns:a16="http://schemas.microsoft.com/office/drawing/2014/main" id="{A3585BB0-2513-4FD6-9854-13BEBA99DD39}"/>
-              </a:ext>
-            </a:extLst>
-          </p:cNvPr>
-          <p:cNvSpPr txBox="1"/>
-          <p:nvPr/>
-        </p:nvSpPr>
-        <p:spPr>
-          <a:xfrm>
-            <a:off x="752622" y="1371600"/>
-            <a:ext cx="7934178" cy="4401205"/>
-          </a:xfrm>
-          <a:prstGeom prst="rect">
-            <a:avLst/>
-          </a:prstGeom>
-          <a:noFill/>
-        </p:spPr>
-        <p:txBody>
-          <a:bodyPr wrap="square" rtlCol="0">
-            <a:spAutoFit/>
-          </a:bodyPr>
-          <a:lstStyle/>
-          <a:p>
-            <a:r>
-              <a:rPr lang="en-US" sz="2000" b="1" dirty="0">
-                <a:latin typeface="Calibri" pitchFamily="34" charset="0"/>
-                <a:cs typeface="Calibri" pitchFamily="34" charset="0"/>
-              </a:rPr>
-              <a:t>No auto-correlation: </a:t>
-            </a:r>
-            <a:r>
-              <a:rPr lang="en-US" sz="2000" dirty="0">
-                <a:latin typeface="Calibri" pitchFamily="34" charset="0"/>
-                <a:cs typeface="Calibri" pitchFamily="34" charset="0"/>
-              </a:rPr>
-              <a:t>also known as no serial correlation</a:t>
-            </a:r>
-          </a:p>
-          <a:p>
-            <a:r>
-              <a:rPr lang="en-US" sz="2000" dirty="0">
-                <a:latin typeface="Calibri" pitchFamily="34" charset="0"/>
-                <a:cs typeface="Calibri" pitchFamily="34" charset="0"/>
-              </a:rPr>
-              <a:t>This cannot be relaxed.</a:t>
-            </a:r>
-          </a:p>
-          <a:p>
-            <a:endParaRPr lang="en-US" sz="2000" dirty="0">
-              <a:latin typeface="Calibri" pitchFamily="34" charset="0"/>
-              <a:cs typeface="Calibri" pitchFamily="34" charset="0"/>
-            </a:endParaRPr>
-          </a:p>
-          <a:p>
-            <a:r>
-              <a:rPr lang="en-US" sz="2000" dirty="0">
-                <a:latin typeface="Calibri" pitchFamily="34" charset="0"/>
-                <a:cs typeface="Calibri" pitchFamily="34" charset="0"/>
-              </a:rPr>
-              <a:t>Errors are assumed to be un-correlated. </a:t>
-            </a:r>
-          </a:p>
-          <a:p>
-            <a:r>
-              <a:rPr lang="en-US" sz="2000" dirty="0">
-                <a:latin typeface="Calibri" pitchFamily="34" charset="0"/>
-                <a:cs typeface="Calibri" pitchFamily="34" charset="0"/>
-              </a:rPr>
-              <a:t>i.e. it assumes the errors should be randomly spread around the regression line.</a:t>
-            </a:r>
-          </a:p>
-          <a:p>
-            <a:endParaRPr lang="en-US" sz="2000" dirty="0">
-              <a:latin typeface="Calibri" pitchFamily="34" charset="0"/>
-              <a:cs typeface="Calibri" pitchFamily="34" charset="0"/>
-            </a:endParaRPr>
-          </a:p>
-          <a:p>
-            <a:r>
-              <a:rPr lang="en-US" sz="2000" dirty="0">
-                <a:latin typeface="Calibri" pitchFamily="34" charset="0"/>
-                <a:cs typeface="Calibri" pitchFamily="34" charset="0"/>
-              </a:rPr>
-              <a:t>It is highly unlikely to find serial correlation between errors take at one moment of time, known as cross-sectional data.</a:t>
-            </a:r>
-          </a:p>
-          <a:p>
-            <a:endParaRPr lang="en-US" sz="2000" dirty="0">
-              <a:latin typeface="Calibri" pitchFamily="34" charset="0"/>
-              <a:cs typeface="Calibri" pitchFamily="34" charset="0"/>
-            </a:endParaRPr>
-          </a:p>
-          <a:p>
-            <a:r>
-              <a:rPr lang="en-US" sz="2000" dirty="0">
-                <a:latin typeface="Calibri" pitchFamily="34" charset="0"/>
-                <a:cs typeface="Calibri" pitchFamily="34" charset="0"/>
-              </a:rPr>
-              <a:t>However, it is very common in time series data. Think about the stock prices. Every day you have a new quote price for the same stock. Which shows that the errors are not auto-correlated that is errors are randomly spread across the  and hence you cannot predict the stock prices. </a:t>
-            </a:r>
-          </a:p>
-        </p:txBody>
-      </p:sp>
-    </p:spTree>
-    <p:extLst>
-      <p:ext uri="{BB962C8B-B14F-4D97-AF65-F5344CB8AC3E}">
-        <p14:creationId xmlns:p14="http://schemas.microsoft.com/office/powerpoint/2010/main" val="137258534"/>
-      </p:ext>
-    </p:extLst>
-  </p:cSld>
-  <p:clrMapOvr>
-    <a:masterClrMapping/>
-  </p:clrMapOvr>
-</p:sld>
-</file>
-
 <file path=ppt/slides/slide44.xml><?xml version="1.0" encoding="utf-8"?>
 <p:sld xmlns:a="http://schemas.openxmlformats.org/drawingml/2006/main" xmlns:r="http://schemas.openxmlformats.org/officeDocument/2006/relationships" xmlns:p="http://schemas.openxmlformats.org/presentationml/2006/main">
   <p:cSld>
@@ -13558,7 +14278,7 @@
         <p:spPr>
           <a:xfrm>
             <a:off x="752622" y="1371600"/>
-            <a:ext cx="7934178" cy="1938992"/>
+            <a:ext cx="7934178" cy="4401205"/>
           </a:xfrm>
           <a:prstGeom prst="rect">
             <a:avLst/>
@@ -13607,7 +14327,7 @@
                 <a:latin typeface="Calibri" pitchFamily="34" charset="0"/>
                 <a:cs typeface="Calibri" pitchFamily="34" charset="0"/>
               </a:rPr>
-              <a:t>How to look for auto-correlation ?</a:t>
+              <a:t>Errors are assumed to be un-correlated. </a:t>
             </a:r>
           </a:p>
           <a:p>
@@ -13616,50 +14336,45 @@
                 <a:latin typeface="Calibri" pitchFamily="34" charset="0"/>
                 <a:cs typeface="Calibri" pitchFamily="34" charset="0"/>
               </a:rPr>
-              <a:t>Common way is to plot all the residuals on a graph and try to find a pattern. If you cannot find any, you are safe.</a:t>
-            </a:r>
-          </a:p>
-        </p:txBody>
-      </p:sp>
-      <p:pic>
-        <p:nvPicPr>
-          <p:cNvPr id="3" name="Picture 2">
-            <a:extLst>
-              <a:ext uri="{FF2B5EF4-FFF2-40B4-BE49-F238E27FC236}">
-                <a16:creationId xmlns:a16="http://schemas.microsoft.com/office/drawing/2014/main" id="{1F91D8B2-2864-4C14-9333-1FEF598E143C}"/>
-              </a:ext>
-            </a:extLst>
-          </p:cNvPr>
-          <p:cNvPicPr>
-            <a:picLocks noChangeAspect="1"/>
-          </p:cNvPicPr>
-          <p:nvPr/>
-        </p:nvPicPr>
-        <p:blipFill>
-          <a:blip r:embed="rId2"/>
-          <a:stretch>
-            <a:fillRect/>
-          </a:stretch>
-        </p:blipFill>
-        <p:spPr>
-          <a:xfrm>
-            <a:off x="752622" y="3429000"/>
-            <a:ext cx="4152900" cy="2476500"/>
-          </a:xfrm>
-          <a:prstGeom prst="rect">
-            <a:avLst/>
-          </a:prstGeom>
-          <a:ln>
-            <a:solidFill>
-              <a:schemeClr val="tx1"/>
-            </a:solidFill>
-          </a:ln>
-        </p:spPr>
-      </p:pic>
+              <a:t>i.e. it assumes the errors should be randomly spread around the regression line.</a:t>
+            </a:r>
+          </a:p>
+          <a:p>
+            <a:endParaRPr lang="en-US" sz="2000" dirty="0">
+              <a:latin typeface="Calibri" pitchFamily="34" charset="0"/>
+              <a:cs typeface="Calibri" pitchFamily="34" charset="0"/>
+            </a:endParaRPr>
+          </a:p>
+          <a:p>
+            <a:r>
+              <a:rPr lang="en-US" sz="2000" dirty="0">
+                <a:latin typeface="Calibri" pitchFamily="34" charset="0"/>
+                <a:cs typeface="Calibri" pitchFamily="34" charset="0"/>
+              </a:rPr>
+              <a:t>It is highly unlikely to find serial correlation between errors take at one moment of time, known as cross-sectional data.</a:t>
+            </a:r>
+          </a:p>
+          <a:p>
+            <a:endParaRPr lang="en-US" sz="2000" dirty="0">
+              <a:latin typeface="Calibri" pitchFamily="34" charset="0"/>
+              <a:cs typeface="Calibri" pitchFamily="34" charset="0"/>
+            </a:endParaRPr>
+          </a:p>
+          <a:p>
+            <a:r>
+              <a:rPr lang="en-US" sz="2000" dirty="0">
+                <a:latin typeface="Calibri" pitchFamily="34" charset="0"/>
+                <a:cs typeface="Calibri" pitchFamily="34" charset="0"/>
+              </a:rPr>
+              <a:t>However, it is very common in time series data. Think about the stock prices. Every day you have a new quote price for the same stock. Which shows that the errors are not auto-correlated that is errors are randomly spread across the  and hence you cannot predict the stock prices. </a:t>
+            </a:r>
+          </a:p>
+        </p:txBody>
+      </p:sp>
     </p:spTree>
     <p:extLst>
       <p:ext uri="{BB962C8B-B14F-4D97-AF65-F5344CB8AC3E}">
-        <p14:creationId xmlns:p14="http://schemas.microsoft.com/office/powerpoint/2010/main" val="2189392330"/>
+        <p14:creationId xmlns:p14="http://schemas.microsoft.com/office/powerpoint/2010/main" val="137258534"/>
       </p:ext>
     </p:extLst>
   </p:cSld>
@@ -13733,7 +14448,7 @@
         <p:spPr>
           <a:xfrm>
             <a:off x="752622" y="1371600"/>
-            <a:ext cx="7934178" cy="5016758"/>
+            <a:ext cx="7934178" cy="1938992"/>
           </a:xfrm>
           <a:prstGeom prst="rect">
             <a:avLst/>
@@ -13791,97 +14506,50 @@
                 <a:latin typeface="Calibri" pitchFamily="34" charset="0"/>
                 <a:cs typeface="Calibri" pitchFamily="34" charset="0"/>
               </a:rPr>
-              <a:t>Another way is </a:t>
-            </a:r>
-            <a:r>
-              <a:rPr lang="en-US" sz="2000" b="1" dirty="0">
-                <a:latin typeface="Calibri" pitchFamily="34" charset="0"/>
-                <a:cs typeface="Calibri" pitchFamily="34" charset="0"/>
-              </a:rPr>
-              <a:t>Durbin-Watson test</a:t>
-            </a:r>
-            <a:r>
-              <a:rPr lang="en-US" sz="2000" dirty="0">
-                <a:latin typeface="Calibri" pitchFamily="34" charset="0"/>
-                <a:cs typeface="Calibri" pitchFamily="34" charset="0"/>
-              </a:rPr>
-              <a:t>, which is there in the regression table summary</a:t>
-            </a:r>
-          </a:p>
-          <a:p>
-            <a:endParaRPr lang="en-US" sz="2000" dirty="0">
-              <a:latin typeface="Calibri" pitchFamily="34" charset="0"/>
-              <a:cs typeface="Calibri" pitchFamily="34" charset="0"/>
-            </a:endParaRPr>
-          </a:p>
-          <a:p>
-            <a:r>
-              <a:rPr lang="en-US" sz="2000" dirty="0">
-                <a:latin typeface="Calibri" pitchFamily="34" charset="0"/>
-                <a:cs typeface="Calibri" pitchFamily="34" charset="0"/>
-              </a:rPr>
-              <a:t>Generally its values lie between </a:t>
-            </a:r>
-            <a:r>
-              <a:rPr lang="en-US" sz="2000" b="1" dirty="0">
-                <a:latin typeface="Calibri" pitchFamily="34" charset="0"/>
-                <a:cs typeface="Calibri" pitchFamily="34" charset="0"/>
-              </a:rPr>
-              <a:t>0 and 4</a:t>
-            </a:r>
-            <a:endParaRPr lang="en-US" sz="2000" dirty="0">
-              <a:latin typeface="Calibri" pitchFamily="34" charset="0"/>
-              <a:cs typeface="Calibri" pitchFamily="34" charset="0"/>
-            </a:endParaRPr>
-          </a:p>
-          <a:p>
-            <a:r>
-              <a:rPr lang="en-US" sz="2000" b="1" dirty="0">
-                <a:latin typeface="Calibri" pitchFamily="34" charset="0"/>
-                <a:cs typeface="Calibri" pitchFamily="34" charset="0"/>
-              </a:rPr>
-              <a:t>Value = 2 : no auto-correlation</a:t>
-            </a:r>
-          </a:p>
-          <a:p>
-            <a:r>
-              <a:rPr lang="en-US" sz="2000" b="1" dirty="0">
-                <a:latin typeface="Calibri" pitchFamily="34" charset="0"/>
-                <a:cs typeface="Calibri" pitchFamily="34" charset="0"/>
-              </a:rPr>
-              <a:t>Value &lt; 1 or value &gt;3 : Cause for alarm, looks like auto-correlation</a:t>
-            </a:r>
-          </a:p>
-          <a:p>
-            <a:endParaRPr lang="en-US" sz="2000" b="1" dirty="0">
-              <a:latin typeface="Calibri" pitchFamily="34" charset="0"/>
-              <a:cs typeface="Calibri" pitchFamily="34" charset="0"/>
-            </a:endParaRPr>
-          </a:p>
-          <a:p>
-            <a:r>
-              <a:rPr lang="en-US" sz="2000" b="1" dirty="0">
-                <a:latin typeface="Calibri" pitchFamily="34" charset="0"/>
-                <a:cs typeface="Calibri" pitchFamily="34" charset="0"/>
-              </a:rPr>
-              <a:t>There is no remedy for this problem. The only thing you can do here is you can avoid using the linear regression in this case.</a:t>
-            </a:r>
-          </a:p>
-          <a:p>
-            <a:r>
-              <a:rPr lang="en-US" sz="2000" dirty="0">
-                <a:latin typeface="Calibri" pitchFamily="34" charset="0"/>
-                <a:cs typeface="Calibri" pitchFamily="34" charset="0"/>
-              </a:rPr>
-              <a:t>You may use other models such as Autoregressive model, Moving average model, Autoregressive Moving Average Model, Autoregressive Integrated Moving Average Model</a:t>
-            </a:r>
-          </a:p>
-        </p:txBody>
-      </p:sp>
+              <a:t>Common way is to plot all the residuals on a graph and try to find a pattern. If you cannot find any, you are safe.</a:t>
+            </a:r>
+          </a:p>
+        </p:txBody>
+      </p:sp>
+      <p:pic>
+        <p:nvPicPr>
+          <p:cNvPr id="3" name="Picture 2">
+            <a:extLst>
+              <a:ext uri="{FF2B5EF4-FFF2-40B4-BE49-F238E27FC236}">
+                <a16:creationId xmlns:a16="http://schemas.microsoft.com/office/drawing/2014/main" id="{1F91D8B2-2864-4C14-9333-1FEF598E143C}"/>
+              </a:ext>
+            </a:extLst>
+          </p:cNvPr>
+          <p:cNvPicPr>
+            <a:picLocks noChangeAspect="1"/>
+          </p:cNvPicPr>
+          <p:nvPr/>
+        </p:nvPicPr>
+        <p:blipFill>
+          <a:blip r:embed="rId2"/>
+          <a:stretch>
+            <a:fillRect/>
+          </a:stretch>
+        </p:blipFill>
+        <p:spPr>
+          <a:xfrm>
+            <a:off x="752622" y="3429000"/>
+            <a:ext cx="4152900" cy="2476500"/>
+          </a:xfrm>
+          <a:prstGeom prst="rect">
+            <a:avLst/>
+          </a:prstGeom>
+          <a:ln>
+            <a:solidFill>
+              <a:schemeClr val="tx1"/>
+            </a:solidFill>
+          </a:ln>
+        </p:spPr>
+      </p:pic>
     </p:spTree>
     <p:extLst>
       <p:ext uri="{BB962C8B-B14F-4D97-AF65-F5344CB8AC3E}">
-        <p14:creationId xmlns:p14="http://schemas.microsoft.com/office/powerpoint/2010/main" val="561512357"/>
+        <p14:creationId xmlns:p14="http://schemas.microsoft.com/office/powerpoint/2010/main" val="2189392330"/>
       </p:ext>
     </p:extLst>
   </p:cSld>
@@ -13955,7 +14623,7 @@
         <p:spPr>
           <a:xfrm>
             <a:off x="752622" y="1371600"/>
-            <a:ext cx="7934178" cy="3785652"/>
+            <a:ext cx="7934178" cy="5016758"/>
           </a:xfrm>
           <a:prstGeom prst="rect">
             <a:avLst/>
@@ -13973,14 +14641,23 @@
                 <a:latin typeface="Calibri" pitchFamily="34" charset="0"/>
                 <a:cs typeface="Calibri" pitchFamily="34" charset="0"/>
               </a:rPr>
-              <a:t>No multi-collinearity: </a:t>
+              <a:t>No auto-correlation: </a:t>
             </a:r>
             <a:r>
               <a:rPr lang="en-US" sz="2000" dirty="0">
                 <a:latin typeface="Calibri" pitchFamily="34" charset="0"/>
                 <a:cs typeface="Calibri" pitchFamily="34" charset="0"/>
               </a:rPr>
-              <a:t>We observer multi-collinearity when two or more variables have a high correlation</a:t>
+              <a:t>also known as no serial correlation</a:t>
+            </a:r>
+          </a:p>
+          <a:p>
+            <a:r>
+              <a:rPr lang="en-US" sz="2000" dirty="0">
+                <a:latin typeface="Calibri" pitchFamily="34" charset="0"/>
+                <a:cs typeface="Calibri" pitchFamily="34" charset="0"/>
+              </a:rPr>
+              <a:t>This cannot be relaxed.</a:t>
             </a:r>
           </a:p>
           <a:p>
@@ -13995,7 +14672,30 @@
                 <a:latin typeface="Calibri" pitchFamily="34" charset="0"/>
                 <a:cs typeface="Calibri" pitchFamily="34" charset="0"/>
               </a:rPr>
-              <a:t>The reason for this assumption is, in multi-collinearity, the relationship is symmetric. Hence the variability of one can be represented by the other. In such cases, there is no need to include both the variables, we can keep any one of them.</a:t>
+              <a:t>How to look for auto-correlation ?</a:t>
+            </a:r>
+          </a:p>
+          <a:p>
+            <a:r>
+              <a:rPr lang="en-US" sz="2000" dirty="0">
+                <a:latin typeface="Calibri" pitchFamily="34" charset="0"/>
+                <a:cs typeface="Calibri" pitchFamily="34" charset="0"/>
+              </a:rPr>
+              <a:t>Another way is </a:t>
+            </a:r>
+            <a:r>
+              <a:rPr lang="en-US" sz="2000" b="1" dirty="0">
+                <a:latin typeface="Calibri" pitchFamily="34" charset="0"/>
+                <a:cs typeface="Calibri" pitchFamily="34" charset="0"/>
+              </a:rPr>
+              <a:t>Durbin-Watson test</a:t>
+            </a:r>
+            <a:r>
+              <a:rPr lang="en-US" sz="2000" dirty="0">
+                <a:latin typeface="Calibri" pitchFamily="34" charset="0"/>
+                <a:cs typeface="Calibri" pitchFamily="34" charset="0"/>
+              </a:rPr>
+              <a:t>, which is there in the regression table summary</a:t>
             </a:r>
           </a:p>
           <a:p>
@@ -14006,54 +14706,64 @@
           </a:p>
           <a:p>
             <a:r>
+              <a:rPr lang="en-US" sz="2000" dirty="0">
+                <a:latin typeface="Calibri" pitchFamily="34" charset="0"/>
+                <a:cs typeface="Calibri" pitchFamily="34" charset="0"/>
+              </a:rPr>
+              <a:t>Generally its values lie between </a:t>
+            </a:r>
+            <a:r>
               <a:rPr lang="en-US" sz="2000" b="1" dirty="0">
                 <a:latin typeface="Calibri" pitchFamily="34" charset="0"/>
                 <a:cs typeface="Calibri" pitchFamily="34" charset="0"/>
               </a:rPr>
-              <a:t>Fixes: </a:t>
-            </a:r>
+              <a:t>0 and 4</a:t>
+            </a:r>
+            <a:endParaRPr lang="en-US" sz="2000" dirty="0">
+              <a:latin typeface="Calibri" pitchFamily="34" charset="0"/>
+              <a:cs typeface="Calibri" pitchFamily="34" charset="0"/>
+            </a:endParaRPr>
+          </a:p>
+          <a:p>
+            <a:r>
+              <a:rPr lang="en-US" sz="2000" b="1" dirty="0">
+                <a:latin typeface="Calibri" pitchFamily="34" charset="0"/>
+                <a:cs typeface="Calibri" pitchFamily="34" charset="0"/>
+              </a:rPr>
+              <a:t>Value = 2 : no auto-correlation</a:t>
+            </a:r>
+          </a:p>
+          <a:p>
+            <a:r>
+              <a:rPr lang="en-US" sz="2000" b="1" dirty="0">
+                <a:latin typeface="Calibri" pitchFamily="34" charset="0"/>
+                <a:cs typeface="Calibri" pitchFamily="34" charset="0"/>
+              </a:rPr>
+              <a:t>Value &lt; 1 or value &gt;3 : Cause for alarm, looks like auto-correlation</a:t>
+            </a:r>
+          </a:p>
+          <a:p>
+            <a:endParaRPr lang="en-US" sz="2000" b="1" dirty="0">
+              <a:latin typeface="Calibri" pitchFamily="34" charset="0"/>
+              <a:cs typeface="Calibri" pitchFamily="34" charset="0"/>
+            </a:endParaRPr>
+          </a:p>
+          <a:p>
+            <a:r>
+              <a:rPr lang="en-US" sz="2000" b="1" dirty="0">
+                <a:latin typeface="Calibri" pitchFamily="34" charset="0"/>
+                <a:cs typeface="Calibri" pitchFamily="34" charset="0"/>
+              </a:rPr>
+              <a:t>There is no remedy for this problem. The only thing you can do here is you can avoid using the linear regression in this case.</a:t>
+            </a:r>
+          </a:p>
+          <a:p>
             <a:r>
               <a:rPr lang="en-US" sz="2000" dirty="0">
                 <a:latin typeface="Calibri" pitchFamily="34" charset="0"/>
                 <a:cs typeface="Calibri" pitchFamily="34" charset="0"/>
               </a:rPr>
-              <a:t>There are 3 ways to do this</a:t>
-            </a:r>
-          </a:p>
-          <a:p>
-            <a:pPr marL="457200" indent="-457200">
-              <a:buAutoNum type="arabicPeriod"/>
-            </a:pPr>
-            <a:r>
-              <a:rPr lang="en-US" sz="2000" dirty="0">
-                <a:latin typeface="Calibri" pitchFamily="34" charset="0"/>
-                <a:cs typeface="Calibri" pitchFamily="34" charset="0"/>
-              </a:rPr>
-              <a:t>You can drop one of the two variables</a:t>
-            </a:r>
-          </a:p>
-          <a:p>
-            <a:pPr marL="457200" indent="-457200">
-              <a:buAutoNum type="arabicPeriod"/>
-            </a:pPr>
-            <a:r>
-              <a:rPr lang="en-US" sz="2000" dirty="0">
-                <a:latin typeface="Calibri" pitchFamily="34" charset="0"/>
-                <a:cs typeface="Calibri" pitchFamily="34" charset="0"/>
-              </a:rPr>
-              <a:t>You can transform them into one variable</a:t>
-            </a:r>
-          </a:p>
-          <a:p>
-            <a:pPr marL="457200" indent="-457200">
-              <a:buAutoNum type="arabicPeriod"/>
-            </a:pPr>
-            <a:r>
-              <a:rPr lang="en-US" sz="2000" dirty="0">
-                <a:latin typeface="Calibri" pitchFamily="34" charset="0"/>
-                <a:cs typeface="Calibri" pitchFamily="34" charset="0"/>
-              </a:rPr>
-              <a:t>You can keep them both and treat them with extreme caution</a:t>
+              <a:t>You may use other models such as Autoregressive model, Moving average model, Autoregressive Moving Average Model, Autoregressive Integrated Moving Average Model</a:t>
             </a:r>
           </a:p>
         </p:txBody>
@@ -14061,7 +14771,7 @@
     </p:spTree>
     <p:extLst>
       <p:ext uri="{BB962C8B-B14F-4D97-AF65-F5344CB8AC3E}">
-        <p14:creationId xmlns:p14="http://schemas.microsoft.com/office/powerpoint/2010/main" val="1625851078"/>
+        <p14:creationId xmlns:p14="http://schemas.microsoft.com/office/powerpoint/2010/main" val="561512357"/>
       </p:ext>
     </p:extLst>
   </p:cSld>
@@ -14097,7 +14807,7 @@
         <p:spPr>
           <a:xfrm>
             <a:off x="762000" y="457201"/>
-            <a:ext cx="4758226" cy="646331"/>
+            <a:ext cx="7074116" cy="646331"/>
           </a:xfrm>
           <a:prstGeom prst="rect">
             <a:avLst/>
@@ -14115,21 +14825,27 @@
                 <a:latin typeface="Calibri" pitchFamily="34" charset="0"/>
                 <a:cs typeface="Calibri" pitchFamily="34" charset="0"/>
               </a:rPr>
-              <a:t>Linear Regression with R</a:t>
-            </a:r>
-          </a:p>
-        </p:txBody>
-      </p:sp>
-      <p:sp>
-        <p:nvSpPr>
-          <p:cNvPr id="3" name="TextBox 2"/>
+              <a:t>Linear Regression (OLS) Assumptions</a:t>
+            </a:r>
+          </a:p>
+        </p:txBody>
+      </p:sp>
+      <p:sp>
+        <p:nvSpPr>
+          <p:cNvPr id="6" name="TextBox 5">
+            <a:extLst>
+              <a:ext uri="{FF2B5EF4-FFF2-40B4-BE49-F238E27FC236}">
+                <a16:creationId xmlns:a16="http://schemas.microsoft.com/office/drawing/2014/main" id="{A3585BB0-2513-4FD6-9854-13BEBA99DD39}"/>
+              </a:ext>
+            </a:extLst>
+          </p:cNvPr>
           <p:cNvSpPr txBox="1"/>
           <p:nvPr/>
         </p:nvSpPr>
         <p:spPr>
           <a:xfrm>
-            <a:off x="317500" y="1447800"/>
-            <a:ext cx="3048000" cy="2123658"/>
+            <a:off x="752622" y="1371600"/>
+            <a:ext cx="7934178" cy="3785652"/>
           </a:xfrm>
           <a:prstGeom prst="rect">
             <a:avLst/>
@@ -14142,354 +14858,92 @@
           </a:bodyPr>
           <a:lstStyle/>
           <a:p>
-            <a:pPr algn="just"/>
-            <a:r>
-              <a:rPr lang="en-US" sz="1600" dirty="0">
-                <a:solidFill>
-                  <a:srgbClr val="FF0000"/>
-                </a:solidFill>
-                <a:latin typeface="Calibri" pitchFamily="34" charset="0"/>
-                <a:cs typeface="Calibri" pitchFamily="34" charset="0"/>
-              </a:rPr>
-              <a:t>&gt; Z &lt;- </a:t>
-            </a:r>
-            <a:r>
-              <a:rPr lang="en-US" sz="1600" dirty="0" err="1">
-                <a:solidFill>
-                  <a:srgbClr val="FF0000"/>
-                </a:solidFill>
-                <a:latin typeface="Calibri" pitchFamily="34" charset="0"/>
-                <a:cs typeface="Calibri" pitchFamily="34" charset="0"/>
-              </a:rPr>
-              <a:t>lm</a:t>
-            </a:r>
-            <a:r>
-              <a:rPr lang="en-US" sz="1600" dirty="0">
-                <a:solidFill>
-                  <a:srgbClr val="FF0000"/>
-                </a:solidFill>
-                <a:latin typeface="Calibri" pitchFamily="34" charset="0"/>
-                <a:cs typeface="Calibri" pitchFamily="34" charset="0"/>
-              </a:rPr>
-              <a:t>(y ~ x)</a:t>
-            </a:r>
-          </a:p>
-          <a:p>
-            <a:pPr algn="just"/>
-            <a:r>
-              <a:rPr lang="en-US" sz="1600" dirty="0">
-                <a:solidFill>
-                  <a:srgbClr val="FF0000"/>
-                </a:solidFill>
-                <a:latin typeface="Calibri" pitchFamily="34" charset="0"/>
-                <a:cs typeface="Calibri" pitchFamily="34" charset="0"/>
-              </a:rPr>
-              <a:t>&gt; Z</a:t>
-            </a:r>
-          </a:p>
-          <a:p>
-            <a:pPr lvl="1" algn="just"/>
-            <a:r>
-              <a:rPr lang="en-US" sz="1600" dirty="0">
-                <a:latin typeface="Calibri" pitchFamily="34" charset="0"/>
-                <a:cs typeface="Calibri" pitchFamily="34" charset="0"/>
-              </a:rPr>
-              <a:t>Call:</a:t>
-            </a:r>
-          </a:p>
-          <a:p>
-            <a:pPr lvl="1" algn="just"/>
-            <a:r>
-              <a:rPr lang="en-US" sz="1600" dirty="0" err="1">
-                <a:latin typeface="Calibri" pitchFamily="34" charset="0"/>
-                <a:cs typeface="Calibri" pitchFamily="34" charset="0"/>
-              </a:rPr>
-              <a:t>lm</a:t>
-            </a:r>
-            <a:r>
-              <a:rPr lang="en-US" sz="1600" dirty="0">
-                <a:latin typeface="Calibri" pitchFamily="34" charset="0"/>
-                <a:cs typeface="Calibri" pitchFamily="34" charset="0"/>
-              </a:rPr>
-              <a:t>(formula = y ~ x)</a:t>
-            </a:r>
-          </a:p>
-          <a:p>
-            <a:pPr lvl="1" algn="just"/>
-            <a:endParaRPr lang="en-US" sz="1600" dirty="0">
+            <a:r>
+              <a:rPr lang="en-US" sz="2000" b="1" dirty="0">
+                <a:latin typeface="Calibri" pitchFamily="34" charset="0"/>
+                <a:cs typeface="Calibri" pitchFamily="34" charset="0"/>
+              </a:rPr>
+              <a:t>No multi-collinearity: </a:t>
+            </a:r>
+            <a:r>
+              <a:rPr lang="en-US" sz="2000" dirty="0">
+                <a:latin typeface="Calibri" pitchFamily="34" charset="0"/>
+                <a:cs typeface="Calibri" pitchFamily="34" charset="0"/>
+              </a:rPr>
+              <a:t>We observer multi-collinearity when two or more variables have a high correlation</a:t>
+            </a:r>
+          </a:p>
+          <a:p>
+            <a:endParaRPr lang="en-US" sz="2000" dirty="0">
               <a:latin typeface="Calibri" pitchFamily="34" charset="0"/>
               <a:cs typeface="Calibri" pitchFamily="34" charset="0"/>
             </a:endParaRPr>
           </a:p>
           <a:p>
-            <a:pPr lvl="1" algn="just"/>
-            <a:r>
-              <a:rPr lang="en-US" sz="1600" dirty="0">
-                <a:latin typeface="Calibri" pitchFamily="34" charset="0"/>
-                <a:cs typeface="Calibri" pitchFamily="34" charset="0"/>
-              </a:rPr>
-              <a:t>Coefficients:</a:t>
-            </a:r>
-          </a:p>
-          <a:p>
-            <a:pPr lvl="1" algn="just"/>
-            <a:r>
-              <a:rPr lang="en-US" sz="1600" dirty="0">
-                <a:latin typeface="Calibri" pitchFamily="34" charset="0"/>
-                <a:cs typeface="Calibri" pitchFamily="34" charset="0"/>
-              </a:rPr>
-              <a:t>(Intercept)            x  </a:t>
-            </a:r>
-          </a:p>
-          <a:p>
-            <a:pPr lvl="1" algn="just"/>
-            <a:r>
-              <a:rPr lang="en-US" sz="1600" dirty="0">
-                <a:latin typeface="Calibri" pitchFamily="34" charset="0"/>
-                <a:cs typeface="Calibri" pitchFamily="34" charset="0"/>
-              </a:rPr>
-              <a:t>     324.08        -8.83</a:t>
-            </a:r>
-          </a:p>
-        </p:txBody>
-      </p:sp>
-      <p:sp>
-        <p:nvSpPr>
-          <p:cNvPr id="5" name="TextBox 4">
-            <a:extLst>
-              <a:ext uri="{FF2B5EF4-FFF2-40B4-BE49-F238E27FC236}">
-                <a16:creationId xmlns:a16="http://schemas.microsoft.com/office/drawing/2014/main" id="{59FD2B39-DB8B-4BF5-9366-6E6BD3B250DE}"/>
-              </a:ext>
-            </a:extLst>
-          </p:cNvPr>
-          <p:cNvSpPr txBox="1"/>
-          <p:nvPr/>
-        </p:nvSpPr>
-        <p:spPr>
-          <a:xfrm>
-            <a:off x="3124200" y="1255455"/>
-            <a:ext cx="5867400" cy="4924425"/>
-          </a:xfrm>
-          <a:prstGeom prst="rect">
-            <a:avLst/>
-          </a:prstGeom>
-          <a:noFill/>
-        </p:spPr>
-        <p:txBody>
-          <a:bodyPr wrap="square" rtlCol="0">
-            <a:spAutoFit/>
-          </a:bodyPr>
-          <a:lstStyle/>
-          <a:p>
-            <a:pPr algn="just"/>
-            <a:r>
-              <a:rPr lang="en-US" sz="1600" dirty="0">
-                <a:solidFill>
-                  <a:srgbClr val="FF0000"/>
-                </a:solidFill>
-                <a:latin typeface="Calibri" pitchFamily="34" charset="0"/>
-                <a:cs typeface="Calibri" pitchFamily="34" charset="0"/>
-              </a:rPr>
-              <a:t>&gt; summary(Z)</a:t>
-            </a:r>
-          </a:p>
-          <a:p>
-            <a:pPr algn="just"/>
-            <a:endParaRPr lang="en-US" sz="1600" dirty="0">
-              <a:solidFill>
-                <a:srgbClr val="FF0000"/>
-              </a:solidFill>
+            <a:r>
+              <a:rPr lang="en-US" sz="2000" dirty="0">
+                <a:latin typeface="Calibri" pitchFamily="34" charset="0"/>
+                <a:cs typeface="Calibri" pitchFamily="34" charset="0"/>
+              </a:rPr>
+              <a:t>The reason for this assumption is, in multi-collinearity, the relationship is symmetric. Hence the variability of one can be represented by the other. In such cases, there is no need to include both the variables, we can keep any one of them.</a:t>
+            </a:r>
+          </a:p>
+          <a:p>
+            <a:endParaRPr lang="en-US" sz="2000" dirty="0">
               <a:latin typeface="Calibri" pitchFamily="34" charset="0"/>
               <a:cs typeface="Calibri" pitchFamily="34" charset="0"/>
             </a:endParaRPr>
           </a:p>
           <a:p>
-            <a:pPr algn="just"/>
-            <a:r>
-              <a:rPr lang="en-US" sz="1600" dirty="0">
-                <a:latin typeface="Calibri" pitchFamily="34" charset="0"/>
-                <a:cs typeface="Calibri" pitchFamily="34" charset="0"/>
-              </a:rPr>
-              <a:t>Call:</a:t>
-            </a:r>
-          </a:p>
-          <a:p>
-            <a:pPr algn="just"/>
-            <a:r>
-              <a:rPr lang="en-US" sz="1600" dirty="0" err="1">
-                <a:latin typeface="Calibri" pitchFamily="34" charset="0"/>
-                <a:cs typeface="Calibri" pitchFamily="34" charset="0"/>
-              </a:rPr>
-              <a:t>lm</a:t>
-            </a:r>
-            <a:r>
-              <a:rPr lang="en-US" sz="1600" dirty="0">
-                <a:latin typeface="Calibri" pitchFamily="34" charset="0"/>
-                <a:cs typeface="Calibri" pitchFamily="34" charset="0"/>
-              </a:rPr>
-              <a:t>(formula = y ~ x)</a:t>
-            </a:r>
-          </a:p>
-          <a:p>
-            <a:pPr algn="just"/>
-            <a:endParaRPr lang="en-US" sz="1600" dirty="0">
-              <a:latin typeface="Calibri" pitchFamily="34" charset="0"/>
-              <a:cs typeface="Calibri" pitchFamily="34" charset="0"/>
-            </a:endParaRPr>
-          </a:p>
-          <a:p>
-            <a:pPr algn="just"/>
-            <a:r>
-              <a:rPr lang="en-US" sz="1600" dirty="0">
-                <a:latin typeface="Calibri" pitchFamily="34" charset="0"/>
-                <a:cs typeface="Calibri" pitchFamily="34" charset="0"/>
-              </a:rPr>
-              <a:t>Residuals:</a:t>
-            </a:r>
-          </a:p>
-          <a:p>
-            <a:pPr algn="just"/>
-            <a:r>
-              <a:rPr lang="en-US" sz="1600" dirty="0">
-                <a:latin typeface="Calibri" pitchFamily="34" charset="0"/>
-                <a:cs typeface="Calibri" pitchFamily="34" charset="0"/>
-              </a:rPr>
-              <a:t>   Min	1Q 	Median     	3Q    	Max </a:t>
-            </a:r>
-          </a:p>
-          <a:p>
-            <a:pPr algn="just"/>
-            <a:r>
-              <a:rPr lang="en-US" sz="1600" dirty="0">
-                <a:latin typeface="Calibri" pitchFamily="34" charset="0"/>
-                <a:cs typeface="Calibri" pitchFamily="34" charset="0"/>
-              </a:rPr>
-              <a:t>-59.26 	-28.93	-13.45  	25.65 	143.36 </a:t>
-            </a:r>
-          </a:p>
-          <a:p>
-            <a:pPr algn="just"/>
-            <a:endParaRPr lang="en-US" sz="1600" dirty="0">
-              <a:latin typeface="Calibri" pitchFamily="34" charset="0"/>
-              <a:cs typeface="Calibri" pitchFamily="34" charset="0"/>
-            </a:endParaRPr>
-          </a:p>
-          <a:p>
-            <a:pPr algn="just"/>
-            <a:r>
-              <a:rPr lang="en-US" sz="1600" dirty="0">
-                <a:latin typeface="Calibri" pitchFamily="34" charset="0"/>
-                <a:cs typeface="Calibri" pitchFamily="34" charset="0"/>
-              </a:rPr>
-              <a:t>Coefficients:</a:t>
-            </a:r>
-          </a:p>
-          <a:p>
-            <a:pPr algn="just"/>
-            <a:r>
-              <a:rPr lang="en-US" sz="1600" dirty="0">
-                <a:latin typeface="Calibri" pitchFamily="34" charset="0"/>
-                <a:cs typeface="Calibri" pitchFamily="34" charset="0"/>
-              </a:rPr>
-              <a:t>            	  Estimate 	Std. Error 	t value 	</a:t>
-            </a:r>
-            <a:r>
-              <a:rPr lang="en-US" sz="1600" dirty="0" err="1">
-                <a:latin typeface="Calibri" pitchFamily="34" charset="0"/>
-                <a:cs typeface="Calibri" pitchFamily="34" charset="0"/>
-              </a:rPr>
-              <a:t>Pr</a:t>
-            </a:r>
-            <a:r>
-              <a:rPr lang="en-US" sz="1600" dirty="0">
-                <a:latin typeface="Calibri" pitchFamily="34" charset="0"/>
-                <a:cs typeface="Calibri" pitchFamily="34" charset="0"/>
-              </a:rPr>
-              <a:t>(&gt;|t|)    </a:t>
-            </a:r>
-          </a:p>
-          <a:p>
-            <a:pPr algn="just"/>
-            <a:r>
-              <a:rPr lang="en-US" sz="1600" dirty="0">
-                <a:latin typeface="Calibri" pitchFamily="34" charset="0"/>
-                <a:cs typeface="Calibri" pitchFamily="34" charset="0"/>
-              </a:rPr>
-              <a:t>(Intercept)   324.08      27.43  	11.813 	8.25e-13 ***</a:t>
-            </a:r>
-          </a:p>
-          <a:p>
-            <a:pPr algn="just"/>
-            <a:r>
-              <a:rPr lang="en-US" sz="1600" dirty="0">
-                <a:latin typeface="Calibri" pitchFamily="34" charset="0"/>
-                <a:cs typeface="Calibri" pitchFamily="34" charset="0"/>
-              </a:rPr>
-              <a:t>x              	  -8.83      	 1.31 	 -6.742 	1.79e-07 ***</a:t>
-            </a:r>
-          </a:p>
-          <a:p>
-            <a:pPr algn="just"/>
-            <a:r>
-              <a:rPr lang="en-US" sz="1600" dirty="0">
-                <a:latin typeface="Calibri" pitchFamily="34" charset="0"/>
-                <a:cs typeface="Calibri" pitchFamily="34" charset="0"/>
-              </a:rPr>
-              <a:t>---</a:t>
-            </a:r>
-          </a:p>
-          <a:p>
-            <a:pPr algn="just"/>
-            <a:r>
-              <a:rPr lang="en-US" sz="1600" dirty="0" err="1">
-                <a:latin typeface="Calibri" pitchFamily="34" charset="0"/>
-                <a:cs typeface="Calibri" pitchFamily="34" charset="0"/>
-              </a:rPr>
-              <a:t>Signif</a:t>
-            </a:r>
-            <a:r>
-              <a:rPr lang="en-US" sz="1600" dirty="0">
-                <a:latin typeface="Calibri" pitchFamily="34" charset="0"/>
-                <a:cs typeface="Calibri" pitchFamily="34" charset="0"/>
-              </a:rPr>
-              <a:t>. codes:  0 ‘***’ 0.001 ‘**’ 0.01 ‘*’ 0.05 ‘.’ 0.1 ‘ ’ 1</a:t>
-            </a:r>
-          </a:p>
-          <a:p>
-            <a:pPr algn="just"/>
-            <a:endParaRPr lang="en-US" sz="1600" dirty="0">
-              <a:latin typeface="Calibri" pitchFamily="34" charset="0"/>
-              <a:cs typeface="Calibri" pitchFamily="34" charset="0"/>
-            </a:endParaRPr>
-          </a:p>
-          <a:p>
-            <a:pPr algn="just"/>
-            <a:r>
-              <a:rPr lang="en-US" sz="1600" dirty="0">
-                <a:latin typeface="Calibri" pitchFamily="34" charset="0"/>
-                <a:cs typeface="Calibri" pitchFamily="34" charset="0"/>
-              </a:rPr>
-              <a:t>Residual standard error: 43.95 on 30 degrees of freedom</a:t>
-            </a:r>
-          </a:p>
-          <a:p>
-            <a:pPr algn="just"/>
-            <a:r>
-              <a:rPr lang="en-US" sz="1600" dirty="0">
-                <a:latin typeface="Calibri" pitchFamily="34" charset="0"/>
-                <a:cs typeface="Calibri" pitchFamily="34" charset="0"/>
-              </a:rPr>
-              <a:t>Multiple R-squared:  0.6024,	Adjusted R-squared:  0.5892 </a:t>
-            </a:r>
-          </a:p>
-          <a:p>
-            <a:pPr algn="just"/>
-            <a:r>
-              <a:rPr lang="en-US" sz="1600" dirty="0">
-                <a:latin typeface="Calibri" pitchFamily="34" charset="0"/>
-                <a:cs typeface="Calibri" pitchFamily="34" charset="0"/>
-              </a:rPr>
-              <a:t>F-statistic: 45.46 on 1 and 30 DF,  p-value: 1.788e-07</a:t>
+            <a:r>
+              <a:rPr lang="en-US" sz="2000" b="1" dirty="0">
+                <a:latin typeface="Calibri" pitchFamily="34" charset="0"/>
+                <a:cs typeface="Calibri" pitchFamily="34" charset="0"/>
+              </a:rPr>
+              <a:t>Fixes: </a:t>
+            </a:r>
+            <a:r>
+              <a:rPr lang="en-US" sz="2000" dirty="0">
+                <a:latin typeface="Calibri" pitchFamily="34" charset="0"/>
+                <a:cs typeface="Calibri" pitchFamily="34" charset="0"/>
+              </a:rPr>
+              <a:t>There are 3 ways to do this</a:t>
+            </a:r>
+          </a:p>
+          <a:p>
+            <a:pPr marL="457200" indent="-457200">
+              <a:buAutoNum type="arabicPeriod"/>
+            </a:pPr>
+            <a:r>
+              <a:rPr lang="en-US" sz="2000" dirty="0">
+                <a:latin typeface="Calibri" pitchFamily="34" charset="0"/>
+                <a:cs typeface="Calibri" pitchFamily="34" charset="0"/>
+              </a:rPr>
+              <a:t>You can drop one of the two variables</a:t>
+            </a:r>
+          </a:p>
+          <a:p>
+            <a:pPr marL="457200" indent="-457200">
+              <a:buAutoNum type="arabicPeriod"/>
+            </a:pPr>
+            <a:r>
+              <a:rPr lang="en-US" sz="2000" dirty="0">
+                <a:latin typeface="Calibri" pitchFamily="34" charset="0"/>
+                <a:cs typeface="Calibri" pitchFamily="34" charset="0"/>
+              </a:rPr>
+              <a:t>You can transform them into one variable</a:t>
+            </a:r>
+          </a:p>
+          <a:p>
+            <a:pPr marL="457200" indent="-457200">
+              <a:buAutoNum type="arabicPeriod"/>
+            </a:pPr>
+            <a:r>
+              <a:rPr lang="en-US" sz="2000" dirty="0">
+                <a:latin typeface="Calibri" pitchFamily="34" charset="0"/>
+                <a:cs typeface="Calibri" pitchFamily="34" charset="0"/>
+              </a:rPr>
+              <a:t>You can keep them both and treat them with extreme caution</a:t>
             </a:r>
           </a:p>
         </p:txBody>
@@ -14497,7 +14951,7 @@
     </p:spTree>
     <p:extLst>
       <p:ext uri="{BB962C8B-B14F-4D97-AF65-F5344CB8AC3E}">
-        <p14:creationId xmlns:p14="http://schemas.microsoft.com/office/powerpoint/2010/main" val="1384183509"/>
+        <p14:creationId xmlns:p14="http://schemas.microsoft.com/office/powerpoint/2010/main" val="1625851078"/>
       </p:ext>
     </p:extLst>
   </p:cSld>
@@ -14526,14 +14980,14 @@
       </p:grpSpPr>
       <p:sp>
         <p:nvSpPr>
-          <p:cNvPr id="4" name="TextBox 3"/>
+          <p:cNvPr id="2" name="TextBox 1"/>
           <p:cNvSpPr txBox="1"/>
           <p:nvPr/>
         </p:nvSpPr>
         <p:spPr>
           <a:xfrm>
-            <a:off x="1432804" y="3105834"/>
-            <a:ext cx="6278449" cy="646331"/>
+            <a:off x="762000" y="457201"/>
+            <a:ext cx="4758226" cy="646331"/>
           </a:xfrm>
           <a:prstGeom prst="rect">
             <a:avLst/>
@@ -14546,13 +15000,386 @@
           </a:bodyPr>
           <a:lstStyle/>
           <a:p>
-            <a:pPr algn="ctr"/>
             <a:r>
               <a:rPr lang="en-US" sz="3600" dirty="0">
                 <a:latin typeface="Calibri" pitchFamily="34" charset="0"/>
                 <a:cs typeface="Calibri" pitchFamily="34" charset="0"/>
               </a:rPr>
-              <a:t>Approaches of Linear Regression</a:t>
+              <a:t>Linear Regression with R</a:t>
+            </a:r>
+          </a:p>
+        </p:txBody>
+      </p:sp>
+      <p:sp>
+        <p:nvSpPr>
+          <p:cNvPr id="3" name="TextBox 2"/>
+          <p:cNvSpPr txBox="1"/>
+          <p:nvPr/>
+        </p:nvSpPr>
+        <p:spPr>
+          <a:xfrm>
+            <a:off x="317500" y="1447800"/>
+            <a:ext cx="3048000" cy="2123658"/>
+          </a:xfrm>
+          <a:prstGeom prst="rect">
+            <a:avLst/>
+          </a:prstGeom>
+          <a:noFill/>
+        </p:spPr>
+        <p:txBody>
+          <a:bodyPr wrap="square" rtlCol="0">
+            <a:spAutoFit/>
+          </a:bodyPr>
+          <a:lstStyle/>
+          <a:p>
+            <a:pPr algn="just"/>
+            <a:r>
+              <a:rPr lang="en-US" sz="1600" dirty="0">
+                <a:solidFill>
+                  <a:srgbClr val="FF0000"/>
+                </a:solidFill>
+                <a:latin typeface="Calibri" pitchFamily="34" charset="0"/>
+                <a:cs typeface="Calibri" pitchFamily="34" charset="0"/>
+              </a:rPr>
+              <a:t>&gt; Z &lt;- </a:t>
+            </a:r>
+            <a:r>
+              <a:rPr lang="en-US" sz="1600" dirty="0" err="1">
+                <a:solidFill>
+                  <a:srgbClr val="FF0000"/>
+                </a:solidFill>
+                <a:latin typeface="Calibri" pitchFamily="34" charset="0"/>
+                <a:cs typeface="Calibri" pitchFamily="34" charset="0"/>
+              </a:rPr>
+              <a:t>lm</a:t>
+            </a:r>
+            <a:r>
+              <a:rPr lang="en-US" sz="1600" dirty="0">
+                <a:solidFill>
+                  <a:srgbClr val="FF0000"/>
+                </a:solidFill>
+                <a:latin typeface="Calibri" pitchFamily="34" charset="0"/>
+                <a:cs typeface="Calibri" pitchFamily="34" charset="0"/>
+              </a:rPr>
+              <a:t>(y ~ x)</a:t>
+            </a:r>
+          </a:p>
+          <a:p>
+            <a:pPr algn="just"/>
+            <a:r>
+              <a:rPr lang="en-US" sz="1600" dirty="0">
+                <a:solidFill>
+                  <a:srgbClr val="FF0000"/>
+                </a:solidFill>
+                <a:latin typeface="Calibri" pitchFamily="34" charset="0"/>
+                <a:cs typeface="Calibri" pitchFamily="34" charset="0"/>
+              </a:rPr>
+              <a:t>&gt; Z</a:t>
+            </a:r>
+          </a:p>
+          <a:p>
+            <a:pPr lvl="1" algn="just"/>
+            <a:r>
+              <a:rPr lang="en-US" sz="1600" dirty="0">
+                <a:latin typeface="Calibri" pitchFamily="34" charset="0"/>
+                <a:cs typeface="Calibri" pitchFamily="34" charset="0"/>
+              </a:rPr>
+              <a:t>Call:</a:t>
+            </a:r>
+          </a:p>
+          <a:p>
+            <a:pPr lvl="1" algn="just"/>
+            <a:r>
+              <a:rPr lang="en-US" sz="1600" dirty="0" err="1">
+                <a:latin typeface="Calibri" pitchFamily="34" charset="0"/>
+                <a:cs typeface="Calibri" pitchFamily="34" charset="0"/>
+              </a:rPr>
+              <a:t>lm</a:t>
+            </a:r>
+            <a:r>
+              <a:rPr lang="en-US" sz="1600" dirty="0">
+                <a:latin typeface="Calibri" pitchFamily="34" charset="0"/>
+                <a:cs typeface="Calibri" pitchFamily="34" charset="0"/>
+              </a:rPr>
+              <a:t>(formula = y ~ x)</a:t>
+            </a:r>
+          </a:p>
+          <a:p>
+            <a:pPr lvl="1" algn="just"/>
+            <a:endParaRPr lang="en-US" sz="1600" dirty="0">
+              <a:latin typeface="Calibri" pitchFamily="34" charset="0"/>
+              <a:cs typeface="Calibri" pitchFamily="34" charset="0"/>
+            </a:endParaRPr>
+          </a:p>
+          <a:p>
+            <a:pPr lvl="1" algn="just"/>
+            <a:r>
+              <a:rPr lang="en-US" sz="1600" dirty="0">
+                <a:latin typeface="Calibri" pitchFamily="34" charset="0"/>
+                <a:cs typeface="Calibri" pitchFamily="34" charset="0"/>
+              </a:rPr>
+              <a:t>Coefficients:</a:t>
+            </a:r>
+          </a:p>
+          <a:p>
+            <a:pPr lvl="1" algn="just"/>
+            <a:r>
+              <a:rPr lang="en-US" sz="1600" dirty="0">
+                <a:latin typeface="Calibri" pitchFamily="34" charset="0"/>
+                <a:cs typeface="Calibri" pitchFamily="34" charset="0"/>
+              </a:rPr>
+              <a:t>(Intercept)            x  </a:t>
+            </a:r>
+          </a:p>
+          <a:p>
+            <a:pPr lvl="1" algn="just"/>
+            <a:r>
+              <a:rPr lang="en-US" sz="1600" dirty="0">
+                <a:latin typeface="Calibri" pitchFamily="34" charset="0"/>
+                <a:cs typeface="Calibri" pitchFamily="34" charset="0"/>
+              </a:rPr>
+              <a:t>     324.08        -8.83</a:t>
+            </a:r>
+          </a:p>
+        </p:txBody>
+      </p:sp>
+      <p:sp>
+        <p:nvSpPr>
+          <p:cNvPr id="5" name="TextBox 4">
+            <a:extLst>
+              <a:ext uri="{FF2B5EF4-FFF2-40B4-BE49-F238E27FC236}">
+                <a16:creationId xmlns:a16="http://schemas.microsoft.com/office/drawing/2014/main" id="{59FD2B39-DB8B-4BF5-9366-6E6BD3B250DE}"/>
+              </a:ext>
+            </a:extLst>
+          </p:cNvPr>
+          <p:cNvSpPr txBox="1"/>
+          <p:nvPr/>
+        </p:nvSpPr>
+        <p:spPr>
+          <a:xfrm>
+            <a:off x="3124200" y="1255455"/>
+            <a:ext cx="5867400" cy="4924425"/>
+          </a:xfrm>
+          <a:prstGeom prst="rect">
+            <a:avLst/>
+          </a:prstGeom>
+          <a:noFill/>
+        </p:spPr>
+        <p:txBody>
+          <a:bodyPr wrap="square" rtlCol="0">
+            <a:spAutoFit/>
+          </a:bodyPr>
+          <a:lstStyle/>
+          <a:p>
+            <a:pPr algn="just"/>
+            <a:r>
+              <a:rPr lang="en-US" sz="1600" dirty="0">
+                <a:solidFill>
+                  <a:srgbClr val="FF0000"/>
+                </a:solidFill>
+                <a:latin typeface="Calibri" pitchFamily="34" charset="0"/>
+                <a:cs typeface="Calibri" pitchFamily="34" charset="0"/>
+              </a:rPr>
+              <a:t>&gt; summary(Z)</a:t>
+            </a:r>
+          </a:p>
+          <a:p>
+            <a:pPr algn="just"/>
+            <a:endParaRPr lang="en-US" sz="1600" dirty="0">
+              <a:solidFill>
+                <a:srgbClr val="FF0000"/>
+              </a:solidFill>
+              <a:latin typeface="Calibri" pitchFamily="34" charset="0"/>
+              <a:cs typeface="Calibri" pitchFamily="34" charset="0"/>
+            </a:endParaRPr>
+          </a:p>
+          <a:p>
+            <a:pPr algn="just"/>
+            <a:r>
+              <a:rPr lang="en-US" sz="1600" dirty="0">
+                <a:latin typeface="Calibri" pitchFamily="34" charset="0"/>
+                <a:cs typeface="Calibri" pitchFamily="34" charset="0"/>
+              </a:rPr>
+              <a:t>Call:</a:t>
+            </a:r>
+          </a:p>
+          <a:p>
+            <a:pPr algn="just"/>
+            <a:r>
+              <a:rPr lang="en-US" sz="1600" dirty="0" err="1">
+                <a:latin typeface="Calibri" pitchFamily="34" charset="0"/>
+                <a:cs typeface="Calibri" pitchFamily="34" charset="0"/>
+              </a:rPr>
+              <a:t>lm</a:t>
+            </a:r>
+            <a:r>
+              <a:rPr lang="en-US" sz="1600" dirty="0">
+                <a:latin typeface="Calibri" pitchFamily="34" charset="0"/>
+                <a:cs typeface="Calibri" pitchFamily="34" charset="0"/>
+              </a:rPr>
+              <a:t>(formula = y ~ x)</a:t>
+            </a:r>
+          </a:p>
+          <a:p>
+            <a:pPr algn="just"/>
+            <a:endParaRPr lang="en-US" sz="1600" dirty="0">
+              <a:latin typeface="Calibri" pitchFamily="34" charset="0"/>
+              <a:cs typeface="Calibri" pitchFamily="34" charset="0"/>
+            </a:endParaRPr>
+          </a:p>
+          <a:p>
+            <a:pPr algn="just"/>
+            <a:r>
+              <a:rPr lang="en-US" sz="1600" dirty="0">
+                <a:latin typeface="Calibri" pitchFamily="34" charset="0"/>
+                <a:cs typeface="Calibri" pitchFamily="34" charset="0"/>
+              </a:rPr>
+              <a:t>Residuals:</a:t>
+            </a:r>
+          </a:p>
+          <a:p>
+            <a:pPr algn="just"/>
+            <a:r>
+              <a:rPr lang="en-US" sz="1600" dirty="0">
+                <a:latin typeface="Calibri" pitchFamily="34" charset="0"/>
+                <a:cs typeface="Calibri" pitchFamily="34" charset="0"/>
+              </a:rPr>
+              <a:t>   Min	1Q 	Median     	3Q    	Max </a:t>
+            </a:r>
+          </a:p>
+          <a:p>
+            <a:pPr algn="just"/>
+            <a:r>
+              <a:rPr lang="en-US" sz="1600" dirty="0">
+                <a:latin typeface="Calibri" pitchFamily="34" charset="0"/>
+                <a:cs typeface="Calibri" pitchFamily="34" charset="0"/>
+              </a:rPr>
+              <a:t>-59.26 	-28.93	-13.45  	25.65 	143.36 </a:t>
+            </a:r>
+          </a:p>
+          <a:p>
+            <a:pPr algn="just"/>
+            <a:endParaRPr lang="en-US" sz="1600" dirty="0">
+              <a:latin typeface="Calibri" pitchFamily="34" charset="0"/>
+              <a:cs typeface="Calibri" pitchFamily="34" charset="0"/>
+            </a:endParaRPr>
+          </a:p>
+          <a:p>
+            <a:pPr algn="just"/>
+            <a:r>
+              <a:rPr lang="en-US" sz="1600" dirty="0">
+                <a:latin typeface="Calibri" pitchFamily="34" charset="0"/>
+                <a:cs typeface="Calibri" pitchFamily="34" charset="0"/>
+              </a:rPr>
+              <a:t>Coefficients:</a:t>
+            </a:r>
+          </a:p>
+          <a:p>
+            <a:pPr algn="just"/>
+            <a:r>
+              <a:rPr lang="en-US" sz="1600" dirty="0">
+                <a:latin typeface="Calibri" pitchFamily="34" charset="0"/>
+                <a:cs typeface="Calibri" pitchFamily="34" charset="0"/>
+              </a:rPr>
+              <a:t>            	  Estimate 	Std. Error 	t value 	</a:t>
+            </a:r>
+            <a:r>
+              <a:rPr lang="en-US" sz="1600" dirty="0" err="1">
+                <a:latin typeface="Calibri" pitchFamily="34" charset="0"/>
+                <a:cs typeface="Calibri" pitchFamily="34" charset="0"/>
+              </a:rPr>
+              <a:t>Pr</a:t>
+            </a:r>
+            <a:r>
+              <a:rPr lang="en-US" sz="1600" dirty="0">
+                <a:latin typeface="Calibri" pitchFamily="34" charset="0"/>
+                <a:cs typeface="Calibri" pitchFamily="34" charset="0"/>
+              </a:rPr>
+              <a:t>(&gt;|t|)    </a:t>
+            </a:r>
+          </a:p>
+          <a:p>
+            <a:pPr algn="just"/>
+            <a:r>
+              <a:rPr lang="en-US" sz="1600" dirty="0">
+                <a:latin typeface="Calibri" pitchFamily="34" charset="0"/>
+                <a:cs typeface="Calibri" pitchFamily="34" charset="0"/>
+              </a:rPr>
+              <a:t>(Intercept)   324.08      27.43  	11.813 	8.25e-13 ***</a:t>
+            </a:r>
+          </a:p>
+          <a:p>
+            <a:pPr algn="just"/>
+            <a:r>
+              <a:rPr lang="en-US" sz="1600" dirty="0">
+                <a:latin typeface="Calibri" pitchFamily="34" charset="0"/>
+                <a:cs typeface="Calibri" pitchFamily="34" charset="0"/>
+              </a:rPr>
+              <a:t>x              	  -8.83      	 1.31 	 -6.742 	1.79e-07 ***</a:t>
+            </a:r>
+          </a:p>
+          <a:p>
+            <a:pPr algn="just"/>
+            <a:r>
+              <a:rPr lang="en-US" sz="1600" dirty="0">
+                <a:latin typeface="Calibri" pitchFamily="34" charset="0"/>
+                <a:cs typeface="Calibri" pitchFamily="34" charset="0"/>
+              </a:rPr>
+              <a:t>---</a:t>
+            </a:r>
+          </a:p>
+          <a:p>
+            <a:pPr algn="just"/>
+            <a:r>
+              <a:rPr lang="en-US" sz="1600" dirty="0" err="1">
+                <a:latin typeface="Calibri" pitchFamily="34" charset="0"/>
+                <a:cs typeface="Calibri" pitchFamily="34" charset="0"/>
+              </a:rPr>
+              <a:t>Signif</a:t>
+            </a:r>
+            <a:r>
+              <a:rPr lang="en-US" sz="1600" dirty="0">
+                <a:latin typeface="Calibri" pitchFamily="34" charset="0"/>
+                <a:cs typeface="Calibri" pitchFamily="34" charset="0"/>
+              </a:rPr>
+              <a:t>. codes:  0 ‘***’ 0.001 ‘**’ 0.01 ‘*’ 0.05 ‘.’ 0.1 ‘ ’ 1</a:t>
+            </a:r>
+          </a:p>
+          <a:p>
+            <a:pPr algn="just"/>
+            <a:endParaRPr lang="en-US" sz="1600" dirty="0">
+              <a:latin typeface="Calibri" pitchFamily="34" charset="0"/>
+              <a:cs typeface="Calibri" pitchFamily="34" charset="0"/>
+            </a:endParaRPr>
+          </a:p>
+          <a:p>
+            <a:pPr algn="just"/>
+            <a:r>
+              <a:rPr lang="en-US" sz="1600" dirty="0">
+                <a:latin typeface="Calibri" pitchFamily="34" charset="0"/>
+                <a:cs typeface="Calibri" pitchFamily="34" charset="0"/>
+              </a:rPr>
+              <a:t>Residual standard error: 43.95 on 30 degrees of freedom</a:t>
+            </a:r>
+          </a:p>
+          <a:p>
+            <a:pPr algn="just"/>
+            <a:r>
+              <a:rPr lang="en-US" sz="1600" dirty="0">
+                <a:latin typeface="Calibri" pitchFamily="34" charset="0"/>
+                <a:cs typeface="Calibri" pitchFamily="34" charset="0"/>
+              </a:rPr>
+              <a:t>Multiple R-squared:  0.6024,	Adjusted R-squared:  0.5892 </a:t>
+            </a:r>
+          </a:p>
+          <a:p>
+            <a:pPr algn="just"/>
+            <a:r>
+              <a:rPr lang="en-US" sz="1600" dirty="0">
+                <a:latin typeface="Calibri" pitchFamily="34" charset="0"/>
+                <a:cs typeface="Calibri" pitchFamily="34" charset="0"/>
+              </a:rPr>
+              <a:t>F-statistic: 45.46 on 1 and 30 DF,  p-value: 1.788e-07</a:t>
             </a:r>
           </a:p>
         </p:txBody>
@@ -14560,7 +15387,7 @@
     </p:spTree>
     <p:extLst>
       <p:ext uri="{BB962C8B-B14F-4D97-AF65-F5344CB8AC3E}">
-        <p14:creationId xmlns:p14="http://schemas.microsoft.com/office/powerpoint/2010/main" val="1408859139"/>
+        <p14:creationId xmlns:p14="http://schemas.microsoft.com/office/powerpoint/2010/main" val="1384183509"/>
       </p:ext>
     </p:extLst>
   </p:cSld>
@@ -14589,13 +15416,13 @@
       </p:grpSpPr>
       <p:sp>
         <p:nvSpPr>
-          <p:cNvPr id="2" name="TextBox 1"/>
+          <p:cNvPr id="4" name="TextBox 3"/>
           <p:cNvSpPr txBox="1"/>
           <p:nvPr/>
         </p:nvSpPr>
         <p:spPr>
           <a:xfrm>
-            <a:off x="1159833" y="457201"/>
+            <a:off x="1432804" y="3105834"/>
             <a:ext cx="6278449" cy="646331"/>
           </a:xfrm>
           <a:prstGeom prst="rect">
@@ -14620,173 +15447,10 @@
           </a:p>
         </p:txBody>
       </p:sp>
-      <p:sp>
-        <p:nvSpPr>
-          <p:cNvPr id="6" name="TextBox 5">
-            <a:extLst>
-              <a:ext uri="{FF2B5EF4-FFF2-40B4-BE49-F238E27FC236}">
-                <a16:creationId xmlns:a16="http://schemas.microsoft.com/office/drawing/2014/main" id="{A3585BB0-2513-4FD6-9854-13BEBA99DD39}"/>
-              </a:ext>
-            </a:extLst>
-          </p:cNvPr>
-          <p:cNvSpPr txBox="1"/>
-          <p:nvPr/>
-        </p:nvSpPr>
-        <p:spPr>
-          <a:xfrm>
-            <a:off x="752622" y="1371600"/>
-            <a:ext cx="7934178" cy="3170099"/>
-          </a:xfrm>
-          <a:prstGeom prst="rect">
-            <a:avLst/>
-          </a:prstGeom>
-          <a:noFill/>
-        </p:spPr>
-        <p:txBody>
-          <a:bodyPr wrap="square" rtlCol="0">
-            <a:spAutoFit/>
-          </a:bodyPr>
-          <a:lstStyle/>
-          <a:p>
-            <a:r>
-              <a:rPr lang="en-US" sz="2000" b="1" dirty="0">
-                <a:latin typeface="Calibri" pitchFamily="34" charset="0"/>
-                <a:cs typeface="Calibri" pitchFamily="34" charset="0"/>
-              </a:rPr>
-              <a:t>Popular methods of building models:</a:t>
-            </a:r>
-          </a:p>
-          <a:p>
-            <a:pPr marL="457200" indent="-457200">
-              <a:buFont typeface="+mj-lt"/>
-              <a:buAutoNum type="arabicPeriod"/>
-            </a:pPr>
-            <a:r>
-              <a:rPr lang="en-US" sz="2000" dirty="0">
-                <a:latin typeface="Calibri" pitchFamily="34" charset="0"/>
-                <a:cs typeface="Calibri" pitchFamily="34" charset="0"/>
-              </a:rPr>
-              <a:t>All in</a:t>
-            </a:r>
-          </a:p>
-          <a:p>
-            <a:pPr marL="457200" indent="-457200">
-              <a:buFont typeface="+mj-lt"/>
-              <a:buAutoNum type="arabicPeriod"/>
-            </a:pPr>
-            <a:r>
-              <a:rPr lang="en-US" sz="2000" dirty="0">
-                <a:latin typeface="Calibri" pitchFamily="34" charset="0"/>
-                <a:cs typeface="Calibri" pitchFamily="34" charset="0"/>
-              </a:rPr>
-              <a:t>Backward Elimination</a:t>
-            </a:r>
-          </a:p>
-          <a:p>
-            <a:pPr marL="457200" indent="-457200">
-              <a:buFont typeface="+mj-lt"/>
-              <a:buAutoNum type="arabicPeriod"/>
-            </a:pPr>
-            <a:r>
-              <a:rPr lang="en-US" sz="2000" dirty="0">
-                <a:latin typeface="Calibri" pitchFamily="34" charset="0"/>
-                <a:cs typeface="Calibri" pitchFamily="34" charset="0"/>
-              </a:rPr>
-              <a:t>Forward Selection</a:t>
-            </a:r>
-          </a:p>
-          <a:p>
-            <a:pPr marL="457200" indent="-457200">
-              <a:buFont typeface="+mj-lt"/>
-              <a:buAutoNum type="arabicPeriod"/>
-            </a:pPr>
-            <a:r>
-              <a:rPr lang="en-US" sz="2000" dirty="0">
-                <a:latin typeface="Calibri" pitchFamily="34" charset="0"/>
-                <a:cs typeface="Calibri" pitchFamily="34" charset="0"/>
-              </a:rPr>
-              <a:t>Bidirectional Elimination</a:t>
-            </a:r>
-          </a:p>
-          <a:p>
-            <a:pPr marL="457200" indent="-457200">
-              <a:buFont typeface="+mj-lt"/>
-              <a:buAutoNum type="arabicPeriod"/>
-            </a:pPr>
-            <a:r>
-              <a:rPr lang="en-US" sz="2000" dirty="0">
-                <a:latin typeface="Calibri" pitchFamily="34" charset="0"/>
-                <a:cs typeface="Calibri" pitchFamily="34" charset="0"/>
-              </a:rPr>
-              <a:t>Score Comparison</a:t>
-            </a:r>
-          </a:p>
-          <a:p>
-            <a:pPr marL="457200" indent="-457200">
-              <a:buFont typeface="+mj-lt"/>
-              <a:buAutoNum type="arabicPeriod"/>
-            </a:pPr>
-            <a:endParaRPr lang="en-US" sz="2000" dirty="0">
-              <a:latin typeface="Calibri" pitchFamily="34" charset="0"/>
-              <a:cs typeface="Calibri" pitchFamily="34" charset="0"/>
-            </a:endParaRPr>
-          </a:p>
-          <a:p>
-            <a:r>
-              <a:rPr lang="en-US" sz="2000" b="1" dirty="0">
-                <a:latin typeface="Calibri" pitchFamily="34" charset="0"/>
-                <a:cs typeface="Calibri" pitchFamily="34" charset="0"/>
-              </a:rPr>
-              <a:t>Note: Backward, Forward and Bi-direction are called as </a:t>
-            </a:r>
-            <a:r>
-              <a:rPr lang="en-US" sz="2000" b="1" dirty="0">
-                <a:solidFill>
-                  <a:srgbClr val="C00000"/>
-                </a:solidFill>
-                <a:latin typeface="Calibri" pitchFamily="34" charset="0"/>
-                <a:cs typeface="Calibri" pitchFamily="34" charset="0"/>
-              </a:rPr>
-              <a:t>Stepwise Regression. </a:t>
-            </a:r>
-            <a:r>
-              <a:rPr lang="en-US" sz="2000" b="1" dirty="0">
-                <a:latin typeface="Calibri" pitchFamily="34" charset="0"/>
-                <a:cs typeface="Calibri" pitchFamily="34" charset="0"/>
-              </a:rPr>
-              <a:t>However, sometimes, if we refer Stepwise Regression, generally </a:t>
-            </a:r>
-            <a:r>
-              <a:rPr lang="en-US" sz="2000" b="1" dirty="0">
-                <a:solidFill>
-                  <a:srgbClr val="C00000"/>
-                </a:solidFill>
-                <a:latin typeface="Calibri" pitchFamily="34" charset="0"/>
-                <a:cs typeface="Calibri" pitchFamily="34" charset="0"/>
-              </a:rPr>
-              <a:t>Bi-directional Elimination </a:t>
-            </a:r>
-            <a:r>
-              <a:rPr lang="en-US" sz="2000" b="1" dirty="0">
-                <a:latin typeface="Calibri" pitchFamily="34" charset="0"/>
-                <a:cs typeface="Calibri" pitchFamily="34" charset="0"/>
-              </a:rPr>
-              <a:t>is considered</a:t>
-            </a:r>
-            <a:endParaRPr lang="en-US" sz="2000" b="1" dirty="0">
-              <a:solidFill>
-                <a:srgbClr val="C00000"/>
-              </a:solidFill>
-              <a:latin typeface="Calibri" pitchFamily="34" charset="0"/>
-              <a:cs typeface="Calibri" pitchFamily="34" charset="0"/>
-            </a:endParaRPr>
-          </a:p>
-        </p:txBody>
-      </p:sp>
     </p:spTree>
     <p:extLst>
       <p:ext uri="{BB962C8B-B14F-4D97-AF65-F5344CB8AC3E}">
-        <p14:creationId xmlns:p14="http://schemas.microsoft.com/office/powerpoint/2010/main" val="1536775577"/>
+        <p14:creationId xmlns:p14="http://schemas.microsoft.com/office/powerpoint/2010/main" val="1408859139"/>
       </p:ext>
     </p:extLst>
   </p:cSld>
@@ -14953,6 +15617,232 @@
         <p:spPr>
           <a:xfrm>
             <a:off x="752622" y="1371600"/>
+            <a:ext cx="7934178" cy="3170099"/>
+          </a:xfrm>
+          <a:prstGeom prst="rect">
+            <a:avLst/>
+          </a:prstGeom>
+          <a:noFill/>
+        </p:spPr>
+        <p:txBody>
+          <a:bodyPr wrap="square" rtlCol="0">
+            <a:spAutoFit/>
+          </a:bodyPr>
+          <a:lstStyle/>
+          <a:p>
+            <a:r>
+              <a:rPr lang="en-US" sz="2000" b="1" dirty="0">
+                <a:latin typeface="Calibri" pitchFamily="34" charset="0"/>
+                <a:cs typeface="Calibri" pitchFamily="34" charset="0"/>
+              </a:rPr>
+              <a:t>Popular methods of building models:</a:t>
+            </a:r>
+          </a:p>
+          <a:p>
+            <a:pPr marL="457200" indent="-457200">
+              <a:buFont typeface="+mj-lt"/>
+              <a:buAutoNum type="arabicPeriod"/>
+            </a:pPr>
+            <a:r>
+              <a:rPr lang="en-US" sz="2000" dirty="0">
+                <a:latin typeface="Calibri" pitchFamily="34" charset="0"/>
+                <a:cs typeface="Calibri" pitchFamily="34" charset="0"/>
+              </a:rPr>
+              <a:t>All in</a:t>
+            </a:r>
+          </a:p>
+          <a:p>
+            <a:pPr marL="457200" indent="-457200">
+              <a:buFont typeface="+mj-lt"/>
+              <a:buAutoNum type="arabicPeriod"/>
+            </a:pPr>
+            <a:r>
+              <a:rPr lang="en-US" sz="2000" dirty="0">
+                <a:latin typeface="Calibri" pitchFamily="34" charset="0"/>
+                <a:cs typeface="Calibri" pitchFamily="34" charset="0"/>
+              </a:rPr>
+              <a:t>Backward Elimination</a:t>
+            </a:r>
+          </a:p>
+          <a:p>
+            <a:pPr marL="457200" indent="-457200">
+              <a:buFont typeface="+mj-lt"/>
+              <a:buAutoNum type="arabicPeriod"/>
+            </a:pPr>
+            <a:r>
+              <a:rPr lang="en-US" sz="2000" dirty="0">
+                <a:latin typeface="Calibri" pitchFamily="34" charset="0"/>
+                <a:cs typeface="Calibri" pitchFamily="34" charset="0"/>
+              </a:rPr>
+              <a:t>Forward Selection</a:t>
+            </a:r>
+          </a:p>
+          <a:p>
+            <a:pPr marL="457200" indent="-457200">
+              <a:buFont typeface="+mj-lt"/>
+              <a:buAutoNum type="arabicPeriod"/>
+            </a:pPr>
+            <a:r>
+              <a:rPr lang="en-US" sz="2000" dirty="0">
+                <a:latin typeface="Calibri" pitchFamily="34" charset="0"/>
+                <a:cs typeface="Calibri" pitchFamily="34" charset="0"/>
+              </a:rPr>
+              <a:t>Bidirectional Elimination</a:t>
+            </a:r>
+          </a:p>
+          <a:p>
+            <a:pPr marL="457200" indent="-457200">
+              <a:buFont typeface="+mj-lt"/>
+              <a:buAutoNum type="arabicPeriod"/>
+            </a:pPr>
+            <a:r>
+              <a:rPr lang="en-US" sz="2000" dirty="0">
+                <a:latin typeface="Calibri" pitchFamily="34" charset="0"/>
+                <a:cs typeface="Calibri" pitchFamily="34" charset="0"/>
+              </a:rPr>
+              <a:t>Score Comparison</a:t>
+            </a:r>
+          </a:p>
+          <a:p>
+            <a:pPr marL="457200" indent="-457200">
+              <a:buFont typeface="+mj-lt"/>
+              <a:buAutoNum type="arabicPeriod"/>
+            </a:pPr>
+            <a:endParaRPr lang="en-US" sz="2000" dirty="0">
+              <a:latin typeface="Calibri" pitchFamily="34" charset="0"/>
+              <a:cs typeface="Calibri" pitchFamily="34" charset="0"/>
+            </a:endParaRPr>
+          </a:p>
+          <a:p>
+            <a:r>
+              <a:rPr lang="en-US" sz="2000" b="1" dirty="0">
+                <a:latin typeface="Calibri" pitchFamily="34" charset="0"/>
+                <a:cs typeface="Calibri" pitchFamily="34" charset="0"/>
+              </a:rPr>
+              <a:t>Note: Backward, Forward and Bi-direction are called as </a:t>
+            </a:r>
+            <a:r>
+              <a:rPr lang="en-US" sz="2000" b="1" dirty="0">
+                <a:solidFill>
+                  <a:srgbClr val="C00000"/>
+                </a:solidFill>
+                <a:latin typeface="Calibri" pitchFamily="34" charset="0"/>
+                <a:cs typeface="Calibri" pitchFamily="34" charset="0"/>
+              </a:rPr>
+              <a:t>Stepwise Regression. </a:t>
+            </a:r>
+            <a:r>
+              <a:rPr lang="en-US" sz="2000" b="1" dirty="0">
+                <a:latin typeface="Calibri" pitchFamily="34" charset="0"/>
+                <a:cs typeface="Calibri" pitchFamily="34" charset="0"/>
+              </a:rPr>
+              <a:t>However, sometimes, if we refer Stepwise Regression, generally </a:t>
+            </a:r>
+            <a:r>
+              <a:rPr lang="en-US" sz="2000" b="1" dirty="0">
+                <a:solidFill>
+                  <a:srgbClr val="C00000"/>
+                </a:solidFill>
+                <a:latin typeface="Calibri" pitchFamily="34" charset="0"/>
+                <a:cs typeface="Calibri" pitchFamily="34" charset="0"/>
+              </a:rPr>
+              <a:t>Bi-directional Elimination </a:t>
+            </a:r>
+            <a:r>
+              <a:rPr lang="en-US" sz="2000" b="1" dirty="0">
+                <a:latin typeface="Calibri" pitchFamily="34" charset="0"/>
+                <a:cs typeface="Calibri" pitchFamily="34" charset="0"/>
+              </a:rPr>
+              <a:t>is considered</a:t>
+            </a:r>
+            <a:endParaRPr lang="en-US" sz="2000" b="1" dirty="0">
+              <a:solidFill>
+                <a:srgbClr val="C00000"/>
+              </a:solidFill>
+              <a:latin typeface="Calibri" pitchFamily="34" charset="0"/>
+              <a:cs typeface="Calibri" pitchFamily="34" charset="0"/>
+            </a:endParaRPr>
+          </a:p>
+        </p:txBody>
+      </p:sp>
+    </p:spTree>
+    <p:extLst>
+      <p:ext uri="{BB962C8B-B14F-4D97-AF65-F5344CB8AC3E}">
+        <p14:creationId xmlns:p14="http://schemas.microsoft.com/office/powerpoint/2010/main" val="1536775577"/>
+      </p:ext>
+    </p:extLst>
+  </p:cSld>
+  <p:clrMapOvr>
+    <a:masterClrMapping/>
+  </p:clrMapOvr>
+</p:sld>
+</file>
+
+<file path=ppt/slides/slide51.xml><?xml version="1.0" encoding="utf-8"?>
+<p:sld xmlns:a="http://schemas.openxmlformats.org/drawingml/2006/main" xmlns:r="http://schemas.openxmlformats.org/officeDocument/2006/relationships" xmlns:p="http://schemas.openxmlformats.org/presentationml/2006/main">
+  <p:cSld>
+    <p:spTree>
+      <p:nvGrpSpPr>
+        <p:cNvPr id="1" name=""/>
+        <p:cNvGrpSpPr/>
+        <p:nvPr/>
+      </p:nvGrpSpPr>
+      <p:grpSpPr>
+        <a:xfrm>
+          <a:off x="0" y="0"/>
+          <a:ext cx="0" cy="0"/>
+          <a:chOff x="0" y="0"/>
+          <a:chExt cx="0" cy="0"/>
+        </a:xfrm>
+      </p:grpSpPr>
+      <p:sp>
+        <p:nvSpPr>
+          <p:cNvPr id="2" name="TextBox 1"/>
+          <p:cNvSpPr txBox="1"/>
+          <p:nvPr/>
+        </p:nvSpPr>
+        <p:spPr>
+          <a:xfrm>
+            <a:off x="1159833" y="457201"/>
+            <a:ext cx="6278449" cy="646331"/>
+          </a:xfrm>
+          <a:prstGeom prst="rect">
+            <a:avLst/>
+          </a:prstGeom>
+          <a:noFill/>
+        </p:spPr>
+        <p:txBody>
+          <a:bodyPr wrap="none" rtlCol="0">
+            <a:spAutoFit/>
+          </a:bodyPr>
+          <a:lstStyle/>
+          <a:p>
+            <a:pPr algn="ctr"/>
+            <a:r>
+              <a:rPr lang="en-US" sz="3600" dirty="0">
+                <a:latin typeface="Calibri" pitchFamily="34" charset="0"/>
+                <a:cs typeface="Calibri" pitchFamily="34" charset="0"/>
+              </a:rPr>
+              <a:t>Approaches of Linear Regression</a:t>
+            </a:r>
+          </a:p>
+        </p:txBody>
+      </p:sp>
+      <p:sp>
+        <p:nvSpPr>
+          <p:cNvPr id="6" name="TextBox 5">
+            <a:extLst>
+              <a:ext uri="{FF2B5EF4-FFF2-40B4-BE49-F238E27FC236}">
+                <a16:creationId xmlns:a16="http://schemas.microsoft.com/office/drawing/2014/main" id="{A3585BB0-2513-4FD6-9854-13BEBA99DD39}"/>
+              </a:ext>
+            </a:extLst>
+          </p:cNvPr>
+          <p:cNvSpPr txBox="1"/>
+          <p:nvPr/>
+        </p:nvSpPr>
+        <p:spPr>
+          <a:xfrm>
+            <a:off x="752622" y="1371600"/>
             <a:ext cx="7934178" cy="1323439"/>
           </a:xfrm>
           <a:prstGeom prst="rect">
@@ -15058,7 +15948,7 @@
 </p:sld>
 </file>
 
-<file path=ppt/slides/slide51.xml><?xml version="1.0" encoding="utf-8"?>
+<file path=ppt/slides/slide52.xml><?xml version="1.0" encoding="utf-8"?>
 <p:sld xmlns:a="http://schemas.openxmlformats.org/drawingml/2006/main" xmlns:r="http://schemas.openxmlformats.org/officeDocument/2006/relationships" xmlns:p="http://schemas.openxmlformats.org/presentationml/2006/main">
   <p:cSld>
     <p:spTree>
@@ -15368,7 +16258,7 @@
 </p:sld>
 </file>
 
-<file path=ppt/slides/slide52.xml><?xml version="1.0" encoding="utf-8"?>
+<file path=ppt/slides/slide53.xml><?xml version="1.0" encoding="utf-8"?>
 <p:sld xmlns:a="http://schemas.openxmlformats.org/drawingml/2006/main" xmlns:r="http://schemas.openxmlformats.org/officeDocument/2006/relationships" xmlns:p="http://schemas.openxmlformats.org/presentationml/2006/main">
   <p:cSld>
     <p:spTree>
@@ -15680,7 +16570,7 @@
 </p:sld>
 </file>
 
-<file path=ppt/slides/slide53.xml><?xml version="1.0" encoding="utf-8"?>
+<file path=ppt/slides/slide54.xml><?xml version="1.0" encoding="utf-8"?>
 <p:sld xmlns:a="http://schemas.openxmlformats.org/drawingml/2006/main" xmlns:r="http://schemas.openxmlformats.org/officeDocument/2006/relationships" xmlns:p="http://schemas.openxmlformats.org/presentationml/2006/main">
   <p:cSld>
     <p:spTree>
@@ -15969,7 +16859,7 @@
 </p:sld>
 </file>
 
-<file path=ppt/slides/slide54.xml><?xml version="1.0" encoding="utf-8"?>
+<file path=ppt/slides/slide55.xml><?xml version="1.0" encoding="utf-8"?>
 <p:sld xmlns:a="http://schemas.openxmlformats.org/drawingml/2006/main" xmlns:r="http://schemas.openxmlformats.org/officeDocument/2006/relationships" xmlns:p="http://schemas.openxmlformats.org/presentationml/2006/main">
   <p:cSld>
     <p:spTree>
@@ -16296,7 +17186,7 @@
 </p:sld>
 </file>
 
-<file path=ppt/slides/slide55.xml><?xml version="1.0" encoding="utf-8"?>
+<file path=ppt/slides/slide56.xml><?xml version="1.0" encoding="utf-8"?>
 <p:sld xmlns:a="http://schemas.openxmlformats.org/drawingml/2006/main" xmlns:r="http://schemas.openxmlformats.org/officeDocument/2006/relationships" xmlns:p="http://schemas.openxmlformats.org/presentationml/2006/main">
   <p:cSld>
     <p:spTree>

</xml_diff>